<commit_message>
update logos and file structure
</commit_message>
<xml_diff>
--- a/resources/logos.pptx
+++ b/resources/logos.pptx
@@ -5,7 +5,7 @@
     <p:sldMasterId id="2147483648" r:id="rId1"/>
   </p:sldMasterIdLst>
   <p:notesMasterIdLst>
-    <p:notesMasterId r:id="rId12"/>
+    <p:notesMasterId r:id="rId17"/>
   </p:notesMasterIdLst>
   <p:sldIdLst>
     <p:sldId id="256" r:id="rId2"/>
@@ -16,8 +16,13 @@
     <p:sldId id="262" r:id="rId7"/>
     <p:sldId id="263" r:id="rId8"/>
     <p:sldId id="265" r:id="rId9"/>
-    <p:sldId id="264" r:id="rId10"/>
-    <p:sldId id="266" r:id="rId11"/>
+    <p:sldId id="268" r:id="rId10"/>
+    <p:sldId id="269" r:id="rId11"/>
+    <p:sldId id="264" r:id="rId12"/>
+    <p:sldId id="266" r:id="rId13"/>
+    <p:sldId id="267" r:id="rId14"/>
+    <p:sldId id="270" r:id="rId15"/>
+    <p:sldId id="271" r:id="rId16"/>
   </p:sldIdLst>
   <p:sldSz cx="12192000" cy="6858000"/>
   <p:notesSz cx="6858000" cy="9144000"/>
@@ -231,7 +236,7 @@
           <a:p>
             <a:fld id="{FEB29CEE-7550-5F4D-AAD4-BA10048E6F66}" type="datetimeFigureOut">
               <a:rPr lang="en-US" smtClean="0"/>
-              <a:t>4/11/21</a:t>
+              <a:t>4/12/21</a:t>
             </a:fld>
             <a:endParaRPr lang="en-US"/>
           </a:p>
@@ -626,7 +631,10 @@
           <a:bodyPr/>
           <a:lstStyle/>
           <a:p>
-            <a:endParaRPr lang="en-US"/>
+            <a:r>
+              <a:rPr lang="en-US" dirty="0"/>
+              <a:t>DEFAULT MAIN LOGO – 2021-04-12</a:t>
+            </a:r>
           </a:p>
         </p:txBody>
       </p:sp>
@@ -656,7 +664,459 @@
     </p:spTree>
     <p:extLst>
       <p:ext uri="{BB962C8B-B14F-4D97-AF65-F5344CB8AC3E}">
+        <p14:creationId xmlns:p14="http://schemas.microsoft.com/office/powerpoint/2010/main" val="3998900076"/>
+      </p:ext>
+    </p:extLst>
+  </p:cSld>
+  <p:clrMapOvr>
+    <a:masterClrMapping/>
+  </p:clrMapOvr>
+</p:notes>
+</file>
+
+<file path=ppt/notesSlides/notesSlide11.xml><?xml version="1.0" encoding="utf-8"?>
+<p:notes xmlns:a="http://schemas.openxmlformats.org/drawingml/2006/main" xmlns:r="http://schemas.openxmlformats.org/officeDocument/2006/relationships" xmlns:p="http://schemas.openxmlformats.org/presentationml/2006/main">
+  <p:cSld>
+    <p:spTree>
+      <p:nvGrpSpPr>
+        <p:cNvPr id="1" name=""/>
+        <p:cNvGrpSpPr/>
+        <p:nvPr/>
+      </p:nvGrpSpPr>
+      <p:grpSpPr>
+        <a:xfrm>
+          <a:off x="0" y="0"/>
+          <a:ext cx="0" cy="0"/>
+          <a:chOff x="0" y="0"/>
+          <a:chExt cx="0" cy="0"/>
+        </a:xfrm>
+      </p:grpSpPr>
+      <p:sp>
+        <p:nvSpPr>
+          <p:cNvPr id="2" name="Slide Image Placeholder 1"/>
+          <p:cNvSpPr>
+            <a:spLocks noGrp="1" noRot="1" noChangeAspect="1"/>
+          </p:cNvSpPr>
+          <p:nvPr>
+            <p:ph type="sldImg"/>
+          </p:nvPr>
+        </p:nvSpPr>
+        <p:spPr/>
+      </p:sp>
+      <p:sp>
+        <p:nvSpPr>
+          <p:cNvPr id="3" name="Notes Placeholder 2"/>
+          <p:cNvSpPr>
+            <a:spLocks noGrp="1"/>
+          </p:cNvSpPr>
+          <p:nvPr>
+            <p:ph type="body" idx="1"/>
+          </p:nvPr>
+        </p:nvSpPr>
+        <p:spPr/>
+        <p:txBody>
+          <a:bodyPr/>
+          <a:lstStyle/>
+          <a:p>
+            <a:pPr marL="0" marR="0" lvl="0" indent="0" algn="l" defTabSz="914400" rtl="0" eaLnBrk="1" fontAlgn="auto" latinLnBrk="0" hangingPunct="1">
+              <a:lnSpc>
+                <a:spcPct val="100000"/>
+              </a:lnSpc>
+              <a:spcBef>
+                <a:spcPts val="0"/>
+              </a:spcBef>
+              <a:spcAft>
+                <a:spcPts val="0"/>
+              </a:spcAft>
+              <a:buClrTx/>
+              <a:buSzTx/>
+              <a:buFontTx/>
+              <a:buNone/>
+              <a:tabLst/>
+              <a:defRPr/>
+            </a:pPr>
+            <a:r>
+              <a:rPr lang="en-US" dirty="0"/>
+              <a:t>Oval favicon logo with square background</a:t>
+            </a:r>
+          </a:p>
+        </p:txBody>
+      </p:sp>
+      <p:sp>
+        <p:nvSpPr>
+          <p:cNvPr id="4" name="Slide Number Placeholder 3"/>
+          <p:cNvSpPr>
+            <a:spLocks noGrp="1"/>
+          </p:cNvSpPr>
+          <p:nvPr>
+            <p:ph type="sldNum" sz="quarter" idx="5"/>
+          </p:nvPr>
+        </p:nvSpPr>
+        <p:spPr/>
+        <p:txBody>
+          <a:bodyPr/>
+          <a:lstStyle/>
+          <a:p>
+            <a:fld id="{37EBE46D-06CB-364A-8678-F123B7961E55}" type="slidenum">
+              <a:rPr lang="en-US" smtClean="0"/>
+              <a:t>11</a:t>
+            </a:fld>
+            <a:endParaRPr lang="en-US"/>
+          </a:p>
+        </p:txBody>
+      </p:sp>
+    </p:spTree>
+    <p:extLst>
+      <p:ext uri="{BB962C8B-B14F-4D97-AF65-F5344CB8AC3E}">
+        <p14:creationId xmlns:p14="http://schemas.microsoft.com/office/powerpoint/2010/main" val="545627361"/>
+      </p:ext>
+    </p:extLst>
+  </p:cSld>
+  <p:clrMapOvr>
+    <a:masterClrMapping/>
+  </p:clrMapOvr>
+</p:notes>
+</file>
+
+<file path=ppt/notesSlides/notesSlide12.xml><?xml version="1.0" encoding="utf-8"?>
+<p:notes xmlns:a="http://schemas.openxmlformats.org/drawingml/2006/main" xmlns:r="http://schemas.openxmlformats.org/officeDocument/2006/relationships" xmlns:p="http://schemas.openxmlformats.org/presentationml/2006/main">
+  <p:cSld>
+    <p:spTree>
+      <p:nvGrpSpPr>
+        <p:cNvPr id="1" name=""/>
+        <p:cNvGrpSpPr/>
+        <p:nvPr/>
+      </p:nvGrpSpPr>
+      <p:grpSpPr>
+        <a:xfrm>
+          <a:off x="0" y="0"/>
+          <a:ext cx="0" cy="0"/>
+          <a:chOff x="0" y="0"/>
+          <a:chExt cx="0" cy="0"/>
+        </a:xfrm>
+      </p:grpSpPr>
+      <p:sp>
+        <p:nvSpPr>
+          <p:cNvPr id="2" name="Slide Image Placeholder 1"/>
+          <p:cNvSpPr>
+            <a:spLocks noGrp="1" noRot="1" noChangeAspect="1"/>
+          </p:cNvSpPr>
+          <p:nvPr>
+            <p:ph type="sldImg"/>
+          </p:nvPr>
+        </p:nvSpPr>
+        <p:spPr/>
+      </p:sp>
+      <p:sp>
+        <p:nvSpPr>
+          <p:cNvPr id="3" name="Notes Placeholder 2"/>
+          <p:cNvSpPr>
+            <a:spLocks noGrp="1"/>
+          </p:cNvSpPr>
+          <p:nvPr>
+            <p:ph type="body" idx="1"/>
+          </p:nvPr>
+        </p:nvSpPr>
+        <p:spPr/>
+        <p:txBody>
+          <a:bodyPr/>
+          <a:lstStyle/>
+          <a:p>
+            <a:r>
+              <a:rPr lang="en-US" dirty="0"/>
+              <a:t>Circle favicon logo with square background</a:t>
+            </a:r>
+          </a:p>
+        </p:txBody>
+      </p:sp>
+      <p:sp>
+        <p:nvSpPr>
+          <p:cNvPr id="4" name="Slide Number Placeholder 3"/>
+          <p:cNvSpPr>
+            <a:spLocks noGrp="1"/>
+          </p:cNvSpPr>
+          <p:nvPr>
+            <p:ph type="sldNum" sz="quarter" idx="5"/>
+          </p:nvPr>
+        </p:nvSpPr>
+        <p:spPr/>
+        <p:txBody>
+          <a:bodyPr/>
+          <a:lstStyle/>
+          <a:p>
+            <a:fld id="{37EBE46D-06CB-364A-8678-F123B7961E55}" type="slidenum">
+              <a:rPr lang="en-US" smtClean="0"/>
+              <a:t>12</a:t>
+            </a:fld>
+            <a:endParaRPr lang="en-US"/>
+          </a:p>
+        </p:txBody>
+      </p:sp>
+    </p:spTree>
+    <p:extLst>
+      <p:ext uri="{BB962C8B-B14F-4D97-AF65-F5344CB8AC3E}">
         <p14:creationId xmlns:p14="http://schemas.microsoft.com/office/powerpoint/2010/main" val="2265485579"/>
+      </p:ext>
+    </p:extLst>
+  </p:cSld>
+  <p:clrMapOvr>
+    <a:masterClrMapping/>
+  </p:clrMapOvr>
+</p:notes>
+</file>
+
+<file path=ppt/notesSlides/notesSlide13.xml><?xml version="1.0" encoding="utf-8"?>
+<p:notes xmlns:a="http://schemas.openxmlformats.org/drawingml/2006/main" xmlns:r="http://schemas.openxmlformats.org/officeDocument/2006/relationships" xmlns:p="http://schemas.openxmlformats.org/presentationml/2006/main">
+  <p:cSld>
+    <p:spTree>
+      <p:nvGrpSpPr>
+        <p:cNvPr id="1" name=""/>
+        <p:cNvGrpSpPr/>
+        <p:nvPr/>
+      </p:nvGrpSpPr>
+      <p:grpSpPr>
+        <a:xfrm>
+          <a:off x="0" y="0"/>
+          <a:ext cx="0" cy="0"/>
+          <a:chOff x="0" y="0"/>
+          <a:chExt cx="0" cy="0"/>
+        </a:xfrm>
+      </p:grpSpPr>
+      <p:sp>
+        <p:nvSpPr>
+          <p:cNvPr id="2" name="Slide Image Placeholder 1"/>
+          <p:cNvSpPr>
+            <a:spLocks noGrp="1" noRot="1" noChangeAspect="1"/>
+          </p:cNvSpPr>
+          <p:nvPr>
+            <p:ph type="sldImg"/>
+          </p:nvPr>
+        </p:nvSpPr>
+        <p:spPr/>
+      </p:sp>
+      <p:sp>
+        <p:nvSpPr>
+          <p:cNvPr id="3" name="Notes Placeholder 2"/>
+          <p:cNvSpPr>
+            <a:spLocks noGrp="1"/>
+          </p:cNvSpPr>
+          <p:nvPr>
+            <p:ph type="body" idx="1"/>
+          </p:nvPr>
+        </p:nvSpPr>
+        <p:spPr/>
+        <p:txBody>
+          <a:bodyPr/>
+          <a:lstStyle/>
+          <a:p>
+            <a:r>
+              <a:rPr lang="en-US" dirty="0"/>
+              <a:t>Circle favicon logo with circle background</a:t>
+            </a:r>
+          </a:p>
+        </p:txBody>
+      </p:sp>
+      <p:sp>
+        <p:nvSpPr>
+          <p:cNvPr id="4" name="Slide Number Placeholder 3"/>
+          <p:cNvSpPr>
+            <a:spLocks noGrp="1"/>
+          </p:cNvSpPr>
+          <p:nvPr>
+            <p:ph type="sldNum" sz="quarter" idx="5"/>
+          </p:nvPr>
+        </p:nvSpPr>
+        <p:spPr/>
+        <p:txBody>
+          <a:bodyPr/>
+          <a:lstStyle/>
+          <a:p>
+            <a:fld id="{37EBE46D-06CB-364A-8678-F123B7961E55}" type="slidenum">
+              <a:rPr lang="en-US" smtClean="0"/>
+              <a:t>13</a:t>
+            </a:fld>
+            <a:endParaRPr lang="en-US"/>
+          </a:p>
+        </p:txBody>
+      </p:sp>
+    </p:spTree>
+    <p:extLst>
+      <p:ext uri="{BB962C8B-B14F-4D97-AF65-F5344CB8AC3E}">
+        <p14:creationId xmlns:p14="http://schemas.microsoft.com/office/powerpoint/2010/main" val="525876384"/>
+      </p:ext>
+    </p:extLst>
+  </p:cSld>
+  <p:clrMapOvr>
+    <a:masterClrMapping/>
+  </p:clrMapOvr>
+</p:notes>
+</file>
+
+<file path=ppt/notesSlides/notesSlide14.xml><?xml version="1.0" encoding="utf-8"?>
+<p:notes xmlns:a="http://schemas.openxmlformats.org/drawingml/2006/main" xmlns:r="http://schemas.openxmlformats.org/officeDocument/2006/relationships" xmlns:p="http://schemas.openxmlformats.org/presentationml/2006/main">
+  <p:cSld>
+    <p:spTree>
+      <p:nvGrpSpPr>
+        <p:cNvPr id="1" name=""/>
+        <p:cNvGrpSpPr/>
+        <p:nvPr/>
+      </p:nvGrpSpPr>
+      <p:grpSpPr>
+        <a:xfrm>
+          <a:off x="0" y="0"/>
+          <a:ext cx="0" cy="0"/>
+          <a:chOff x="0" y="0"/>
+          <a:chExt cx="0" cy="0"/>
+        </a:xfrm>
+      </p:grpSpPr>
+      <p:sp>
+        <p:nvSpPr>
+          <p:cNvPr id="2" name="Slide Image Placeholder 1"/>
+          <p:cNvSpPr>
+            <a:spLocks noGrp="1" noRot="1" noChangeAspect="1"/>
+          </p:cNvSpPr>
+          <p:nvPr>
+            <p:ph type="sldImg"/>
+          </p:nvPr>
+        </p:nvSpPr>
+        <p:spPr/>
+      </p:sp>
+      <p:sp>
+        <p:nvSpPr>
+          <p:cNvPr id="3" name="Notes Placeholder 2"/>
+          <p:cNvSpPr>
+            <a:spLocks noGrp="1"/>
+          </p:cNvSpPr>
+          <p:nvPr>
+            <p:ph type="body" idx="1"/>
+          </p:nvPr>
+        </p:nvSpPr>
+        <p:spPr/>
+        <p:txBody>
+          <a:bodyPr/>
+          <a:lstStyle/>
+          <a:p>
+            <a:r>
+              <a:rPr lang="en-US" dirty="0"/>
+              <a:t>Circle favicon logo with circle background – white letter on color background</a:t>
+            </a:r>
+          </a:p>
+        </p:txBody>
+      </p:sp>
+      <p:sp>
+        <p:nvSpPr>
+          <p:cNvPr id="4" name="Slide Number Placeholder 3"/>
+          <p:cNvSpPr>
+            <a:spLocks noGrp="1"/>
+          </p:cNvSpPr>
+          <p:nvPr>
+            <p:ph type="sldNum" sz="quarter" idx="5"/>
+          </p:nvPr>
+        </p:nvSpPr>
+        <p:spPr/>
+        <p:txBody>
+          <a:bodyPr/>
+          <a:lstStyle/>
+          <a:p>
+            <a:fld id="{37EBE46D-06CB-364A-8678-F123B7961E55}" type="slidenum">
+              <a:rPr lang="en-US" smtClean="0"/>
+              <a:t>14</a:t>
+            </a:fld>
+            <a:endParaRPr lang="en-US"/>
+          </a:p>
+        </p:txBody>
+      </p:sp>
+    </p:spTree>
+    <p:extLst>
+      <p:ext uri="{BB962C8B-B14F-4D97-AF65-F5344CB8AC3E}">
+        <p14:creationId xmlns:p14="http://schemas.microsoft.com/office/powerpoint/2010/main" val="2123230534"/>
+      </p:ext>
+    </p:extLst>
+  </p:cSld>
+  <p:clrMapOvr>
+    <a:masterClrMapping/>
+  </p:clrMapOvr>
+</p:notes>
+</file>
+
+<file path=ppt/notesSlides/notesSlide15.xml><?xml version="1.0" encoding="utf-8"?>
+<p:notes xmlns:a="http://schemas.openxmlformats.org/drawingml/2006/main" xmlns:r="http://schemas.openxmlformats.org/officeDocument/2006/relationships" xmlns:p="http://schemas.openxmlformats.org/presentationml/2006/main">
+  <p:cSld>
+    <p:spTree>
+      <p:nvGrpSpPr>
+        <p:cNvPr id="1" name=""/>
+        <p:cNvGrpSpPr/>
+        <p:nvPr/>
+      </p:nvGrpSpPr>
+      <p:grpSpPr>
+        <a:xfrm>
+          <a:off x="0" y="0"/>
+          <a:ext cx="0" cy="0"/>
+          <a:chOff x="0" y="0"/>
+          <a:chExt cx="0" cy="0"/>
+        </a:xfrm>
+      </p:grpSpPr>
+      <p:sp>
+        <p:nvSpPr>
+          <p:cNvPr id="2" name="Slide Image Placeholder 1"/>
+          <p:cNvSpPr>
+            <a:spLocks noGrp="1" noRot="1" noChangeAspect="1"/>
+          </p:cNvSpPr>
+          <p:nvPr>
+            <p:ph type="sldImg"/>
+          </p:nvPr>
+        </p:nvSpPr>
+        <p:spPr/>
+      </p:sp>
+      <p:sp>
+        <p:nvSpPr>
+          <p:cNvPr id="3" name="Notes Placeholder 2"/>
+          <p:cNvSpPr>
+            <a:spLocks noGrp="1"/>
+          </p:cNvSpPr>
+          <p:nvPr>
+            <p:ph type="body" idx="1"/>
+          </p:nvPr>
+        </p:nvSpPr>
+        <p:spPr/>
+        <p:txBody>
+          <a:bodyPr/>
+          <a:lstStyle/>
+          <a:p>
+            <a:r>
+              <a:rPr lang="en-US" dirty="0"/>
+              <a:t>Circle favicon logo with circle background – black letter on ring background</a:t>
+            </a:r>
+          </a:p>
+        </p:txBody>
+      </p:sp>
+      <p:sp>
+        <p:nvSpPr>
+          <p:cNvPr id="4" name="Slide Number Placeholder 3"/>
+          <p:cNvSpPr>
+            <a:spLocks noGrp="1"/>
+          </p:cNvSpPr>
+          <p:nvPr>
+            <p:ph type="sldNum" sz="quarter" idx="5"/>
+          </p:nvPr>
+        </p:nvSpPr>
+        <p:spPr/>
+        <p:txBody>
+          <a:bodyPr/>
+          <a:lstStyle/>
+          <a:p>
+            <a:fld id="{37EBE46D-06CB-364A-8678-F123B7961E55}" type="slidenum">
+              <a:rPr lang="en-US" smtClean="0"/>
+              <a:t>15</a:t>
+            </a:fld>
+            <a:endParaRPr lang="en-US"/>
+          </a:p>
+        </p:txBody>
+      </p:sp>
+    </p:spTree>
+    <p:extLst>
+      <p:ext uri="{BB962C8B-B14F-4D97-AF65-F5344CB8AC3E}">
+        <p14:creationId xmlns:p14="http://schemas.microsoft.com/office/powerpoint/2010/main" val="2207980552"/>
       </p:ext>
     </p:extLst>
   </p:cSld>
@@ -1298,7 +1758,10 @@
           <a:bodyPr/>
           <a:lstStyle/>
           <a:p>
-            <a:endParaRPr lang="en-US"/>
+            <a:r>
+              <a:rPr lang="en-US" dirty="0"/>
+              <a:t>Full logo with smaller “Technology” font size</a:t>
+            </a:r>
           </a:p>
         </p:txBody>
       </p:sp>
@@ -1328,7 +1791,7 @@
     </p:spTree>
     <p:extLst>
       <p:ext uri="{BB962C8B-B14F-4D97-AF65-F5344CB8AC3E}">
-        <p14:creationId xmlns:p14="http://schemas.microsoft.com/office/powerpoint/2010/main" val="545627361"/>
+        <p14:creationId xmlns:p14="http://schemas.microsoft.com/office/powerpoint/2010/main" val="3417267810"/>
       </p:ext>
     </p:extLst>
   </p:cSld>
@@ -1485,7 +1948,7 @@
           <a:p>
             <a:fld id="{18A9FC8D-95A3-944C-8EC7-78D73130DFAB}" type="datetimeFigureOut">
               <a:rPr lang="en-US" smtClean="0"/>
-              <a:t>4/11/21</a:t>
+              <a:t>4/12/21</a:t>
             </a:fld>
             <a:endParaRPr lang="en-US"/>
           </a:p>
@@ -1683,7 +2146,7 @@
           <a:p>
             <a:fld id="{18A9FC8D-95A3-944C-8EC7-78D73130DFAB}" type="datetimeFigureOut">
               <a:rPr lang="en-US" smtClean="0"/>
-              <a:t>4/11/21</a:t>
+              <a:t>4/12/21</a:t>
             </a:fld>
             <a:endParaRPr lang="en-US"/>
           </a:p>
@@ -1891,7 +2354,7 @@
           <a:p>
             <a:fld id="{18A9FC8D-95A3-944C-8EC7-78D73130DFAB}" type="datetimeFigureOut">
               <a:rPr lang="en-US" smtClean="0"/>
-              <a:t>4/11/21</a:t>
+              <a:t>4/12/21</a:t>
             </a:fld>
             <a:endParaRPr lang="en-US"/>
           </a:p>
@@ -2089,7 +2552,7 @@
           <a:p>
             <a:fld id="{18A9FC8D-95A3-944C-8EC7-78D73130DFAB}" type="datetimeFigureOut">
               <a:rPr lang="en-US" smtClean="0"/>
-              <a:t>4/11/21</a:t>
+              <a:t>4/12/21</a:t>
             </a:fld>
             <a:endParaRPr lang="en-US"/>
           </a:p>
@@ -2364,7 +2827,7 @@
           <a:p>
             <a:fld id="{18A9FC8D-95A3-944C-8EC7-78D73130DFAB}" type="datetimeFigureOut">
               <a:rPr lang="en-US" smtClean="0"/>
-              <a:t>4/11/21</a:t>
+              <a:t>4/12/21</a:t>
             </a:fld>
             <a:endParaRPr lang="en-US"/>
           </a:p>
@@ -2629,7 +3092,7 @@
           <a:p>
             <a:fld id="{18A9FC8D-95A3-944C-8EC7-78D73130DFAB}" type="datetimeFigureOut">
               <a:rPr lang="en-US" smtClean="0"/>
-              <a:t>4/11/21</a:t>
+              <a:t>4/12/21</a:t>
             </a:fld>
             <a:endParaRPr lang="en-US"/>
           </a:p>
@@ -3041,7 +3504,7 @@
           <a:p>
             <a:fld id="{18A9FC8D-95A3-944C-8EC7-78D73130DFAB}" type="datetimeFigureOut">
               <a:rPr lang="en-US" smtClean="0"/>
-              <a:t>4/11/21</a:t>
+              <a:t>4/12/21</a:t>
             </a:fld>
             <a:endParaRPr lang="en-US"/>
           </a:p>
@@ -3182,7 +3645,7 @@
           <a:p>
             <a:fld id="{18A9FC8D-95A3-944C-8EC7-78D73130DFAB}" type="datetimeFigureOut">
               <a:rPr lang="en-US" smtClean="0"/>
-              <a:t>4/11/21</a:t>
+              <a:t>4/12/21</a:t>
             </a:fld>
             <a:endParaRPr lang="en-US"/>
           </a:p>
@@ -3295,7 +3758,7 @@
           <a:p>
             <a:fld id="{18A9FC8D-95A3-944C-8EC7-78D73130DFAB}" type="datetimeFigureOut">
               <a:rPr lang="en-US" smtClean="0"/>
-              <a:t>4/11/21</a:t>
+              <a:t>4/12/21</a:t>
             </a:fld>
             <a:endParaRPr lang="en-US"/>
           </a:p>
@@ -3606,7 +4069,7 @@
           <a:p>
             <a:fld id="{18A9FC8D-95A3-944C-8EC7-78D73130DFAB}" type="datetimeFigureOut">
               <a:rPr lang="en-US" smtClean="0"/>
-              <a:t>4/11/21</a:t>
+              <a:t>4/12/21</a:t>
             </a:fld>
             <a:endParaRPr lang="en-US"/>
           </a:p>
@@ -3894,7 +4357,7 @@
           <a:p>
             <a:fld id="{18A9FC8D-95A3-944C-8EC7-78D73130DFAB}" type="datetimeFigureOut">
               <a:rPr lang="en-US" smtClean="0"/>
-              <a:t>4/11/21</a:t>
+              <a:t>4/12/21</a:t>
             </a:fld>
             <a:endParaRPr lang="en-US"/>
           </a:p>
@@ -4135,7 +4598,7 @@
           <a:p>
             <a:fld id="{18A9FC8D-95A3-944C-8EC7-78D73130DFAB}" type="datetimeFigureOut">
               <a:rPr lang="en-US" smtClean="0"/>
-              <a:t>4/11/21</a:t>
+              <a:t>4/12/21</a:t>
             </a:fld>
             <a:endParaRPr lang="en-US"/>
           </a:p>
@@ -4687,6 +5150,528 @@
       </p:grpSpPr>
       <p:grpSp>
         <p:nvGrpSpPr>
+          <p:cNvPr id="10" name="Group 9">
+            <a:extLst>
+              <a:ext uri="{FF2B5EF4-FFF2-40B4-BE49-F238E27FC236}">
+                <a16:creationId xmlns:a16="http://schemas.microsoft.com/office/drawing/2014/main" id="{8C340DD2-135F-154D-8B9B-748F8DDBC8C2}"/>
+              </a:ext>
+            </a:extLst>
+          </p:cNvPr>
+          <p:cNvGrpSpPr/>
+          <p:nvPr/>
+        </p:nvGrpSpPr>
+        <p:grpSpPr>
+          <a:xfrm>
+            <a:off x="2116667" y="-542043"/>
+            <a:ext cx="7983367" cy="7979790"/>
+            <a:chOff x="2116667" y="-542043"/>
+            <a:chExt cx="7983367" cy="7979790"/>
+          </a:xfrm>
+        </p:grpSpPr>
+        <p:sp>
+          <p:nvSpPr>
+            <p:cNvPr id="7" name="Rectangle 6">
+              <a:extLst>
+                <a:ext uri="{FF2B5EF4-FFF2-40B4-BE49-F238E27FC236}">
+                  <a16:creationId xmlns:a16="http://schemas.microsoft.com/office/drawing/2014/main" id="{5B590B8C-B85E-1646-A15F-7057A156E1AD}"/>
+                </a:ext>
+              </a:extLst>
+            </p:cNvPr>
+            <p:cNvSpPr/>
+            <p:nvPr/>
+          </p:nvSpPr>
+          <p:spPr>
+            <a:xfrm>
+              <a:off x="2116667" y="1151467"/>
+              <a:ext cx="7958666" cy="4555066"/>
+            </a:xfrm>
+            <a:prstGeom prst="rect">
+              <a:avLst/>
+            </a:prstGeom>
+            <a:solidFill>
+              <a:schemeClr val="bg1"/>
+            </a:solidFill>
+            <a:ln>
+              <a:noFill/>
+            </a:ln>
+          </p:spPr>
+          <p:style>
+            <a:lnRef idx="2">
+              <a:schemeClr val="accent1">
+                <a:shade val="50000"/>
+              </a:schemeClr>
+            </a:lnRef>
+            <a:fillRef idx="1">
+              <a:schemeClr val="accent1"/>
+            </a:fillRef>
+            <a:effectRef idx="0">
+              <a:schemeClr val="accent1"/>
+            </a:effectRef>
+            <a:fontRef idx="minor">
+              <a:schemeClr val="lt1"/>
+            </a:fontRef>
+          </p:style>
+          <p:txBody>
+            <a:bodyPr rtlCol="0" anchor="ctr"/>
+            <a:lstStyle/>
+            <a:p>
+              <a:pPr algn="ctr"/>
+              <a:endParaRPr lang="en-US"/>
+            </a:p>
+          </p:txBody>
+        </p:sp>
+        <p:grpSp>
+          <p:nvGrpSpPr>
+            <p:cNvPr id="6" name="Group 5">
+              <a:extLst>
+                <a:ext uri="{FF2B5EF4-FFF2-40B4-BE49-F238E27FC236}">
+                  <a16:creationId xmlns:a16="http://schemas.microsoft.com/office/drawing/2014/main" id="{E6284D55-1065-664D-B764-CF9BE5AF971F}"/>
+                </a:ext>
+              </a:extLst>
+            </p:cNvPr>
+            <p:cNvGrpSpPr/>
+            <p:nvPr/>
+          </p:nvGrpSpPr>
+          <p:grpSpPr>
+            <a:xfrm>
+              <a:off x="7924878" y="1589321"/>
+              <a:ext cx="1368900" cy="3825072"/>
+              <a:chOff x="7924878" y="1589321"/>
+              <a:chExt cx="1368900" cy="3825072"/>
+            </a:xfrm>
+          </p:grpSpPr>
+          <p:sp>
+            <p:nvSpPr>
+              <p:cNvPr id="4" name="Oval 3">
+                <a:extLst>
+                  <a:ext uri="{FF2B5EF4-FFF2-40B4-BE49-F238E27FC236}">
+                    <a16:creationId xmlns:a16="http://schemas.microsoft.com/office/drawing/2014/main" id="{9A6DA34C-F484-5E43-BB32-A3AEB809FFC8}"/>
+                  </a:ext>
+                </a:extLst>
+              </p:cNvPr>
+              <p:cNvSpPr/>
+              <p:nvPr/>
+            </p:nvSpPr>
+            <p:spPr>
+              <a:xfrm rot="811608">
+                <a:off x="7968996" y="1589321"/>
+                <a:ext cx="1324782" cy="3825072"/>
+              </a:xfrm>
+              <a:prstGeom prst="ellipse">
+                <a:avLst/>
+              </a:prstGeom>
+              <a:gradFill flip="none" rotWithShape="1">
+                <a:gsLst>
+                  <a:gs pos="42000">
+                    <a:schemeClr val="bg2">
+                      <a:lumMod val="50000"/>
+                    </a:schemeClr>
+                  </a:gs>
+                  <a:gs pos="83000">
+                    <a:srgbClr val="006688"/>
+                  </a:gs>
+                  <a:gs pos="100000">
+                    <a:srgbClr val="0066CC">
+                      <a:shade val="100000"/>
+                      <a:satMod val="115000"/>
+                    </a:srgbClr>
+                  </a:gs>
+                </a:gsLst>
+                <a:lin ang="18900000" scaled="1"/>
+                <a:tileRect/>
+              </a:gradFill>
+            </p:spPr>
+            <p:style>
+              <a:lnRef idx="2">
+                <a:schemeClr val="accent1">
+                  <a:shade val="50000"/>
+                </a:schemeClr>
+              </a:lnRef>
+              <a:fillRef idx="1">
+                <a:schemeClr val="accent1"/>
+              </a:fillRef>
+              <a:effectRef idx="0">
+                <a:schemeClr val="accent1"/>
+              </a:effectRef>
+              <a:fontRef idx="minor">
+                <a:schemeClr val="lt1"/>
+              </a:fontRef>
+            </p:style>
+            <p:txBody>
+              <a:bodyPr rtlCol="0" anchor="ctr"/>
+              <a:lstStyle/>
+              <a:p>
+                <a:pPr algn="ctr"/>
+                <a:endParaRPr lang="en-US"/>
+              </a:p>
+            </p:txBody>
+          </p:sp>
+          <p:sp>
+            <p:nvSpPr>
+              <p:cNvPr id="5" name="Oval 4">
+                <a:extLst>
+                  <a:ext uri="{FF2B5EF4-FFF2-40B4-BE49-F238E27FC236}">
+                    <a16:creationId xmlns:a16="http://schemas.microsoft.com/office/drawing/2014/main" id="{4223DED6-A217-3A44-AEBB-7F223EF01681}"/>
+                  </a:ext>
+                </a:extLst>
+              </p:cNvPr>
+              <p:cNvSpPr/>
+              <p:nvPr/>
+            </p:nvSpPr>
+            <p:spPr>
+              <a:xfrm rot="811608">
+                <a:off x="7924878" y="1981277"/>
+                <a:ext cx="1062463" cy="3067676"/>
+              </a:xfrm>
+              <a:prstGeom prst="ellipse">
+                <a:avLst/>
+              </a:prstGeom>
+              <a:solidFill>
+                <a:schemeClr val="bg1"/>
+              </a:solidFill>
+              <a:ln>
+                <a:noFill/>
+              </a:ln>
+            </p:spPr>
+            <p:style>
+              <a:lnRef idx="2">
+                <a:schemeClr val="accent1">
+                  <a:shade val="50000"/>
+                </a:schemeClr>
+              </a:lnRef>
+              <a:fillRef idx="1">
+                <a:schemeClr val="accent1"/>
+              </a:fillRef>
+              <a:effectRef idx="0">
+                <a:schemeClr val="accent1"/>
+              </a:effectRef>
+              <a:fontRef idx="minor">
+                <a:schemeClr val="lt1"/>
+              </a:fontRef>
+            </p:style>
+            <p:txBody>
+              <a:bodyPr rtlCol="0" anchor="ctr"/>
+              <a:lstStyle/>
+              <a:p>
+                <a:pPr algn="ctr"/>
+                <a:endParaRPr lang="en-US">
+                  <a:solidFill>
+                    <a:schemeClr val="bg1"/>
+                  </a:solidFill>
+                </a:endParaRPr>
+              </a:p>
+            </p:txBody>
+          </p:sp>
+        </p:grpSp>
+        <p:pic>
+          <p:nvPicPr>
+            <p:cNvPr id="3" name="Picture 2" descr="Shape&#10;&#10;Description automatically generated with low confidence">
+              <a:extLst>
+                <a:ext uri="{FF2B5EF4-FFF2-40B4-BE49-F238E27FC236}">
+                  <a16:creationId xmlns:a16="http://schemas.microsoft.com/office/drawing/2014/main" id="{C64C3AB6-55A9-354F-9E5E-ABF781319754}"/>
+                </a:ext>
+              </a:extLst>
+            </p:cNvPr>
+            <p:cNvPicPr>
+              <a:picLocks noChangeAspect="1"/>
+            </p:cNvPicPr>
+            <p:nvPr/>
+          </p:nvPicPr>
+          <p:blipFill>
+            <a:blip r:embed="rId3"/>
+            <a:stretch>
+              <a:fillRect/>
+            </a:stretch>
+          </p:blipFill>
+          <p:spPr>
+            <a:xfrm>
+              <a:off x="2120244" y="-542043"/>
+              <a:ext cx="7979790" cy="7979790"/>
+            </a:xfrm>
+            <a:prstGeom prst="rect">
+              <a:avLst/>
+            </a:prstGeom>
+          </p:spPr>
+        </p:pic>
+      </p:grpSp>
+    </p:spTree>
+    <p:extLst>
+      <p:ext uri="{BB962C8B-B14F-4D97-AF65-F5344CB8AC3E}">
+        <p14:creationId xmlns:p14="http://schemas.microsoft.com/office/powerpoint/2010/main" val="566390578"/>
+      </p:ext>
+    </p:extLst>
+  </p:cSld>
+  <p:clrMapOvr>
+    <a:masterClrMapping/>
+  </p:clrMapOvr>
+</p:sld>
+</file>
+
+<file path=ppt/slides/slide11.xml><?xml version="1.0" encoding="utf-8"?>
+<p:sld xmlns:a="http://schemas.openxmlformats.org/drawingml/2006/main" xmlns:r="http://schemas.openxmlformats.org/officeDocument/2006/relationships" xmlns:p="http://schemas.openxmlformats.org/presentationml/2006/main">
+  <p:cSld>
+    <p:spTree>
+      <p:nvGrpSpPr>
+        <p:cNvPr id="1" name=""/>
+        <p:cNvGrpSpPr/>
+        <p:nvPr/>
+      </p:nvGrpSpPr>
+      <p:grpSpPr>
+        <a:xfrm>
+          <a:off x="0" y="0"/>
+          <a:ext cx="0" cy="0"/>
+          <a:chOff x="0" y="0"/>
+          <a:chExt cx="0" cy="0"/>
+        </a:xfrm>
+      </p:grpSpPr>
+      <p:grpSp>
+        <p:nvGrpSpPr>
+          <p:cNvPr id="8" name="Group 7">
+            <a:extLst>
+              <a:ext uri="{FF2B5EF4-FFF2-40B4-BE49-F238E27FC236}">
+                <a16:creationId xmlns:a16="http://schemas.microsoft.com/office/drawing/2014/main" id="{283BF5BF-F103-784D-9B1B-270C718E7A9D}"/>
+              </a:ext>
+            </a:extLst>
+          </p:cNvPr>
+          <p:cNvGrpSpPr/>
+          <p:nvPr/>
+        </p:nvGrpSpPr>
+        <p:grpSpPr>
+          <a:xfrm>
+            <a:off x="3640667" y="973667"/>
+            <a:ext cx="4910666" cy="4910666"/>
+            <a:chOff x="3640667" y="973667"/>
+            <a:chExt cx="4910666" cy="4910666"/>
+          </a:xfrm>
+        </p:grpSpPr>
+        <p:sp>
+          <p:nvSpPr>
+            <p:cNvPr id="2" name="Rectangle 1">
+              <a:extLst>
+                <a:ext uri="{FF2B5EF4-FFF2-40B4-BE49-F238E27FC236}">
+                  <a16:creationId xmlns:a16="http://schemas.microsoft.com/office/drawing/2014/main" id="{59892156-1CAA-DE43-8EC1-9F571399ED33}"/>
+                </a:ext>
+              </a:extLst>
+            </p:cNvPr>
+            <p:cNvSpPr/>
+            <p:nvPr/>
+          </p:nvSpPr>
+          <p:spPr>
+            <a:xfrm>
+              <a:off x="3640667" y="973667"/>
+              <a:ext cx="4910666" cy="4910666"/>
+            </a:xfrm>
+            <a:prstGeom prst="rect">
+              <a:avLst/>
+            </a:prstGeom>
+            <a:solidFill>
+              <a:schemeClr val="bg1"/>
+            </a:solidFill>
+            <a:ln>
+              <a:noFill/>
+            </a:ln>
+          </p:spPr>
+          <p:style>
+            <a:lnRef idx="2">
+              <a:schemeClr val="accent1">
+                <a:shade val="50000"/>
+              </a:schemeClr>
+            </a:lnRef>
+            <a:fillRef idx="1">
+              <a:schemeClr val="accent1"/>
+            </a:fillRef>
+            <a:effectRef idx="0">
+              <a:schemeClr val="accent1"/>
+            </a:effectRef>
+            <a:fontRef idx="minor">
+              <a:schemeClr val="lt1"/>
+            </a:fontRef>
+          </p:style>
+          <p:txBody>
+            <a:bodyPr rtlCol="0" anchor="ctr"/>
+            <a:lstStyle/>
+            <a:p>
+              <a:pPr algn="ctr"/>
+              <a:endParaRPr lang="en-US"/>
+            </a:p>
+          </p:txBody>
+        </p:sp>
+        <p:grpSp>
+          <p:nvGrpSpPr>
+            <p:cNvPr id="7" name="Group 6">
+              <a:extLst>
+                <a:ext uri="{FF2B5EF4-FFF2-40B4-BE49-F238E27FC236}">
+                  <a16:creationId xmlns:a16="http://schemas.microsoft.com/office/drawing/2014/main" id="{1D99D7E9-DE8B-A04A-860C-1D6A5A83FFDF}"/>
+                </a:ext>
+              </a:extLst>
+            </p:cNvPr>
+            <p:cNvGrpSpPr/>
+            <p:nvPr/>
+          </p:nvGrpSpPr>
+          <p:grpSpPr>
+            <a:xfrm>
+              <a:off x="5411550" y="1516464"/>
+              <a:ext cx="1368900" cy="3825072"/>
+              <a:chOff x="5389492" y="1666008"/>
+              <a:chExt cx="1368900" cy="3825072"/>
+            </a:xfrm>
+          </p:grpSpPr>
+          <p:sp>
+            <p:nvSpPr>
+              <p:cNvPr id="4" name="Oval 3">
+                <a:extLst>
+                  <a:ext uri="{FF2B5EF4-FFF2-40B4-BE49-F238E27FC236}">
+                    <a16:creationId xmlns:a16="http://schemas.microsoft.com/office/drawing/2014/main" id="{9A6DA34C-F484-5E43-BB32-A3AEB809FFC8}"/>
+                  </a:ext>
+                </a:extLst>
+              </p:cNvPr>
+              <p:cNvSpPr/>
+              <p:nvPr/>
+            </p:nvSpPr>
+            <p:spPr>
+              <a:xfrm rot="811608">
+                <a:off x="5433610" y="1666008"/>
+                <a:ext cx="1324782" cy="3825072"/>
+              </a:xfrm>
+              <a:prstGeom prst="ellipse">
+                <a:avLst/>
+              </a:prstGeom>
+              <a:gradFill flip="none" rotWithShape="1">
+                <a:gsLst>
+                  <a:gs pos="42000">
+                    <a:schemeClr val="bg2">
+                      <a:lumMod val="50000"/>
+                    </a:schemeClr>
+                  </a:gs>
+                  <a:gs pos="83000">
+                    <a:srgbClr val="006688"/>
+                  </a:gs>
+                  <a:gs pos="100000">
+                    <a:srgbClr val="0066CC">
+                      <a:shade val="100000"/>
+                      <a:satMod val="115000"/>
+                    </a:srgbClr>
+                  </a:gs>
+                </a:gsLst>
+                <a:lin ang="18900000" scaled="1"/>
+                <a:tileRect/>
+              </a:gradFill>
+            </p:spPr>
+            <p:style>
+              <a:lnRef idx="2">
+                <a:schemeClr val="accent1">
+                  <a:shade val="50000"/>
+                </a:schemeClr>
+              </a:lnRef>
+              <a:fillRef idx="1">
+                <a:schemeClr val="accent1"/>
+              </a:fillRef>
+              <a:effectRef idx="0">
+                <a:schemeClr val="accent1"/>
+              </a:effectRef>
+              <a:fontRef idx="minor">
+                <a:schemeClr val="lt1"/>
+              </a:fontRef>
+            </p:style>
+            <p:txBody>
+              <a:bodyPr rtlCol="0" anchor="ctr"/>
+              <a:lstStyle/>
+              <a:p>
+                <a:pPr algn="ctr"/>
+                <a:endParaRPr lang="en-US"/>
+              </a:p>
+            </p:txBody>
+          </p:sp>
+          <p:sp>
+            <p:nvSpPr>
+              <p:cNvPr id="5" name="Oval 4">
+                <a:extLst>
+                  <a:ext uri="{FF2B5EF4-FFF2-40B4-BE49-F238E27FC236}">
+                    <a16:creationId xmlns:a16="http://schemas.microsoft.com/office/drawing/2014/main" id="{4223DED6-A217-3A44-AEBB-7F223EF01681}"/>
+                  </a:ext>
+                </a:extLst>
+              </p:cNvPr>
+              <p:cNvSpPr/>
+              <p:nvPr/>
+            </p:nvSpPr>
+            <p:spPr>
+              <a:xfrm rot="811608">
+                <a:off x="5389492" y="2057964"/>
+                <a:ext cx="1062463" cy="3067676"/>
+              </a:xfrm>
+              <a:prstGeom prst="ellipse">
+                <a:avLst/>
+              </a:prstGeom>
+              <a:solidFill>
+                <a:schemeClr val="bg1"/>
+              </a:solidFill>
+              <a:ln>
+                <a:noFill/>
+              </a:ln>
+            </p:spPr>
+            <p:style>
+              <a:lnRef idx="2">
+                <a:schemeClr val="accent1">
+                  <a:shade val="50000"/>
+                </a:schemeClr>
+              </a:lnRef>
+              <a:fillRef idx="1">
+                <a:schemeClr val="accent1"/>
+              </a:fillRef>
+              <a:effectRef idx="0">
+                <a:schemeClr val="accent1"/>
+              </a:effectRef>
+              <a:fontRef idx="minor">
+                <a:schemeClr val="lt1"/>
+              </a:fontRef>
+            </p:style>
+            <p:txBody>
+              <a:bodyPr rtlCol="0" anchor="ctr"/>
+              <a:lstStyle/>
+              <a:p>
+                <a:pPr algn="ctr"/>
+                <a:endParaRPr lang="en-US">
+                  <a:solidFill>
+                    <a:schemeClr val="bg1"/>
+                  </a:solidFill>
+                </a:endParaRPr>
+              </a:p>
+            </p:txBody>
+          </p:sp>
+        </p:grpSp>
+      </p:grpSp>
+    </p:spTree>
+    <p:extLst>
+      <p:ext uri="{BB962C8B-B14F-4D97-AF65-F5344CB8AC3E}">
+        <p14:creationId xmlns:p14="http://schemas.microsoft.com/office/powerpoint/2010/main" val="3766700309"/>
+      </p:ext>
+    </p:extLst>
+  </p:cSld>
+  <p:clrMapOvr>
+    <a:masterClrMapping/>
+  </p:clrMapOvr>
+</p:sld>
+</file>
+
+<file path=ppt/slides/slide12.xml><?xml version="1.0" encoding="utf-8"?>
+<p:sld xmlns:a="http://schemas.openxmlformats.org/drawingml/2006/main" xmlns:r="http://schemas.openxmlformats.org/officeDocument/2006/relationships" xmlns:p="http://schemas.openxmlformats.org/presentationml/2006/main">
+  <p:cSld>
+    <p:spTree>
+      <p:nvGrpSpPr>
+        <p:cNvPr id="1" name=""/>
+        <p:cNvGrpSpPr/>
+        <p:nvPr/>
+      </p:nvGrpSpPr>
+      <p:grpSpPr>
+        <a:xfrm>
+          <a:off x="0" y="0"/>
+          <a:ext cx="0" cy="0"/>
+          <a:chOff x="0" y="0"/>
+          <a:chExt cx="0" cy="0"/>
+        </a:xfrm>
+      </p:grpSpPr>
+      <p:grpSp>
+        <p:nvGrpSpPr>
           <p:cNvPr id="3" name="Group 2">
             <a:extLst>
               <a:ext uri="{FF2B5EF4-FFF2-40B4-BE49-F238E27FC236}">
@@ -4905,6 +5890,860 @@
     <p:extLst>
       <p:ext uri="{BB962C8B-B14F-4D97-AF65-F5344CB8AC3E}">
         <p14:creationId xmlns:p14="http://schemas.microsoft.com/office/powerpoint/2010/main" val="4148838857"/>
+      </p:ext>
+    </p:extLst>
+  </p:cSld>
+  <p:clrMapOvr>
+    <a:masterClrMapping/>
+  </p:clrMapOvr>
+</p:sld>
+</file>
+
+<file path=ppt/slides/slide13.xml><?xml version="1.0" encoding="utf-8"?>
+<p:sld xmlns:a="http://schemas.openxmlformats.org/drawingml/2006/main" xmlns:r="http://schemas.openxmlformats.org/officeDocument/2006/relationships" xmlns:p="http://schemas.openxmlformats.org/presentationml/2006/main">
+  <p:cSld>
+    <p:spTree>
+      <p:nvGrpSpPr>
+        <p:cNvPr id="1" name=""/>
+        <p:cNvGrpSpPr/>
+        <p:nvPr/>
+      </p:nvGrpSpPr>
+      <p:grpSpPr>
+        <a:xfrm>
+          <a:off x="0" y="0"/>
+          <a:ext cx="0" cy="0"/>
+          <a:chOff x="0" y="0"/>
+          <a:chExt cx="0" cy="0"/>
+        </a:xfrm>
+      </p:grpSpPr>
+      <p:sp>
+        <p:nvSpPr>
+          <p:cNvPr id="6" name="Oval 5">
+            <a:extLst>
+              <a:ext uri="{FF2B5EF4-FFF2-40B4-BE49-F238E27FC236}">
+                <a16:creationId xmlns:a16="http://schemas.microsoft.com/office/drawing/2014/main" id="{1945A6E5-9E86-5B47-987D-996F1E0EA71A}"/>
+              </a:ext>
+            </a:extLst>
+          </p:cNvPr>
+          <p:cNvSpPr/>
+          <p:nvPr/>
+        </p:nvSpPr>
+        <p:spPr>
+          <a:xfrm>
+            <a:off x="3914503" y="1247503"/>
+            <a:ext cx="4362994" cy="4362994"/>
+          </a:xfrm>
+          <a:prstGeom prst="ellipse">
+            <a:avLst/>
+          </a:prstGeom>
+          <a:solidFill>
+            <a:schemeClr val="bg1"/>
+          </a:solidFill>
+          <a:ln>
+            <a:noFill/>
+          </a:ln>
+        </p:spPr>
+        <p:style>
+          <a:lnRef idx="2">
+            <a:schemeClr val="accent1">
+              <a:shade val="50000"/>
+            </a:schemeClr>
+          </a:lnRef>
+          <a:fillRef idx="1">
+            <a:schemeClr val="accent1"/>
+          </a:fillRef>
+          <a:effectRef idx="0">
+            <a:schemeClr val="accent1"/>
+          </a:effectRef>
+          <a:fontRef idx="minor">
+            <a:schemeClr val="lt1"/>
+          </a:fontRef>
+        </p:style>
+        <p:txBody>
+          <a:bodyPr rtlCol="0" anchor="ctr"/>
+          <a:lstStyle/>
+          <a:p>
+            <a:pPr algn="ctr"/>
+            <a:endParaRPr lang="en-US"/>
+          </a:p>
+        </p:txBody>
+      </p:sp>
+      <p:grpSp>
+        <p:nvGrpSpPr>
+          <p:cNvPr id="7" name="Group 6">
+            <a:extLst>
+              <a:ext uri="{FF2B5EF4-FFF2-40B4-BE49-F238E27FC236}">
+                <a16:creationId xmlns:a16="http://schemas.microsoft.com/office/drawing/2014/main" id="{1D99D7E9-DE8B-A04A-860C-1D6A5A83FFDF}"/>
+              </a:ext>
+            </a:extLst>
+          </p:cNvPr>
+          <p:cNvGrpSpPr/>
+          <p:nvPr/>
+        </p:nvGrpSpPr>
+        <p:grpSpPr>
+          <a:xfrm>
+            <a:off x="4185160" y="1516465"/>
+            <a:ext cx="3821682" cy="3825072"/>
+            <a:chOff x="4163102" y="1666009"/>
+            <a:chExt cx="3821682" cy="3825072"/>
+          </a:xfrm>
+        </p:grpSpPr>
+        <p:sp>
+          <p:nvSpPr>
+            <p:cNvPr id="4" name="Oval 3">
+              <a:extLst>
+                <a:ext uri="{FF2B5EF4-FFF2-40B4-BE49-F238E27FC236}">
+                  <a16:creationId xmlns:a16="http://schemas.microsoft.com/office/drawing/2014/main" id="{9A6DA34C-F484-5E43-BB32-A3AEB809FFC8}"/>
+                </a:ext>
+              </a:extLst>
+            </p:cNvPr>
+            <p:cNvSpPr/>
+            <p:nvPr/>
+          </p:nvSpPr>
+          <p:spPr>
+            <a:xfrm rot="164111">
+              <a:off x="4163102" y="1666009"/>
+              <a:ext cx="3821682" cy="3825072"/>
+            </a:xfrm>
+            <a:prstGeom prst="ellipse">
+              <a:avLst/>
+            </a:prstGeom>
+            <a:gradFill flip="none" rotWithShape="1">
+              <a:gsLst>
+                <a:gs pos="29000">
+                  <a:schemeClr val="bg2">
+                    <a:lumMod val="50000"/>
+                  </a:schemeClr>
+                </a:gs>
+                <a:gs pos="69000">
+                  <a:srgbClr val="006688"/>
+                </a:gs>
+                <a:gs pos="100000">
+                  <a:srgbClr val="0066CC">
+                    <a:shade val="100000"/>
+                    <a:satMod val="115000"/>
+                  </a:srgbClr>
+                </a:gs>
+              </a:gsLst>
+              <a:lin ang="18900000" scaled="1"/>
+              <a:tileRect/>
+            </a:gradFill>
+          </p:spPr>
+          <p:style>
+            <a:lnRef idx="2">
+              <a:schemeClr val="accent1">
+                <a:shade val="50000"/>
+              </a:schemeClr>
+            </a:lnRef>
+            <a:fillRef idx="1">
+              <a:schemeClr val="accent1"/>
+            </a:fillRef>
+            <a:effectRef idx="0">
+              <a:schemeClr val="accent1"/>
+            </a:effectRef>
+            <a:fontRef idx="minor">
+              <a:schemeClr val="lt1"/>
+            </a:fontRef>
+          </p:style>
+          <p:txBody>
+            <a:bodyPr rtlCol="0" anchor="ctr"/>
+            <a:lstStyle/>
+            <a:p>
+              <a:pPr algn="ctr"/>
+              <a:endParaRPr lang="en-US" b="1"/>
+            </a:p>
+          </p:txBody>
+        </p:sp>
+        <p:sp>
+          <p:nvSpPr>
+            <p:cNvPr id="5" name="Oval 4">
+              <a:extLst>
+                <a:ext uri="{FF2B5EF4-FFF2-40B4-BE49-F238E27FC236}">
+                  <a16:creationId xmlns:a16="http://schemas.microsoft.com/office/drawing/2014/main" id="{4223DED6-A217-3A44-AEBB-7F223EF01681}"/>
+                </a:ext>
+              </a:extLst>
+            </p:cNvPr>
+            <p:cNvSpPr/>
+            <p:nvPr/>
+          </p:nvSpPr>
+          <p:spPr>
+            <a:xfrm>
+              <a:off x="4944152" y="2445679"/>
+              <a:ext cx="2259582" cy="2265732"/>
+            </a:xfrm>
+            <a:prstGeom prst="ellipse">
+              <a:avLst/>
+            </a:prstGeom>
+            <a:solidFill>
+              <a:schemeClr val="bg1"/>
+            </a:solidFill>
+            <a:ln>
+              <a:noFill/>
+            </a:ln>
+          </p:spPr>
+          <p:style>
+            <a:lnRef idx="2">
+              <a:schemeClr val="accent1">
+                <a:shade val="50000"/>
+              </a:schemeClr>
+            </a:lnRef>
+            <a:fillRef idx="1">
+              <a:schemeClr val="accent1"/>
+            </a:fillRef>
+            <a:effectRef idx="0">
+              <a:schemeClr val="accent1"/>
+            </a:effectRef>
+            <a:fontRef idx="minor">
+              <a:schemeClr val="lt1"/>
+            </a:fontRef>
+          </p:style>
+          <p:txBody>
+            <a:bodyPr rtlCol="0" anchor="ctr"/>
+            <a:lstStyle/>
+            <a:p>
+              <a:pPr algn="ctr"/>
+              <a:endParaRPr lang="en-US" b="1" dirty="0">
+                <a:solidFill>
+                  <a:schemeClr val="bg1"/>
+                </a:solidFill>
+              </a:endParaRPr>
+            </a:p>
+          </p:txBody>
+        </p:sp>
+      </p:grpSp>
+    </p:spTree>
+    <p:extLst>
+      <p:ext uri="{BB962C8B-B14F-4D97-AF65-F5344CB8AC3E}">
+        <p14:creationId xmlns:p14="http://schemas.microsoft.com/office/powerpoint/2010/main" val="740649760"/>
+      </p:ext>
+    </p:extLst>
+  </p:cSld>
+  <p:clrMapOvr>
+    <a:masterClrMapping/>
+  </p:clrMapOvr>
+</p:sld>
+</file>
+
+<file path=ppt/slides/slide14.xml><?xml version="1.0" encoding="utf-8"?>
+<p:sld xmlns:a="http://schemas.openxmlformats.org/drawingml/2006/main" xmlns:r="http://schemas.openxmlformats.org/officeDocument/2006/relationships" xmlns:p="http://schemas.openxmlformats.org/presentationml/2006/main">
+  <p:cSld>
+    <p:spTree>
+      <p:nvGrpSpPr>
+        <p:cNvPr id="1" name=""/>
+        <p:cNvGrpSpPr/>
+        <p:nvPr/>
+      </p:nvGrpSpPr>
+      <p:grpSpPr>
+        <a:xfrm>
+          <a:off x="0" y="0"/>
+          <a:ext cx="0" cy="0"/>
+          <a:chOff x="0" y="0"/>
+          <a:chExt cx="0" cy="0"/>
+        </a:xfrm>
+      </p:grpSpPr>
+      <p:grpSp>
+        <p:nvGrpSpPr>
+          <p:cNvPr id="19" name="Group 18">
+            <a:extLst>
+              <a:ext uri="{FF2B5EF4-FFF2-40B4-BE49-F238E27FC236}">
+                <a16:creationId xmlns:a16="http://schemas.microsoft.com/office/drawing/2014/main" id="{45130B10-44CB-B34D-927C-F154AAAEEBD2}"/>
+              </a:ext>
+            </a:extLst>
+          </p:cNvPr>
+          <p:cNvGrpSpPr/>
+          <p:nvPr/>
+        </p:nvGrpSpPr>
+        <p:grpSpPr>
+          <a:xfrm>
+            <a:off x="2319144" y="180927"/>
+            <a:ext cx="7560352" cy="6509398"/>
+            <a:chOff x="2319144" y="180927"/>
+            <a:chExt cx="7560352" cy="6509398"/>
+          </a:xfrm>
+        </p:grpSpPr>
+        <p:sp>
+          <p:nvSpPr>
+            <p:cNvPr id="18" name="Oval 17">
+              <a:extLst>
+                <a:ext uri="{FF2B5EF4-FFF2-40B4-BE49-F238E27FC236}">
+                  <a16:creationId xmlns:a16="http://schemas.microsoft.com/office/drawing/2014/main" id="{693F6FFC-78A5-7C48-9E12-E6614469271E}"/>
+                </a:ext>
+              </a:extLst>
+            </p:cNvPr>
+            <p:cNvSpPr/>
+            <p:nvPr/>
+          </p:nvSpPr>
+          <p:spPr>
+            <a:xfrm>
+              <a:off x="3914505" y="1254131"/>
+              <a:ext cx="4362994" cy="4362994"/>
+            </a:xfrm>
+            <a:prstGeom prst="ellipse">
+              <a:avLst/>
+            </a:prstGeom>
+            <a:solidFill>
+              <a:schemeClr val="bg1"/>
+            </a:solidFill>
+            <a:ln>
+              <a:noFill/>
+            </a:ln>
+          </p:spPr>
+          <p:style>
+            <a:lnRef idx="2">
+              <a:schemeClr val="accent1">
+                <a:shade val="50000"/>
+              </a:schemeClr>
+            </a:lnRef>
+            <a:fillRef idx="1">
+              <a:schemeClr val="accent1"/>
+            </a:fillRef>
+            <a:effectRef idx="0">
+              <a:schemeClr val="accent1"/>
+            </a:effectRef>
+            <a:fontRef idx="minor">
+              <a:schemeClr val="lt1"/>
+            </a:fontRef>
+          </p:style>
+          <p:txBody>
+            <a:bodyPr rtlCol="0" anchor="ctr"/>
+            <a:lstStyle/>
+            <a:p>
+              <a:pPr algn="ctr"/>
+              <a:endParaRPr lang="en-US"/>
+            </a:p>
+          </p:txBody>
+        </p:sp>
+        <p:grpSp>
+          <p:nvGrpSpPr>
+            <p:cNvPr id="17" name="Group 16">
+              <a:extLst>
+                <a:ext uri="{FF2B5EF4-FFF2-40B4-BE49-F238E27FC236}">
+                  <a16:creationId xmlns:a16="http://schemas.microsoft.com/office/drawing/2014/main" id="{6F1B7A80-57E9-6447-ADDB-0DEA019F6876}"/>
+                </a:ext>
+              </a:extLst>
+            </p:cNvPr>
+            <p:cNvGrpSpPr/>
+            <p:nvPr/>
+          </p:nvGrpSpPr>
+          <p:grpSpPr>
+            <a:xfrm>
+              <a:off x="2319144" y="180927"/>
+              <a:ext cx="7560352" cy="6509398"/>
+              <a:chOff x="2319144" y="180927"/>
+              <a:chExt cx="7560352" cy="6509398"/>
+            </a:xfrm>
+          </p:grpSpPr>
+          <p:sp>
+            <p:nvSpPr>
+              <p:cNvPr id="6" name="Oval 5">
+                <a:extLst>
+                  <a:ext uri="{FF2B5EF4-FFF2-40B4-BE49-F238E27FC236}">
+                    <a16:creationId xmlns:a16="http://schemas.microsoft.com/office/drawing/2014/main" id="{1945A6E5-9E86-5B47-987D-996F1E0EA71A}"/>
+                  </a:ext>
+                </a:extLst>
+              </p:cNvPr>
+              <p:cNvSpPr/>
+              <p:nvPr/>
+            </p:nvSpPr>
+            <p:spPr>
+              <a:xfrm>
+                <a:off x="3914503" y="1247503"/>
+                <a:ext cx="4362994" cy="4362994"/>
+              </a:xfrm>
+              <a:prstGeom prst="ellipse">
+                <a:avLst/>
+              </a:prstGeom>
+              <a:solidFill>
+                <a:schemeClr val="bg1"/>
+              </a:solidFill>
+              <a:ln>
+                <a:noFill/>
+              </a:ln>
+            </p:spPr>
+            <p:style>
+              <a:lnRef idx="2">
+                <a:schemeClr val="accent1">
+                  <a:shade val="50000"/>
+                </a:schemeClr>
+              </a:lnRef>
+              <a:fillRef idx="1">
+                <a:schemeClr val="accent1"/>
+              </a:fillRef>
+              <a:effectRef idx="0">
+                <a:schemeClr val="accent1"/>
+              </a:effectRef>
+              <a:fontRef idx="minor">
+                <a:schemeClr val="lt1"/>
+              </a:fontRef>
+            </p:style>
+            <p:txBody>
+              <a:bodyPr rtlCol="0" anchor="ctr"/>
+              <a:lstStyle/>
+              <a:p>
+                <a:pPr algn="ctr"/>
+                <a:endParaRPr lang="en-US"/>
+              </a:p>
+            </p:txBody>
+          </p:sp>
+          <p:sp>
+            <p:nvSpPr>
+              <p:cNvPr id="4" name="Oval 3">
+                <a:extLst>
+                  <a:ext uri="{FF2B5EF4-FFF2-40B4-BE49-F238E27FC236}">
+                    <a16:creationId xmlns:a16="http://schemas.microsoft.com/office/drawing/2014/main" id="{9A6DA34C-F484-5E43-BB32-A3AEB809FFC8}"/>
+                  </a:ext>
+                </a:extLst>
+              </p:cNvPr>
+              <p:cNvSpPr/>
+              <p:nvPr/>
+            </p:nvSpPr>
+            <p:spPr>
+              <a:xfrm rot="164111">
+                <a:off x="4185160" y="1516465"/>
+                <a:ext cx="3821682" cy="3825072"/>
+              </a:xfrm>
+              <a:prstGeom prst="ellipse">
+                <a:avLst/>
+              </a:prstGeom>
+              <a:gradFill flip="none" rotWithShape="1">
+                <a:gsLst>
+                  <a:gs pos="29000">
+                    <a:schemeClr val="bg2">
+                      <a:lumMod val="50000"/>
+                    </a:schemeClr>
+                  </a:gs>
+                  <a:gs pos="69000">
+                    <a:srgbClr val="006688"/>
+                  </a:gs>
+                  <a:gs pos="100000">
+                    <a:srgbClr val="0066CC">
+                      <a:shade val="100000"/>
+                      <a:satMod val="115000"/>
+                    </a:srgbClr>
+                  </a:gs>
+                </a:gsLst>
+                <a:lin ang="18900000" scaled="1"/>
+                <a:tileRect/>
+              </a:gradFill>
+            </p:spPr>
+            <p:style>
+              <a:lnRef idx="2">
+                <a:schemeClr val="accent1">
+                  <a:shade val="50000"/>
+                </a:schemeClr>
+              </a:lnRef>
+              <a:fillRef idx="1">
+                <a:schemeClr val="accent1"/>
+              </a:fillRef>
+              <a:effectRef idx="0">
+                <a:schemeClr val="accent1"/>
+              </a:effectRef>
+              <a:fontRef idx="minor">
+                <a:schemeClr val="lt1"/>
+              </a:fontRef>
+            </p:style>
+            <p:txBody>
+              <a:bodyPr rtlCol="0" anchor="ctr"/>
+              <a:lstStyle/>
+              <a:p>
+                <a:pPr algn="ctr"/>
+                <a:endParaRPr lang="en-US" b="1"/>
+              </a:p>
+            </p:txBody>
+          </p:sp>
+          <p:grpSp>
+            <p:nvGrpSpPr>
+              <p:cNvPr id="13" name="Group 12">
+                <a:extLst>
+                  <a:ext uri="{FF2B5EF4-FFF2-40B4-BE49-F238E27FC236}">
+                    <a16:creationId xmlns:a16="http://schemas.microsoft.com/office/drawing/2014/main" id="{9EE6F499-4A0A-954F-AA2C-AD60F071681B}"/>
+                  </a:ext>
+                </a:extLst>
+              </p:cNvPr>
+              <p:cNvGrpSpPr/>
+              <p:nvPr/>
+            </p:nvGrpSpPr>
+            <p:grpSpPr>
+              <a:xfrm>
+                <a:off x="2319144" y="180927"/>
+                <a:ext cx="7560352" cy="6509398"/>
+                <a:chOff x="3821876" y="1479550"/>
+                <a:chExt cx="4528384" cy="3898900"/>
+              </a:xfrm>
+            </p:grpSpPr>
+            <p:pic>
+              <p:nvPicPr>
+                <p:cNvPr id="10" name="Picture 9" descr="A picture containing icon&#10;&#10;Description automatically generated">
+                  <a:extLst>
+                    <a:ext uri="{FF2B5EF4-FFF2-40B4-BE49-F238E27FC236}">
+                      <a16:creationId xmlns:a16="http://schemas.microsoft.com/office/drawing/2014/main" id="{08661208-D7C1-3743-9276-A4B277B6E6D0}"/>
+                    </a:ext>
+                  </a:extLst>
+                </p:cNvPr>
+                <p:cNvPicPr>
+                  <a:picLocks noChangeAspect="1"/>
+                </p:cNvPicPr>
+                <p:nvPr/>
+              </p:nvPicPr>
+              <p:blipFill>
+                <a:blip r:embed="rId3"/>
+                <a:stretch>
+                  <a:fillRect/>
+                </a:stretch>
+              </p:blipFill>
+              <p:spPr>
+                <a:xfrm>
+                  <a:off x="3821876" y="1479550"/>
+                  <a:ext cx="3898900" cy="3898900"/>
+                </a:xfrm>
+                <a:prstGeom prst="rect">
+                  <a:avLst/>
+                </a:prstGeom>
+              </p:spPr>
+            </p:pic>
+            <p:pic>
+              <p:nvPicPr>
+                <p:cNvPr id="12" name="Picture 11" descr="A picture containing logo&#10;&#10;Description automatically generated">
+                  <a:extLst>
+                    <a:ext uri="{FF2B5EF4-FFF2-40B4-BE49-F238E27FC236}">
+                      <a16:creationId xmlns:a16="http://schemas.microsoft.com/office/drawing/2014/main" id="{ED552047-AC1E-E449-B69D-719FCB336A22}"/>
+                    </a:ext>
+                  </a:extLst>
+                </p:cNvPr>
+                <p:cNvPicPr>
+                  <a:picLocks noChangeAspect="1"/>
+                </p:cNvPicPr>
+                <p:nvPr/>
+              </p:nvPicPr>
+              <p:blipFill>
+                <a:blip r:embed="rId4"/>
+                <a:stretch>
+                  <a:fillRect/>
+                </a:stretch>
+              </p:blipFill>
+              <p:spPr>
+                <a:xfrm>
+                  <a:off x="4451360" y="1479550"/>
+                  <a:ext cx="3898900" cy="3898900"/>
+                </a:xfrm>
+                <a:prstGeom prst="rect">
+                  <a:avLst/>
+                </a:prstGeom>
+              </p:spPr>
+            </p:pic>
+          </p:grpSp>
+        </p:grpSp>
+      </p:grpSp>
+    </p:spTree>
+    <p:extLst>
+      <p:ext uri="{BB962C8B-B14F-4D97-AF65-F5344CB8AC3E}">
+        <p14:creationId xmlns:p14="http://schemas.microsoft.com/office/powerpoint/2010/main" val="2069616885"/>
+      </p:ext>
+    </p:extLst>
+  </p:cSld>
+  <p:clrMapOvr>
+    <a:masterClrMapping/>
+  </p:clrMapOvr>
+</p:sld>
+</file>
+
+<file path=ppt/slides/slide15.xml><?xml version="1.0" encoding="utf-8"?>
+<p:sld xmlns:a="http://schemas.openxmlformats.org/drawingml/2006/main" xmlns:r="http://schemas.openxmlformats.org/officeDocument/2006/relationships" xmlns:p="http://schemas.openxmlformats.org/presentationml/2006/main">
+  <p:cSld>
+    <p:spTree>
+      <p:nvGrpSpPr>
+        <p:cNvPr id="1" name=""/>
+        <p:cNvGrpSpPr/>
+        <p:nvPr/>
+      </p:nvGrpSpPr>
+      <p:grpSpPr>
+        <a:xfrm>
+          <a:off x="0" y="0"/>
+          <a:ext cx="0" cy="0"/>
+          <a:chOff x="0" y="0"/>
+          <a:chExt cx="0" cy="0"/>
+        </a:xfrm>
+      </p:grpSpPr>
+      <p:grpSp>
+        <p:nvGrpSpPr>
+          <p:cNvPr id="15" name="Group 14">
+            <a:extLst>
+              <a:ext uri="{FF2B5EF4-FFF2-40B4-BE49-F238E27FC236}">
+                <a16:creationId xmlns:a16="http://schemas.microsoft.com/office/drawing/2014/main" id="{5A8ABE74-CD05-4949-B70A-CCE148996880}"/>
+              </a:ext>
+            </a:extLst>
+          </p:cNvPr>
+          <p:cNvGrpSpPr/>
+          <p:nvPr/>
+        </p:nvGrpSpPr>
+        <p:grpSpPr>
+          <a:xfrm>
+            <a:off x="2327349" y="177615"/>
+            <a:ext cx="7550554" cy="6512710"/>
+            <a:chOff x="2327349" y="177615"/>
+            <a:chExt cx="7550554" cy="6512710"/>
+          </a:xfrm>
+        </p:grpSpPr>
+        <p:sp>
+          <p:nvSpPr>
+            <p:cNvPr id="6" name="Oval 5">
+              <a:extLst>
+                <a:ext uri="{FF2B5EF4-FFF2-40B4-BE49-F238E27FC236}">
+                  <a16:creationId xmlns:a16="http://schemas.microsoft.com/office/drawing/2014/main" id="{1945A6E5-9E86-5B47-987D-996F1E0EA71A}"/>
+                </a:ext>
+              </a:extLst>
+            </p:cNvPr>
+            <p:cNvSpPr/>
+            <p:nvPr/>
+          </p:nvSpPr>
+          <p:spPr>
+            <a:xfrm>
+              <a:off x="3914503" y="1247503"/>
+              <a:ext cx="4362994" cy="4362994"/>
+            </a:xfrm>
+            <a:prstGeom prst="ellipse">
+              <a:avLst/>
+            </a:prstGeom>
+            <a:solidFill>
+              <a:schemeClr val="bg1"/>
+            </a:solidFill>
+            <a:ln>
+              <a:noFill/>
+            </a:ln>
+          </p:spPr>
+          <p:style>
+            <a:lnRef idx="2">
+              <a:schemeClr val="accent1">
+                <a:shade val="50000"/>
+              </a:schemeClr>
+            </a:lnRef>
+            <a:fillRef idx="1">
+              <a:schemeClr val="accent1"/>
+            </a:fillRef>
+            <a:effectRef idx="0">
+              <a:schemeClr val="accent1"/>
+            </a:effectRef>
+            <a:fontRef idx="minor">
+              <a:schemeClr val="lt1"/>
+            </a:fontRef>
+          </p:style>
+          <p:txBody>
+            <a:bodyPr rtlCol="0" anchor="ctr"/>
+            <a:lstStyle/>
+            <a:p>
+              <a:pPr algn="ctr"/>
+              <a:endParaRPr lang="en-US"/>
+            </a:p>
+          </p:txBody>
+        </p:sp>
+        <p:sp>
+          <p:nvSpPr>
+            <p:cNvPr id="4" name="Oval 3">
+              <a:extLst>
+                <a:ext uri="{FF2B5EF4-FFF2-40B4-BE49-F238E27FC236}">
+                  <a16:creationId xmlns:a16="http://schemas.microsoft.com/office/drawing/2014/main" id="{9A6DA34C-F484-5E43-BB32-A3AEB809FFC8}"/>
+                </a:ext>
+              </a:extLst>
+            </p:cNvPr>
+            <p:cNvSpPr/>
+            <p:nvPr/>
+          </p:nvSpPr>
+          <p:spPr>
+            <a:xfrm rot="164111">
+              <a:off x="4185160" y="1516465"/>
+              <a:ext cx="3821682" cy="3825072"/>
+            </a:xfrm>
+            <a:prstGeom prst="ellipse">
+              <a:avLst/>
+            </a:prstGeom>
+            <a:gradFill flip="none" rotWithShape="1">
+              <a:gsLst>
+                <a:gs pos="29000">
+                  <a:schemeClr val="bg2">
+                    <a:lumMod val="50000"/>
+                  </a:schemeClr>
+                </a:gs>
+                <a:gs pos="69000">
+                  <a:srgbClr val="006688"/>
+                </a:gs>
+                <a:gs pos="100000">
+                  <a:srgbClr val="0066CC">
+                    <a:shade val="100000"/>
+                    <a:satMod val="115000"/>
+                  </a:srgbClr>
+                </a:gs>
+              </a:gsLst>
+              <a:lin ang="18900000" scaled="1"/>
+              <a:tileRect/>
+            </a:gradFill>
+          </p:spPr>
+          <p:style>
+            <a:lnRef idx="2">
+              <a:schemeClr val="accent1">
+                <a:shade val="50000"/>
+              </a:schemeClr>
+            </a:lnRef>
+            <a:fillRef idx="1">
+              <a:schemeClr val="accent1"/>
+            </a:fillRef>
+            <a:effectRef idx="0">
+              <a:schemeClr val="accent1"/>
+            </a:effectRef>
+            <a:fontRef idx="minor">
+              <a:schemeClr val="lt1"/>
+            </a:fontRef>
+          </p:style>
+          <p:txBody>
+            <a:bodyPr rtlCol="0" anchor="ctr"/>
+            <a:lstStyle/>
+            <a:p>
+              <a:pPr algn="ctr"/>
+              <a:endParaRPr lang="en-US" b="1"/>
+            </a:p>
+          </p:txBody>
+        </p:sp>
+        <p:sp>
+          <p:nvSpPr>
+            <p:cNvPr id="5" name="Oval 4">
+              <a:extLst>
+                <a:ext uri="{FF2B5EF4-FFF2-40B4-BE49-F238E27FC236}">
+                  <a16:creationId xmlns:a16="http://schemas.microsoft.com/office/drawing/2014/main" id="{4223DED6-A217-3A44-AEBB-7F223EF01681}"/>
+                </a:ext>
+              </a:extLst>
+            </p:cNvPr>
+            <p:cNvSpPr/>
+            <p:nvPr/>
+          </p:nvSpPr>
+          <p:spPr>
+            <a:xfrm>
+              <a:off x="4605132" y="1934074"/>
+              <a:ext cx="2981738" cy="2989854"/>
+            </a:xfrm>
+            <a:prstGeom prst="ellipse">
+              <a:avLst/>
+            </a:prstGeom>
+            <a:solidFill>
+              <a:schemeClr val="bg1"/>
+            </a:solidFill>
+            <a:ln>
+              <a:noFill/>
+            </a:ln>
+          </p:spPr>
+          <p:style>
+            <a:lnRef idx="2">
+              <a:schemeClr val="accent1">
+                <a:shade val="50000"/>
+              </a:schemeClr>
+            </a:lnRef>
+            <a:fillRef idx="1">
+              <a:schemeClr val="accent1"/>
+            </a:fillRef>
+            <a:effectRef idx="0">
+              <a:schemeClr val="accent1"/>
+            </a:effectRef>
+            <a:fontRef idx="minor">
+              <a:schemeClr val="lt1"/>
+            </a:fontRef>
+          </p:style>
+          <p:txBody>
+            <a:bodyPr rtlCol="0" anchor="ctr"/>
+            <a:lstStyle/>
+            <a:p>
+              <a:pPr algn="ctr"/>
+              <a:endParaRPr lang="en-US" b="1" dirty="0">
+                <a:solidFill>
+                  <a:schemeClr val="bg1"/>
+                </a:solidFill>
+              </a:endParaRPr>
+            </a:p>
+          </p:txBody>
+        </p:sp>
+        <p:grpSp>
+          <p:nvGrpSpPr>
+            <p:cNvPr id="12" name="Group 11">
+              <a:extLst>
+                <a:ext uri="{FF2B5EF4-FFF2-40B4-BE49-F238E27FC236}">
+                  <a16:creationId xmlns:a16="http://schemas.microsoft.com/office/drawing/2014/main" id="{0BE44F2D-C00D-A646-9A8A-8E51B867CAEF}"/>
+                </a:ext>
+              </a:extLst>
+            </p:cNvPr>
+            <p:cNvGrpSpPr/>
+            <p:nvPr/>
+          </p:nvGrpSpPr>
+          <p:grpSpPr>
+            <a:xfrm>
+              <a:off x="2327349" y="177615"/>
+              <a:ext cx="7550554" cy="6512710"/>
+              <a:chOff x="6675420" y="2264742"/>
+              <a:chExt cx="4524053" cy="3902213"/>
+            </a:xfrm>
+          </p:grpSpPr>
+          <p:pic>
+            <p:nvPicPr>
+              <p:cNvPr id="13" name="Picture 12" descr="Shape&#10;&#10;Description automatically generated with low confidence">
+                <a:extLst>
+                  <a:ext uri="{FF2B5EF4-FFF2-40B4-BE49-F238E27FC236}">
+                    <a16:creationId xmlns:a16="http://schemas.microsoft.com/office/drawing/2014/main" id="{EF71631E-CDE8-404F-B288-221351E8D3A8}"/>
+                  </a:ext>
+                </a:extLst>
+              </p:cNvPr>
+              <p:cNvPicPr>
+                <a:picLocks noChangeAspect="1"/>
+              </p:cNvPicPr>
+              <p:nvPr/>
+            </p:nvPicPr>
+            <p:blipFill>
+              <a:blip r:embed="rId3"/>
+              <a:stretch>
+                <a:fillRect/>
+              </a:stretch>
+            </p:blipFill>
+            <p:spPr>
+              <a:xfrm>
+                <a:off x="6675420" y="2264742"/>
+                <a:ext cx="3898900" cy="3898900"/>
+              </a:xfrm>
+              <a:prstGeom prst="rect">
+                <a:avLst/>
+              </a:prstGeom>
+            </p:spPr>
+          </p:pic>
+          <p:pic>
+            <p:nvPicPr>
+              <p:cNvPr id="14" name="Picture 13" descr="Shape&#10;&#10;Description automatically generated with low confidence">
+                <a:extLst>
+                  <a:ext uri="{FF2B5EF4-FFF2-40B4-BE49-F238E27FC236}">
+                    <a16:creationId xmlns:a16="http://schemas.microsoft.com/office/drawing/2014/main" id="{614ED623-D1B8-9547-A659-24D125E86E30}"/>
+                  </a:ext>
+                </a:extLst>
+              </p:cNvPr>
+              <p:cNvPicPr>
+                <a:picLocks noChangeAspect="1"/>
+              </p:cNvPicPr>
+              <p:nvPr/>
+            </p:nvPicPr>
+            <p:blipFill>
+              <a:blip r:embed="rId4"/>
+              <a:stretch>
+                <a:fillRect/>
+              </a:stretch>
+            </p:blipFill>
+            <p:spPr>
+              <a:xfrm>
+                <a:off x="7300573" y="2268055"/>
+                <a:ext cx="3898900" cy="3898900"/>
+              </a:xfrm>
+              <a:prstGeom prst="rect">
+                <a:avLst/>
+              </a:prstGeom>
+            </p:spPr>
+          </p:pic>
+        </p:grpSp>
+      </p:grpSp>
+    </p:spTree>
+    <p:extLst>
+      <p:ext uri="{BB962C8B-B14F-4D97-AF65-F5344CB8AC3E}">
+        <p14:creationId xmlns:p14="http://schemas.microsoft.com/office/powerpoint/2010/main" val="1886396496"/>
       </p:ext>
     </p:extLst>
   </p:cSld>
@@ -7451,12 +9290,64 @@
           <a:chExt cx="0" cy="0"/>
         </a:xfrm>
       </p:grpSpPr>
+      <p:sp>
+        <p:nvSpPr>
+          <p:cNvPr id="7" name="Rectangle 6">
+            <a:extLst>
+              <a:ext uri="{FF2B5EF4-FFF2-40B4-BE49-F238E27FC236}">
+                <a16:creationId xmlns:a16="http://schemas.microsoft.com/office/drawing/2014/main" id="{5B590B8C-B85E-1646-A15F-7057A156E1AD}"/>
+              </a:ext>
+            </a:extLst>
+          </p:cNvPr>
+          <p:cNvSpPr/>
+          <p:nvPr/>
+        </p:nvSpPr>
+        <p:spPr>
+          <a:xfrm>
+            <a:off x="2116667" y="1151467"/>
+            <a:ext cx="7958666" cy="4555066"/>
+          </a:xfrm>
+          <a:prstGeom prst="rect">
+            <a:avLst/>
+          </a:prstGeom>
+          <a:solidFill>
+            <a:schemeClr val="bg1"/>
+          </a:solidFill>
+          <a:ln>
+            <a:noFill/>
+          </a:ln>
+        </p:spPr>
+        <p:style>
+          <a:lnRef idx="2">
+            <a:schemeClr val="accent1">
+              <a:shade val="50000"/>
+            </a:schemeClr>
+          </a:lnRef>
+          <a:fillRef idx="1">
+            <a:schemeClr val="accent1"/>
+          </a:fillRef>
+          <a:effectRef idx="0">
+            <a:schemeClr val="accent1"/>
+          </a:effectRef>
+          <a:fontRef idx="minor">
+            <a:schemeClr val="lt1"/>
+          </a:fontRef>
+        </p:style>
+        <p:txBody>
+          <a:bodyPr rtlCol="0" anchor="ctr"/>
+          <a:lstStyle/>
+          <a:p>
+            <a:pPr algn="ctr"/>
+            <a:endParaRPr lang="en-US"/>
+          </a:p>
+        </p:txBody>
+      </p:sp>
       <p:grpSp>
         <p:nvGrpSpPr>
-          <p:cNvPr id="2" name="Group 1">
+          <p:cNvPr id="8" name="Group 7">
             <a:extLst>
               <a:ext uri="{FF2B5EF4-FFF2-40B4-BE49-F238E27FC236}">
-                <a16:creationId xmlns:a16="http://schemas.microsoft.com/office/drawing/2014/main" id="{718B0D5B-D4CA-D74B-83DC-CBB00C5A16F5}"/>
+                <a16:creationId xmlns:a16="http://schemas.microsoft.com/office/drawing/2014/main" id="{BE325F1E-2AAE-1B43-80EC-07B304A86776}"/>
               </a:ext>
             </a:extLst>
           </p:cNvPr>
@@ -7465,70 +9356,18 @@
         </p:nvGrpSpPr>
         <p:grpSpPr>
           <a:xfrm>
-            <a:off x="2116667" y="-537071"/>
-            <a:ext cx="7972741" cy="7956466"/>
-            <a:chOff x="2116667" y="-537071"/>
-            <a:chExt cx="7972741" cy="7956466"/>
+            <a:off x="7924878" y="1589321"/>
+            <a:ext cx="1368900" cy="3825072"/>
+            <a:chOff x="7924878" y="1589321"/>
+            <a:chExt cx="1368900" cy="3825072"/>
           </a:xfrm>
         </p:grpSpPr>
         <p:sp>
           <p:nvSpPr>
-            <p:cNvPr id="7" name="Rectangle 6">
+            <p:cNvPr id="9" name="Oval 8">
               <a:extLst>
                 <a:ext uri="{FF2B5EF4-FFF2-40B4-BE49-F238E27FC236}">
-                  <a16:creationId xmlns:a16="http://schemas.microsoft.com/office/drawing/2014/main" id="{5B590B8C-B85E-1646-A15F-7057A156E1AD}"/>
-                </a:ext>
-              </a:extLst>
-            </p:cNvPr>
-            <p:cNvSpPr/>
-            <p:nvPr/>
-          </p:nvSpPr>
-          <p:spPr>
-            <a:xfrm>
-              <a:off x="2116667" y="1151467"/>
-              <a:ext cx="7958666" cy="4555066"/>
-            </a:xfrm>
-            <a:prstGeom prst="rect">
-              <a:avLst/>
-            </a:prstGeom>
-            <a:solidFill>
-              <a:schemeClr val="bg1"/>
-            </a:solidFill>
-            <a:ln>
-              <a:noFill/>
-            </a:ln>
-          </p:spPr>
-          <p:style>
-            <a:lnRef idx="2">
-              <a:schemeClr val="accent1">
-                <a:shade val="50000"/>
-              </a:schemeClr>
-            </a:lnRef>
-            <a:fillRef idx="1">
-              <a:schemeClr val="accent1"/>
-            </a:fillRef>
-            <a:effectRef idx="0">
-              <a:schemeClr val="accent1"/>
-            </a:effectRef>
-            <a:fontRef idx="minor">
-              <a:schemeClr val="lt1"/>
-            </a:fontRef>
-          </p:style>
-          <p:txBody>
-            <a:bodyPr rtlCol="0" anchor="ctr"/>
-            <a:lstStyle/>
-            <a:p>
-              <a:pPr algn="ctr"/>
-              <a:endParaRPr lang="en-US"/>
-            </a:p>
-          </p:txBody>
-        </p:sp>
-        <p:sp>
-          <p:nvSpPr>
-            <p:cNvPr id="4" name="Oval 3">
-              <a:extLst>
-                <a:ext uri="{FF2B5EF4-FFF2-40B4-BE49-F238E27FC236}">
-                  <a16:creationId xmlns:a16="http://schemas.microsoft.com/office/drawing/2014/main" id="{9A6DA34C-F484-5E43-BB32-A3AEB809FFC8}"/>
+                  <a16:creationId xmlns:a16="http://schemas.microsoft.com/office/drawing/2014/main" id="{D6C5DB1A-BC6D-184C-8C12-58A7FB9037CA}"/>
                 </a:ext>
               </a:extLst>
             </p:cNvPr>
@@ -7537,7 +9376,7 @@
           </p:nvSpPr>
           <p:spPr>
             <a:xfrm rot="811608">
-              <a:off x="7988589" y="1530542"/>
+              <a:off x="7968996" y="1589321"/>
               <a:ext cx="1324782" cy="3825072"/>
             </a:xfrm>
             <a:prstGeom prst="ellipse">
@@ -7591,10 +9430,10 @@
         </p:sp>
         <p:sp>
           <p:nvSpPr>
-            <p:cNvPr id="5" name="Oval 4">
+            <p:cNvPr id="10" name="Oval 9">
               <a:extLst>
                 <a:ext uri="{FF2B5EF4-FFF2-40B4-BE49-F238E27FC236}">
-                  <a16:creationId xmlns:a16="http://schemas.microsoft.com/office/drawing/2014/main" id="{4223DED6-A217-3A44-AEBB-7F223EF01681}"/>
+                  <a16:creationId xmlns:a16="http://schemas.microsoft.com/office/drawing/2014/main" id="{851546FB-0215-594B-9BAB-8453B34BBE57}"/>
                 </a:ext>
               </a:extLst>
             </p:cNvPr>
@@ -7603,7 +9442,7 @@
           </p:nvSpPr>
           <p:spPr>
             <a:xfrm rot="811608">
-              <a:off x="7944471" y="1922498"/>
+              <a:off x="7924878" y="1981277"/>
               <a:ext cx="1062463" cy="3067676"/>
             </a:xfrm>
             <a:prstGeom prst="ellipse">
@@ -7645,37 +9484,37 @@
             </a:p>
           </p:txBody>
         </p:sp>
-        <p:pic>
-          <p:nvPicPr>
-            <p:cNvPr id="3" name="Picture 2" descr="Shape&#10;&#10;Description automatically generated with low confidence">
-              <a:extLst>
-                <a:ext uri="{FF2B5EF4-FFF2-40B4-BE49-F238E27FC236}">
-                  <a16:creationId xmlns:a16="http://schemas.microsoft.com/office/drawing/2014/main" id="{DE91DDFA-30BF-F949-8183-7006D9C3F9B5}"/>
-                </a:ext>
-              </a:extLst>
-            </p:cNvPr>
-            <p:cNvPicPr>
-              <a:picLocks noChangeAspect="1"/>
-            </p:cNvPicPr>
-            <p:nvPr/>
-          </p:nvPicPr>
-          <p:blipFill>
-            <a:blip r:embed="rId3"/>
-            <a:stretch>
-              <a:fillRect/>
-            </a:stretch>
-          </p:blipFill>
-          <p:spPr>
-            <a:xfrm>
-              <a:off x="2132942" y="-537071"/>
-              <a:ext cx="7956466" cy="7956466"/>
-            </a:xfrm>
-            <a:prstGeom prst="rect">
-              <a:avLst/>
-            </a:prstGeom>
-          </p:spPr>
-        </p:pic>
       </p:grpSp>
+      <p:pic>
+        <p:nvPicPr>
+          <p:cNvPr id="3" name="Picture 2" descr="Shape&#10;&#10;Description automatically generated with low confidence">
+            <a:extLst>
+              <a:ext uri="{FF2B5EF4-FFF2-40B4-BE49-F238E27FC236}">
+                <a16:creationId xmlns:a16="http://schemas.microsoft.com/office/drawing/2014/main" id="{DE91DDFA-30BF-F949-8183-7006D9C3F9B5}"/>
+              </a:ext>
+            </a:extLst>
+          </p:cNvPr>
+          <p:cNvPicPr>
+            <a:picLocks noChangeAspect="1"/>
+          </p:cNvPicPr>
+          <p:nvPr/>
+        </p:nvPicPr>
+        <p:blipFill>
+          <a:blip r:embed="rId3"/>
+          <a:stretch>
+            <a:fillRect/>
+          </a:stretch>
+        </p:blipFill>
+        <p:spPr>
+          <a:xfrm>
+            <a:off x="2140437" y="-529576"/>
+            <a:ext cx="7956466" cy="7956466"/>
+          </a:xfrm>
+          <a:prstGeom prst="rect">
+            <a:avLst/>
+          </a:prstGeom>
+        </p:spPr>
+      </p:pic>
     </p:spTree>
     <p:extLst>
       <p:ext uri="{BB962C8B-B14F-4D97-AF65-F5344CB8AC3E}">
@@ -7706,12 +9545,64 @@
           <a:chExt cx="0" cy="0"/>
         </a:xfrm>
       </p:grpSpPr>
+      <p:sp>
+        <p:nvSpPr>
+          <p:cNvPr id="7" name="Rectangle 6">
+            <a:extLst>
+              <a:ext uri="{FF2B5EF4-FFF2-40B4-BE49-F238E27FC236}">
+                <a16:creationId xmlns:a16="http://schemas.microsoft.com/office/drawing/2014/main" id="{5B590B8C-B85E-1646-A15F-7057A156E1AD}"/>
+              </a:ext>
+            </a:extLst>
+          </p:cNvPr>
+          <p:cNvSpPr/>
+          <p:nvPr/>
+        </p:nvSpPr>
+        <p:spPr>
+          <a:xfrm>
+            <a:off x="2116667" y="1151467"/>
+            <a:ext cx="7958666" cy="4555066"/>
+          </a:xfrm>
+          <a:prstGeom prst="rect">
+            <a:avLst/>
+          </a:prstGeom>
+          <a:solidFill>
+            <a:schemeClr val="bg1"/>
+          </a:solidFill>
+          <a:ln>
+            <a:noFill/>
+          </a:ln>
+        </p:spPr>
+        <p:style>
+          <a:lnRef idx="2">
+            <a:schemeClr val="accent1">
+              <a:shade val="50000"/>
+            </a:schemeClr>
+          </a:lnRef>
+          <a:fillRef idx="1">
+            <a:schemeClr val="accent1"/>
+          </a:fillRef>
+          <a:effectRef idx="0">
+            <a:schemeClr val="accent1"/>
+          </a:effectRef>
+          <a:fontRef idx="minor">
+            <a:schemeClr val="lt1"/>
+          </a:fontRef>
+        </p:style>
+        <p:txBody>
+          <a:bodyPr rtlCol="0" anchor="ctr"/>
+          <a:lstStyle/>
+          <a:p>
+            <a:pPr algn="ctr"/>
+            <a:endParaRPr lang="en-US"/>
+          </a:p>
+        </p:txBody>
+      </p:sp>
       <p:grpSp>
         <p:nvGrpSpPr>
-          <p:cNvPr id="8" name="Group 7">
+          <p:cNvPr id="13" name="Group 12">
             <a:extLst>
               <a:ext uri="{FF2B5EF4-FFF2-40B4-BE49-F238E27FC236}">
-                <a16:creationId xmlns:a16="http://schemas.microsoft.com/office/drawing/2014/main" id="{283BF5BF-F103-784D-9B1B-270C718E7A9D}"/>
+                <a16:creationId xmlns:a16="http://schemas.microsoft.com/office/drawing/2014/main" id="{DCB65BFF-D204-B74D-9E59-1C6E1100CE1E}"/>
               </a:ext>
             </a:extLst>
           </p:cNvPr>
@@ -7720,18 +9611,18 @@
         </p:nvGrpSpPr>
         <p:grpSpPr>
           <a:xfrm>
-            <a:off x="3640667" y="973667"/>
-            <a:ext cx="4910666" cy="4910666"/>
-            <a:chOff x="3640667" y="973667"/>
-            <a:chExt cx="4910666" cy="4910666"/>
+            <a:off x="7924878" y="1589321"/>
+            <a:ext cx="1368900" cy="3825072"/>
+            <a:chOff x="7924878" y="1589321"/>
+            <a:chExt cx="1368900" cy="3825072"/>
           </a:xfrm>
         </p:grpSpPr>
         <p:sp>
           <p:nvSpPr>
-            <p:cNvPr id="2" name="Rectangle 1">
+            <p:cNvPr id="14" name="Oval 13">
               <a:extLst>
                 <a:ext uri="{FF2B5EF4-FFF2-40B4-BE49-F238E27FC236}">
-                  <a16:creationId xmlns:a16="http://schemas.microsoft.com/office/drawing/2014/main" id="{59892156-1CAA-DE43-8EC1-9F571399ED33}"/>
+                  <a16:creationId xmlns:a16="http://schemas.microsoft.com/office/drawing/2014/main" id="{350A7B23-D496-A74C-A771-94E2CEC15549}"/>
                 </a:ext>
               </a:extLst>
             </p:cNvPr>
@@ -7739,11 +9630,77 @@
             <p:nvPr/>
           </p:nvSpPr>
           <p:spPr>
-            <a:xfrm>
-              <a:off x="3640667" y="973667"/>
-              <a:ext cx="4910666" cy="4910666"/>
+            <a:xfrm rot="811608">
+              <a:off x="7968996" y="1589321"/>
+              <a:ext cx="1324782" cy="3825072"/>
             </a:xfrm>
-            <a:prstGeom prst="rect">
+            <a:prstGeom prst="ellipse">
+              <a:avLst/>
+            </a:prstGeom>
+            <a:gradFill flip="none" rotWithShape="1">
+              <a:gsLst>
+                <a:gs pos="42000">
+                  <a:schemeClr val="bg2">
+                    <a:lumMod val="50000"/>
+                  </a:schemeClr>
+                </a:gs>
+                <a:gs pos="83000">
+                  <a:srgbClr val="006688"/>
+                </a:gs>
+                <a:gs pos="100000">
+                  <a:srgbClr val="0066CC">
+                    <a:shade val="100000"/>
+                    <a:satMod val="115000"/>
+                  </a:srgbClr>
+                </a:gs>
+              </a:gsLst>
+              <a:lin ang="18900000" scaled="1"/>
+              <a:tileRect/>
+            </a:gradFill>
+          </p:spPr>
+          <p:style>
+            <a:lnRef idx="2">
+              <a:schemeClr val="accent1">
+                <a:shade val="50000"/>
+              </a:schemeClr>
+            </a:lnRef>
+            <a:fillRef idx="1">
+              <a:schemeClr val="accent1"/>
+            </a:fillRef>
+            <a:effectRef idx="0">
+              <a:schemeClr val="accent1"/>
+            </a:effectRef>
+            <a:fontRef idx="minor">
+              <a:schemeClr val="lt1"/>
+            </a:fontRef>
+          </p:style>
+          <p:txBody>
+            <a:bodyPr rtlCol="0" anchor="ctr"/>
+            <a:lstStyle/>
+            <a:p>
+              <a:pPr algn="ctr"/>
+              <a:endParaRPr lang="en-US"/>
+            </a:p>
+          </p:txBody>
+        </p:sp>
+        <p:sp>
+          <p:nvSpPr>
+            <p:cNvPr id="15" name="Oval 14">
+              <a:extLst>
+                <a:ext uri="{FF2B5EF4-FFF2-40B4-BE49-F238E27FC236}">
+                  <a16:creationId xmlns:a16="http://schemas.microsoft.com/office/drawing/2014/main" id="{6CC7F428-61F8-D441-BA21-A8020C10D7A8}"/>
+                </a:ext>
+              </a:extLst>
+            </p:cNvPr>
+            <p:cNvSpPr/>
+            <p:nvPr/>
+          </p:nvSpPr>
+          <p:spPr>
+            <a:xfrm rot="811608">
+              <a:off x="7924878" y="1981277"/>
+              <a:ext cx="1062463" cy="3067676"/>
+            </a:xfrm>
+            <a:prstGeom prst="ellipse">
               <a:avLst/>
             </a:prstGeom>
             <a:solidFill>
@@ -7774,158 +9731,49 @@
             <a:lstStyle/>
             <a:p>
               <a:pPr algn="ctr"/>
-              <a:endParaRPr lang="en-US"/>
+              <a:endParaRPr lang="en-US">
+                <a:solidFill>
+                  <a:schemeClr val="bg1"/>
+                </a:solidFill>
+              </a:endParaRPr>
             </a:p>
           </p:txBody>
         </p:sp>
-        <p:grpSp>
-          <p:nvGrpSpPr>
-            <p:cNvPr id="7" name="Group 6">
-              <a:extLst>
-                <a:ext uri="{FF2B5EF4-FFF2-40B4-BE49-F238E27FC236}">
-                  <a16:creationId xmlns:a16="http://schemas.microsoft.com/office/drawing/2014/main" id="{1D99D7E9-DE8B-A04A-860C-1D6A5A83FFDF}"/>
-                </a:ext>
-              </a:extLst>
-            </p:cNvPr>
-            <p:cNvGrpSpPr/>
-            <p:nvPr/>
-          </p:nvGrpSpPr>
-          <p:grpSpPr>
-            <a:xfrm>
-              <a:off x="5411550" y="1516464"/>
-              <a:ext cx="1368900" cy="3825072"/>
-              <a:chOff x="5389492" y="1666008"/>
-              <a:chExt cx="1368900" cy="3825072"/>
-            </a:xfrm>
-          </p:grpSpPr>
-          <p:sp>
-            <p:nvSpPr>
-              <p:cNvPr id="4" name="Oval 3">
-                <a:extLst>
-                  <a:ext uri="{FF2B5EF4-FFF2-40B4-BE49-F238E27FC236}">
-                    <a16:creationId xmlns:a16="http://schemas.microsoft.com/office/drawing/2014/main" id="{9A6DA34C-F484-5E43-BB32-A3AEB809FFC8}"/>
-                  </a:ext>
-                </a:extLst>
-              </p:cNvPr>
-              <p:cNvSpPr/>
-              <p:nvPr/>
-            </p:nvSpPr>
-            <p:spPr>
-              <a:xfrm rot="811608">
-                <a:off x="5433610" y="1666008"/>
-                <a:ext cx="1324782" cy="3825072"/>
-              </a:xfrm>
-              <a:prstGeom prst="ellipse">
-                <a:avLst/>
-              </a:prstGeom>
-              <a:gradFill flip="none" rotWithShape="1">
-                <a:gsLst>
-                  <a:gs pos="42000">
-                    <a:schemeClr val="bg2">
-                      <a:lumMod val="50000"/>
-                    </a:schemeClr>
-                  </a:gs>
-                  <a:gs pos="83000">
-                    <a:srgbClr val="006688"/>
-                  </a:gs>
-                  <a:gs pos="100000">
-                    <a:srgbClr val="0066CC">
-                      <a:shade val="100000"/>
-                      <a:satMod val="115000"/>
-                    </a:srgbClr>
-                  </a:gs>
-                </a:gsLst>
-                <a:lin ang="18900000" scaled="1"/>
-                <a:tileRect/>
-              </a:gradFill>
-            </p:spPr>
-            <p:style>
-              <a:lnRef idx="2">
-                <a:schemeClr val="accent1">
-                  <a:shade val="50000"/>
-                </a:schemeClr>
-              </a:lnRef>
-              <a:fillRef idx="1">
-                <a:schemeClr val="accent1"/>
-              </a:fillRef>
-              <a:effectRef idx="0">
-                <a:schemeClr val="accent1"/>
-              </a:effectRef>
-              <a:fontRef idx="minor">
-                <a:schemeClr val="lt1"/>
-              </a:fontRef>
-            </p:style>
-            <p:txBody>
-              <a:bodyPr rtlCol="0" anchor="ctr"/>
-              <a:lstStyle/>
-              <a:p>
-                <a:pPr algn="ctr"/>
-                <a:endParaRPr lang="en-US"/>
-              </a:p>
-            </p:txBody>
-          </p:sp>
-          <p:sp>
-            <p:nvSpPr>
-              <p:cNvPr id="5" name="Oval 4">
-                <a:extLst>
-                  <a:ext uri="{FF2B5EF4-FFF2-40B4-BE49-F238E27FC236}">
-                    <a16:creationId xmlns:a16="http://schemas.microsoft.com/office/drawing/2014/main" id="{4223DED6-A217-3A44-AEBB-7F223EF01681}"/>
-                  </a:ext>
-                </a:extLst>
-              </p:cNvPr>
-              <p:cNvSpPr/>
-              <p:nvPr/>
-            </p:nvSpPr>
-            <p:spPr>
-              <a:xfrm rot="811608">
-                <a:off x="5389492" y="2057964"/>
-                <a:ext cx="1062463" cy="3067676"/>
-              </a:xfrm>
-              <a:prstGeom prst="ellipse">
-                <a:avLst/>
-              </a:prstGeom>
-              <a:solidFill>
-                <a:schemeClr val="bg1"/>
-              </a:solidFill>
-              <a:ln>
-                <a:noFill/>
-              </a:ln>
-            </p:spPr>
-            <p:style>
-              <a:lnRef idx="2">
-                <a:schemeClr val="accent1">
-                  <a:shade val="50000"/>
-                </a:schemeClr>
-              </a:lnRef>
-              <a:fillRef idx="1">
-                <a:schemeClr val="accent1"/>
-              </a:fillRef>
-              <a:effectRef idx="0">
-                <a:schemeClr val="accent1"/>
-              </a:effectRef>
-              <a:fontRef idx="minor">
-                <a:schemeClr val="lt1"/>
-              </a:fontRef>
-            </p:style>
-            <p:txBody>
-              <a:bodyPr rtlCol="0" anchor="ctr"/>
-              <a:lstStyle/>
-              <a:p>
-                <a:pPr algn="ctr"/>
-                <a:endParaRPr lang="en-US">
-                  <a:solidFill>
-                    <a:schemeClr val="bg1"/>
-                  </a:solidFill>
-                </a:endParaRPr>
-              </a:p>
-            </p:txBody>
-          </p:sp>
-        </p:grpSp>
       </p:grpSp>
+      <p:pic>
+        <p:nvPicPr>
+          <p:cNvPr id="8" name="Picture 7" descr="Shape&#10;&#10;Description automatically generated with low confidence">
+            <a:extLst>
+              <a:ext uri="{FF2B5EF4-FFF2-40B4-BE49-F238E27FC236}">
+                <a16:creationId xmlns:a16="http://schemas.microsoft.com/office/drawing/2014/main" id="{50240468-F480-C242-982B-0B30912FCAC7}"/>
+              </a:ext>
+            </a:extLst>
+          </p:cNvPr>
+          <p:cNvPicPr>
+            <a:picLocks noChangeAspect="1"/>
+          </p:cNvPicPr>
+          <p:nvPr/>
+        </p:nvPicPr>
+        <p:blipFill>
+          <a:blip r:embed="rId3"/>
+          <a:stretch>
+            <a:fillRect/>
+          </a:stretch>
+        </p:blipFill>
+        <p:spPr>
+          <a:xfrm>
+            <a:off x="2120880" y="-546120"/>
+            <a:ext cx="7986816" cy="7986816"/>
+          </a:xfrm>
+          <a:prstGeom prst="rect">
+            <a:avLst/>
+          </a:prstGeom>
+        </p:spPr>
+      </p:pic>
     </p:spTree>
     <p:extLst>
       <p:ext uri="{BB962C8B-B14F-4D97-AF65-F5344CB8AC3E}">
-        <p14:creationId xmlns:p14="http://schemas.microsoft.com/office/powerpoint/2010/main" val="3766700309"/>
+        <p14:creationId xmlns:p14="http://schemas.microsoft.com/office/powerpoint/2010/main" val="1814659990"/>
       </p:ext>
     </p:extLst>
   </p:cSld>

</xml_diff>

<commit_message>
update website - build contacts
</commit_message>
<xml_diff>
--- a/resources/logos.pptx
+++ b/resources/logos.pptx
@@ -5150,10 +5150,10 @@
       </p:grpSpPr>
       <p:grpSp>
         <p:nvGrpSpPr>
-          <p:cNvPr id="10" name="Group 9">
+          <p:cNvPr id="2" name="Group 1">
             <a:extLst>
               <a:ext uri="{FF2B5EF4-FFF2-40B4-BE49-F238E27FC236}">
-                <a16:creationId xmlns:a16="http://schemas.microsoft.com/office/drawing/2014/main" id="{8C340DD2-135F-154D-8B9B-748F8DDBC8C2}"/>
+                <a16:creationId xmlns:a16="http://schemas.microsoft.com/office/drawing/2014/main" id="{3092810B-88F5-0841-AC06-F767EA86A4F2}"/>
               </a:ext>
             </a:extLst>
           </p:cNvPr>
@@ -5163,9 +5163,9 @@
         <p:grpSpPr>
           <a:xfrm>
             <a:off x="2116667" y="-542043"/>
-            <a:ext cx="7983367" cy="7979790"/>
+            <a:ext cx="7986289" cy="7982712"/>
             <a:chOff x="2116667" y="-542043"/>
-            <a:chExt cx="7983367" cy="7979790"/>
+            <a:chExt cx="7986289" cy="7982712"/>
           </a:xfrm>
         </p:grpSpPr>
         <p:sp>
@@ -5280,6 +5280,9 @@
                 <a:lin ang="18900000" scaled="1"/>
                 <a:tileRect/>
               </a:gradFill>
+              <a:ln>
+                <a:noFill/>
+              </a:ln>
             </p:spPr>
             <p:style>
               <a:lnRef idx="2">
@@ -5386,7 +5389,7 @@
           <p:spPr>
             <a:xfrm>
               <a:off x="2120244" y="-542043"/>
-              <a:ext cx="7979790" cy="7979790"/>
+              <a:ext cx="7982712" cy="7982712"/>
             </a:xfrm>
             <a:prstGeom prst="rect">
               <a:avLst/>
@@ -6141,12 +6144,64 @@
           <a:chExt cx="0" cy="0"/>
         </a:xfrm>
       </p:grpSpPr>
+      <p:sp>
+        <p:nvSpPr>
+          <p:cNvPr id="18" name="Oval 17">
+            <a:extLst>
+              <a:ext uri="{FF2B5EF4-FFF2-40B4-BE49-F238E27FC236}">
+                <a16:creationId xmlns:a16="http://schemas.microsoft.com/office/drawing/2014/main" id="{693F6FFC-78A5-7C48-9E12-E6614469271E}"/>
+              </a:ext>
+            </a:extLst>
+          </p:cNvPr>
+          <p:cNvSpPr/>
+          <p:nvPr/>
+        </p:nvSpPr>
+        <p:spPr>
+          <a:xfrm>
+            <a:off x="3914505" y="1254131"/>
+            <a:ext cx="4362994" cy="4362994"/>
+          </a:xfrm>
+          <a:prstGeom prst="ellipse">
+            <a:avLst/>
+          </a:prstGeom>
+          <a:solidFill>
+            <a:schemeClr val="bg1"/>
+          </a:solidFill>
+          <a:ln>
+            <a:noFill/>
+          </a:ln>
+        </p:spPr>
+        <p:style>
+          <a:lnRef idx="2">
+            <a:schemeClr val="accent1">
+              <a:shade val="50000"/>
+            </a:schemeClr>
+          </a:lnRef>
+          <a:fillRef idx="1">
+            <a:schemeClr val="accent1"/>
+          </a:fillRef>
+          <a:effectRef idx="0">
+            <a:schemeClr val="accent1"/>
+          </a:effectRef>
+          <a:fontRef idx="minor">
+            <a:schemeClr val="lt1"/>
+          </a:fontRef>
+        </p:style>
+        <p:txBody>
+          <a:bodyPr rtlCol="0" anchor="ctr"/>
+          <a:lstStyle/>
+          <a:p>
+            <a:pPr algn="ctr"/>
+            <a:endParaRPr lang="en-US"/>
+          </a:p>
+        </p:txBody>
+      </p:sp>
       <p:grpSp>
         <p:nvGrpSpPr>
-          <p:cNvPr id="19" name="Group 18">
+          <p:cNvPr id="17" name="Group 16">
             <a:extLst>
               <a:ext uri="{FF2B5EF4-FFF2-40B4-BE49-F238E27FC236}">
-                <a16:creationId xmlns:a16="http://schemas.microsoft.com/office/drawing/2014/main" id="{45130B10-44CB-B34D-927C-F154AAAEEBD2}"/>
+                <a16:creationId xmlns:a16="http://schemas.microsoft.com/office/drawing/2014/main" id="{6F1B7A80-57E9-6447-ADDB-0DEA019F6876}"/>
               </a:ext>
             </a:extLst>
           </p:cNvPr>
@@ -6163,10 +6218,10 @@
         </p:grpSpPr>
         <p:sp>
           <p:nvSpPr>
-            <p:cNvPr id="18" name="Oval 17">
+            <p:cNvPr id="6" name="Oval 5">
               <a:extLst>
                 <a:ext uri="{FF2B5EF4-FFF2-40B4-BE49-F238E27FC236}">
-                  <a16:creationId xmlns:a16="http://schemas.microsoft.com/office/drawing/2014/main" id="{693F6FFC-78A5-7C48-9E12-E6614469271E}"/>
+                  <a16:creationId xmlns:a16="http://schemas.microsoft.com/office/drawing/2014/main" id="{1945A6E5-9E86-5B47-987D-996F1E0EA71A}"/>
                 </a:ext>
               </a:extLst>
             </p:cNvPr>
@@ -6175,7 +6230,7 @@
           </p:nvSpPr>
           <p:spPr>
             <a:xfrm>
-              <a:off x="3914505" y="1254131"/>
+              <a:off x="3914503" y="1247503"/>
               <a:ext cx="4362994" cy="4362994"/>
             </a:xfrm>
             <a:prstGeom prst="ellipse">
@@ -6213,12 +6268,81 @@
             </a:p>
           </p:txBody>
         </p:sp>
+        <p:sp>
+          <p:nvSpPr>
+            <p:cNvPr id="4" name="Oval 3">
+              <a:extLst>
+                <a:ext uri="{FF2B5EF4-FFF2-40B4-BE49-F238E27FC236}">
+                  <a16:creationId xmlns:a16="http://schemas.microsoft.com/office/drawing/2014/main" id="{9A6DA34C-F484-5E43-BB32-A3AEB809FFC8}"/>
+                </a:ext>
+              </a:extLst>
+            </p:cNvPr>
+            <p:cNvSpPr/>
+            <p:nvPr/>
+          </p:nvSpPr>
+          <p:spPr>
+            <a:xfrm rot="164111">
+              <a:off x="4185160" y="1516465"/>
+              <a:ext cx="3821682" cy="3825072"/>
+            </a:xfrm>
+            <a:prstGeom prst="ellipse">
+              <a:avLst/>
+            </a:prstGeom>
+            <a:gradFill flip="none" rotWithShape="1">
+              <a:gsLst>
+                <a:gs pos="29000">
+                  <a:schemeClr val="bg2">
+                    <a:lumMod val="50000"/>
+                  </a:schemeClr>
+                </a:gs>
+                <a:gs pos="69000">
+                  <a:srgbClr val="006688"/>
+                </a:gs>
+                <a:gs pos="100000">
+                  <a:srgbClr val="0066CC">
+                    <a:shade val="100000"/>
+                    <a:satMod val="115000"/>
+                  </a:srgbClr>
+                </a:gs>
+              </a:gsLst>
+              <a:lin ang="18900000" scaled="1"/>
+              <a:tileRect/>
+            </a:gradFill>
+            <a:ln>
+              <a:noFill/>
+            </a:ln>
+          </p:spPr>
+          <p:style>
+            <a:lnRef idx="2">
+              <a:schemeClr val="accent1">
+                <a:shade val="50000"/>
+              </a:schemeClr>
+            </a:lnRef>
+            <a:fillRef idx="1">
+              <a:schemeClr val="accent1"/>
+            </a:fillRef>
+            <a:effectRef idx="0">
+              <a:schemeClr val="accent1"/>
+            </a:effectRef>
+            <a:fontRef idx="minor">
+              <a:schemeClr val="lt1"/>
+            </a:fontRef>
+          </p:style>
+          <p:txBody>
+            <a:bodyPr rtlCol="0" anchor="ctr"/>
+            <a:lstStyle/>
+            <a:p>
+              <a:pPr algn="ctr"/>
+              <a:endParaRPr lang="en-US" b="1"/>
+            </a:p>
+          </p:txBody>
+        </p:sp>
         <p:grpSp>
           <p:nvGrpSpPr>
-            <p:cNvPr id="17" name="Group 16">
+            <p:cNvPr id="13" name="Group 12">
               <a:extLst>
                 <a:ext uri="{FF2B5EF4-FFF2-40B4-BE49-F238E27FC236}">
-                  <a16:creationId xmlns:a16="http://schemas.microsoft.com/office/drawing/2014/main" id="{6F1B7A80-57E9-6447-ADDB-0DEA019F6876}"/>
+                  <a16:creationId xmlns:a16="http://schemas.microsoft.com/office/drawing/2014/main" id="{9EE6F499-4A0A-954F-AA2C-AD60F071681B}"/>
                 </a:ext>
               </a:extLst>
             </p:cNvPr>
@@ -6229,209 +6353,76 @@
             <a:xfrm>
               <a:off x="2319144" y="180927"/>
               <a:ext cx="7560352" cy="6509398"/>
-              <a:chOff x="2319144" y="180927"/>
-              <a:chExt cx="7560352" cy="6509398"/>
+              <a:chOff x="3821876" y="1479550"/>
+              <a:chExt cx="4528384" cy="3898900"/>
             </a:xfrm>
           </p:grpSpPr>
-          <p:sp>
-            <p:nvSpPr>
-              <p:cNvPr id="6" name="Oval 5">
+          <p:pic>
+            <p:nvPicPr>
+              <p:cNvPr id="10" name="Picture 9" descr="A picture containing icon&#10;&#10;Description automatically generated">
                 <a:extLst>
                   <a:ext uri="{FF2B5EF4-FFF2-40B4-BE49-F238E27FC236}">
-                    <a16:creationId xmlns:a16="http://schemas.microsoft.com/office/drawing/2014/main" id="{1945A6E5-9E86-5B47-987D-996F1E0EA71A}"/>
+                    <a16:creationId xmlns:a16="http://schemas.microsoft.com/office/drawing/2014/main" id="{08661208-D7C1-3743-9276-A4B277B6E6D0}"/>
                   </a:ext>
                 </a:extLst>
               </p:cNvPr>
-              <p:cNvSpPr/>
+              <p:cNvPicPr>
+                <a:picLocks noChangeAspect="1"/>
+              </p:cNvPicPr>
               <p:nvPr/>
-            </p:nvSpPr>
+            </p:nvPicPr>
+            <p:blipFill>
+              <a:blip r:embed="rId3"/>
+              <a:stretch>
+                <a:fillRect/>
+              </a:stretch>
+            </p:blipFill>
             <p:spPr>
               <a:xfrm>
-                <a:off x="3914503" y="1247503"/>
-                <a:ext cx="4362994" cy="4362994"/>
+                <a:off x="3821876" y="1479550"/>
+                <a:ext cx="3898900" cy="3898900"/>
               </a:xfrm>
-              <a:prstGeom prst="ellipse">
+              <a:prstGeom prst="rect">
                 <a:avLst/>
               </a:prstGeom>
-              <a:solidFill>
-                <a:schemeClr val="bg1"/>
-              </a:solidFill>
               <a:ln>
                 <a:noFill/>
               </a:ln>
             </p:spPr>
-            <p:style>
-              <a:lnRef idx="2">
-                <a:schemeClr val="accent1">
-                  <a:shade val="50000"/>
-                </a:schemeClr>
-              </a:lnRef>
-              <a:fillRef idx="1">
-                <a:schemeClr val="accent1"/>
-              </a:fillRef>
-              <a:effectRef idx="0">
-                <a:schemeClr val="accent1"/>
-              </a:effectRef>
-              <a:fontRef idx="minor">
-                <a:schemeClr val="lt1"/>
-              </a:fontRef>
-            </p:style>
-            <p:txBody>
-              <a:bodyPr rtlCol="0" anchor="ctr"/>
-              <a:lstStyle/>
-              <a:p>
-                <a:pPr algn="ctr"/>
-                <a:endParaRPr lang="en-US"/>
-              </a:p>
-            </p:txBody>
-          </p:sp>
-          <p:sp>
-            <p:nvSpPr>
-              <p:cNvPr id="4" name="Oval 3">
+          </p:pic>
+          <p:pic>
+            <p:nvPicPr>
+              <p:cNvPr id="12" name="Picture 11" descr="A picture containing logo&#10;&#10;Description automatically generated">
                 <a:extLst>
                   <a:ext uri="{FF2B5EF4-FFF2-40B4-BE49-F238E27FC236}">
-                    <a16:creationId xmlns:a16="http://schemas.microsoft.com/office/drawing/2014/main" id="{9A6DA34C-F484-5E43-BB32-A3AEB809FFC8}"/>
+                    <a16:creationId xmlns:a16="http://schemas.microsoft.com/office/drawing/2014/main" id="{ED552047-AC1E-E449-B69D-719FCB336A22}"/>
                   </a:ext>
                 </a:extLst>
               </p:cNvPr>
-              <p:cNvSpPr/>
+              <p:cNvPicPr>
+                <a:picLocks noChangeAspect="1"/>
+              </p:cNvPicPr>
               <p:nvPr/>
-            </p:nvSpPr>
+            </p:nvPicPr>
+            <p:blipFill>
+              <a:blip r:embed="rId4"/>
+              <a:stretch>
+                <a:fillRect/>
+              </a:stretch>
+            </p:blipFill>
             <p:spPr>
-              <a:xfrm rot="164111">
-                <a:off x="4185160" y="1516465"/>
-                <a:ext cx="3821682" cy="3825072"/>
+              <a:xfrm>
+                <a:off x="4451360" y="1479550"/>
+                <a:ext cx="3898900" cy="3898900"/>
               </a:xfrm>
-              <a:prstGeom prst="ellipse">
+              <a:prstGeom prst="rect">
                 <a:avLst/>
               </a:prstGeom>
-              <a:gradFill flip="none" rotWithShape="1">
-                <a:gsLst>
-                  <a:gs pos="29000">
-                    <a:schemeClr val="bg2">
-                      <a:lumMod val="50000"/>
-                    </a:schemeClr>
-                  </a:gs>
-                  <a:gs pos="69000">
-                    <a:srgbClr val="006688"/>
-                  </a:gs>
-                  <a:gs pos="100000">
-                    <a:srgbClr val="0066CC">
-                      <a:shade val="100000"/>
-                      <a:satMod val="115000"/>
-                    </a:srgbClr>
-                  </a:gs>
-                </a:gsLst>
-                <a:lin ang="18900000" scaled="1"/>
-                <a:tileRect/>
-              </a:gradFill>
+              <a:ln>
+                <a:noFill/>
+              </a:ln>
             </p:spPr>
-            <p:style>
-              <a:lnRef idx="2">
-                <a:schemeClr val="accent1">
-                  <a:shade val="50000"/>
-                </a:schemeClr>
-              </a:lnRef>
-              <a:fillRef idx="1">
-                <a:schemeClr val="accent1"/>
-              </a:fillRef>
-              <a:effectRef idx="0">
-                <a:schemeClr val="accent1"/>
-              </a:effectRef>
-              <a:fontRef idx="minor">
-                <a:schemeClr val="lt1"/>
-              </a:fontRef>
-            </p:style>
-            <p:txBody>
-              <a:bodyPr rtlCol="0" anchor="ctr"/>
-              <a:lstStyle/>
-              <a:p>
-                <a:pPr algn="ctr"/>
-                <a:endParaRPr lang="en-US" b="1"/>
-              </a:p>
-            </p:txBody>
-          </p:sp>
-          <p:grpSp>
-            <p:nvGrpSpPr>
-              <p:cNvPr id="13" name="Group 12">
-                <a:extLst>
-                  <a:ext uri="{FF2B5EF4-FFF2-40B4-BE49-F238E27FC236}">
-                    <a16:creationId xmlns:a16="http://schemas.microsoft.com/office/drawing/2014/main" id="{9EE6F499-4A0A-954F-AA2C-AD60F071681B}"/>
-                  </a:ext>
-                </a:extLst>
-              </p:cNvPr>
-              <p:cNvGrpSpPr/>
-              <p:nvPr/>
-            </p:nvGrpSpPr>
-            <p:grpSpPr>
-              <a:xfrm>
-                <a:off x="2319144" y="180927"/>
-                <a:ext cx="7560352" cy="6509398"/>
-                <a:chOff x="3821876" y="1479550"/>
-                <a:chExt cx="4528384" cy="3898900"/>
-              </a:xfrm>
-            </p:grpSpPr>
-            <p:pic>
-              <p:nvPicPr>
-                <p:cNvPr id="10" name="Picture 9" descr="A picture containing icon&#10;&#10;Description automatically generated">
-                  <a:extLst>
-                    <a:ext uri="{FF2B5EF4-FFF2-40B4-BE49-F238E27FC236}">
-                      <a16:creationId xmlns:a16="http://schemas.microsoft.com/office/drawing/2014/main" id="{08661208-D7C1-3743-9276-A4B277B6E6D0}"/>
-                    </a:ext>
-                  </a:extLst>
-                </p:cNvPr>
-                <p:cNvPicPr>
-                  <a:picLocks noChangeAspect="1"/>
-                </p:cNvPicPr>
-                <p:nvPr/>
-              </p:nvPicPr>
-              <p:blipFill>
-                <a:blip r:embed="rId3"/>
-                <a:stretch>
-                  <a:fillRect/>
-                </a:stretch>
-              </p:blipFill>
-              <p:spPr>
-                <a:xfrm>
-                  <a:off x="3821876" y="1479550"/>
-                  <a:ext cx="3898900" cy="3898900"/>
-                </a:xfrm>
-                <a:prstGeom prst="rect">
-                  <a:avLst/>
-                </a:prstGeom>
-              </p:spPr>
-            </p:pic>
-            <p:pic>
-              <p:nvPicPr>
-                <p:cNvPr id="12" name="Picture 11" descr="A picture containing logo&#10;&#10;Description automatically generated">
-                  <a:extLst>
-                    <a:ext uri="{FF2B5EF4-FFF2-40B4-BE49-F238E27FC236}">
-                      <a16:creationId xmlns:a16="http://schemas.microsoft.com/office/drawing/2014/main" id="{ED552047-AC1E-E449-B69D-719FCB336A22}"/>
-                    </a:ext>
-                  </a:extLst>
-                </p:cNvPr>
-                <p:cNvPicPr>
-                  <a:picLocks noChangeAspect="1"/>
-                </p:cNvPicPr>
-                <p:nvPr/>
-              </p:nvPicPr>
-              <p:blipFill>
-                <a:blip r:embed="rId4"/>
-                <a:stretch>
-                  <a:fillRect/>
-                </a:stretch>
-              </p:blipFill>
-              <p:spPr>
-                <a:xfrm>
-                  <a:off x="4451360" y="1479550"/>
-                  <a:ext cx="3898900" cy="3898900"/>
-                </a:xfrm>
-                <a:prstGeom prst="rect">
-                  <a:avLst/>
-                </a:prstGeom>
-              </p:spPr>
-            </p:pic>
-          </p:grpSp>
+          </p:pic>
         </p:grpSp>
       </p:grpSp>
     </p:spTree>
@@ -6466,10 +6457,10 @@
       </p:grpSpPr>
       <p:grpSp>
         <p:nvGrpSpPr>
-          <p:cNvPr id="15" name="Group 14">
+          <p:cNvPr id="2" name="Group 1">
             <a:extLst>
               <a:ext uri="{FF2B5EF4-FFF2-40B4-BE49-F238E27FC236}">
-                <a16:creationId xmlns:a16="http://schemas.microsoft.com/office/drawing/2014/main" id="{5A8ABE74-CD05-4949-B70A-CCE148996880}"/>
+                <a16:creationId xmlns:a16="http://schemas.microsoft.com/office/drawing/2014/main" id="{898A3823-8B53-0C44-8C80-FD6D898CD5C7}"/>
               </a:ext>
             </a:extLst>
           </p:cNvPr>
@@ -6576,6 +6567,9 @@
               <a:lin ang="18900000" scaled="1"/>
               <a:tileRect/>
             </a:gradFill>
+            <a:ln>
+              <a:noFill/>
+            </a:ln>
           </p:spPr>
           <p:style>
             <a:lnRef idx="2">

</xml_diff>

<commit_message>
update logo for website
</commit_message>
<xml_diff>
--- a/resources/logos.pptx
+++ b/resources/logos.pptx
@@ -5,7 +5,7 @@
     <p:sldMasterId id="2147483648" r:id="rId1"/>
   </p:sldMasterIdLst>
   <p:notesMasterIdLst>
-    <p:notesMasterId r:id="rId17"/>
+    <p:notesMasterId r:id="rId23"/>
   </p:notesMasterIdLst>
   <p:sldIdLst>
     <p:sldId id="256" r:id="rId2"/>
@@ -23,6 +23,12 @@
     <p:sldId id="267" r:id="rId14"/>
     <p:sldId id="270" r:id="rId15"/>
     <p:sldId id="271" r:id="rId16"/>
+    <p:sldId id="272" r:id="rId17"/>
+    <p:sldId id="274" r:id="rId18"/>
+    <p:sldId id="275" r:id="rId19"/>
+    <p:sldId id="273" r:id="rId20"/>
+    <p:sldId id="276" r:id="rId21"/>
+    <p:sldId id="277" r:id="rId22"/>
   </p:sldIdLst>
   <p:sldSz cx="12192000" cy="6858000"/>
   <p:notesSz cx="6858000" cy="9144000"/>
@@ -236,7 +242,7 @@
           <a:p>
             <a:fld id="{FEB29CEE-7550-5F4D-AAD4-BA10048E6F66}" type="datetimeFigureOut">
               <a:rPr lang="en-US" smtClean="0"/>
-              <a:t>4/12/21</a:t>
+              <a:t>4/18/21</a:t>
             </a:fld>
             <a:endParaRPr lang="en-US"/>
           </a:p>
@@ -1126,6 +1132,354 @@
 </p:notes>
 </file>
 
+<file path=ppt/notesSlides/notesSlide16.xml><?xml version="1.0" encoding="utf-8"?>
+<p:notes xmlns:a="http://schemas.openxmlformats.org/drawingml/2006/main" xmlns:r="http://schemas.openxmlformats.org/officeDocument/2006/relationships" xmlns:p="http://schemas.openxmlformats.org/presentationml/2006/main">
+  <p:cSld>
+    <p:spTree>
+      <p:nvGrpSpPr>
+        <p:cNvPr id="1" name=""/>
+        <p:cNvGrpSpPr/>
+        <p:nvPr/>
+      </p:nvGrpSpPr>
+      <p:grpSpPr>
+        <a:xfrm>
+          <a:off x="0" y="0"/>
+          <a:ext cx="0" cy="0"/>
+          <a:chOff x="0" y="0"/>
+          <a:chExt cx="0" cy="0"/>
+        </a:xfrm>
+      </p:grpSpPr>
+      <p:sp>
+        <p:nvSpPr>
+          <p:cNvPr id="2" name="Slide Image Placeholder 1"/>
+          <p:cNvSpPr>
+            <a:spLocks noGrp="1" noRot="1" noChangeAspect="1"/>
+          </p:cNvSpPr>
+          <p:nvPr>
+            <p:ph type="sldImg"/>
+          </p:nvPr>
+        </p:nvSpPr>
+        <p:spPr/>
+      </p:sp>
+      <p:sp>
+        <p:nvSpPr>
+          <p:cNvPr id="3" name="Notes Placeholder 2"/>
+          <p:cNvSpPr>
+            <a:spLocks noGrp="1"/>
+          </p:cNvSpPr>
+          <p:nvPr>
+            <p:ph type="body" idx="1"/>
+          </p:nvPr>
+        </p:nvSpPr>
+        <p:spPr/>
+        <p:txBody>
+          <a:bodyPr/>
+          <a:lstStyle/>
+          <a:p>
+            <a:r>
+              <a:rPr lang="en-US" dirty="0"/>
+              <a:t>Circle favicon logo with circle background – black letter on ring background</a:t>
+            </a:r>
+          </a:p>
+        </p:txBody>
+      </p:sp>
+      <p:sp>
+        <p:nvSpPr>
+          <p:cNvPr id="4" name="Slide Number Placeholder 3"/>
+          <p:cNvSpPr>
+            <a:spLocks noGrp="1"/>
+          </p:cNvSpPr>
+          <p:nvPr>
+            <p:ph type="sldNum" sz="quarter" idx="5"/>
+          </p:nvPr>
+        </p:nvSpPr>
+        <p:spPr/>
+        <p:txBody>
+          <a:bodyPr/>
+          <a:lstStyle/>
+          <a:p>
+            <a:fld id="{37EBE46D-06CB-364A-8678-F123B7961E55}" type="slidenum">
+              <a:rPr lang="en-US" smtClean="0"/>
+              <a:t>16</a:t>
+            </a:fld>
+            <a:endParaRPr lang="en-US"/>
+          </a:p>
+        </p:txBody>
+      </p:sp>
+    </p:spTree>
+    <p:extLst>
+      <p:ext uri="{BB962C8B-B14F-4D97-AF65-F5344CB8AC3E}">
+        <p14:creationId xmlns:p14="http://schemas.microsoft.com/office/powerpoint/2010/main" val="2105099295"/>
+      </p:ext>
+    </p:extLst>
+  </p:cSld>
+  <p:clrMapOvr>
+    <a:masterClrMapping/>
+  </p:clrMapOvr>
+</p:notes>
+</file>
+
+<file path=ppt/notesSlides/notesSlide17.xml><?xml version="1.0" encoding="utf-8"?>
+<p:notes xmlns:a="http://schemas.openxmlformats.org/drawingml/2006/main" xmlns:r="http://schemas.openxmlformats.org/officeDocument/2006/relationships" xmlns:p="http://schemas.openxmlformats.org/presentationml/2006/main">
+  <p:cSld>
+    <p:spTree>
+      <p:nvGrpSpPr>
+        <p:cNvPr id="1" name=""/>
+        <p:cNvGrpSpPr/>
+        <p:nvPr/>
+      </p:nvGrpSpPr>
+      <p:grpSpPr>
+        <a:xfrm>
+          <a:off x="0" y="0"/>
+          <a:ext cx="0" cy="0"/>
+          <a:chOff x="0" y="0"/>
+          <a:chExt cx="0" cy="0"/>
+        </a:xfrm>
+      </p:grpSpPr>
+      <p:sp>
+        <p:nvSpPr>
+          <p:cNvPr id="2" name="Slide Image Placeholder 1"/>
+          <p:cNvSpPr>
+            <a:spLocks noGrp="1" noRot="1" noChangeAspect="1"/>
+          </p:cNvSpPr>
+          <p:nvPr>
+            <p:ph type="sldImg"/>
+          </p:nvPr>
+        </p:nvSpPr>
+        <p:spPr/>
+      </p:sp>
+      <p:sp>
+        <p:nvSpPr>
+          <p:cNvPr id="3" name="Notes Placeholder 2"/>
+          <p:cNvSpPr>
+            <a:spLocks noGrp="1"/>
+          </p:cNvSpPr>
+          <p:nvPr>
+            <p:ph type="body" idx="1"/>
+          </p:nvPr>
+        </p:nvSpPr>
+        <p:spPr/>
+        <p:txBody>
+          <a:bodyPr/>
+          <a:lstStyle/>
+          <a:p>
+            <a:r>
+              <a:rPr lang="en-US" dirty="0"/>
+              <a:t>Circle favicon logo with circle background – black letter on ring background</a:t>
+            </a:r>
+          </a:p>
+        </p:txBody>
+      </p:sp>
+      <p:sp>
+        <p:nvSpPr>
+          <p:cNvPr id="4" name="Slide Number Placeholder 3"/>
+          <p:cNvSpPr>
+            <a:spLocks noGrp="1"/>
+          </p:cNvSpPr>
+          <p:nvPr>
+            <p:ph type="sldNum" sz="quarter" idx="5"/>
+          </p:nvPr>
+        </p:nvSpPr>
+        <p:spPr/>
+        <p:txBody>
+          <a:bodyPr/>
+          <a:lstStyle/>
+          <a:p>
+            <a:fld id="{37EBE46D-06CB-364A-8678-F123B7961E55}" type="slidenum">
+              <a:rPr lang="en-US" smtClean="0"/>
+              <a:t>17</a:t>
+            </a:fld>
+            <a:endParaRPr lang="en-US"/>
+          </a:p>
+        </p:txBody>
+      </p:sp>
+    </p:spTree>
+    <p:extLst>
+      <p:ext uri="{BB962C8B-B14F-4D97-AF65-F5344CB8AC3E}">
+        <p14:creationId xmlns:p14="http://schemas.microsoft.com/office/powerpoint/2010/main" val="2518386246"/>
+      </p:ext>
+    </p:extLst>
+  </p:cSld>
+  <p:clrMapOvr>
+    <a:masterClrMapping/>
+  </p:clrMapOvr>
+</p:notes>
+</file>
+
+<file path=ppt/notesSlides/notesSlide18.xml><?xml version="1.0" encoding="utf-8"?>
+<p:notes xmlns:a="http://schemas.openxmlformats.org/drawingml/2006/main" xmlns:r="http://schemas.openxmlformats.org/officeDocument/2006/relationships" xmlns:p="http://schemas.openxmlformats.org/presentationml/2006/main">
+  <p:cSld>
+    <p:spTree>
+      <p:nvGrpSpPr>
+        <p:cNvPr id="1" name=""/>
+        <p:cNvGrpSpPr/>
+        <p:nvPr/>
+      </p:nvGrpSpPr>
+      <p:grpSpPr>
+        <a:xfrm>
+          <a:off x="0" y="0"/>
+          <a:ext cx="0" cy="0"/>
+          <a:chOff x="0" y="0"/>
+          <a:chExt cx="0" cy="0"/>
+        </a:xfrm>
+      </p:grpSpPr>
+      <p:sp>
+        <p:nvSpPr>
+          <p:cNvPr id="2" name="Slide Image Placeholder 1"/>
+          <p:cNvSpPr>
+            <a:spLocks noGrp="1" noRot="1" noChangeAspect="1"/>
+          </p:cNvSpPr>
+          <p:nvPr>
+            <p:ph type="sldImg"/>
+          </p:nvPr>
+        </p:nvSpPr>
+        <p:spPr/>
+      </p:sp>
+      <p:sp>
+        <p:nvSpPr>
+          <p:cNvPr id="3" name="Notes Placeholder 2"/>
+          <p:cNvSpPr>
+            <a:spLocks noGrp="1"/>
+          </p:cNvSpPr>
+          <p:nvPr>
+            <p:ph type="body" idx="1"/>
+          </p:nvPr>
+        </p:nvSpPr>
+        <p:spPr/>
+        <p:txBody>
+          <a:bodyPr/>
+          <a:lstStyle/>
+          <a:p>
+            <a:r>
+              <a:rPr lang="en-US" dirty="0"/>
+              <a:t>Circle favicon logo with circle background – black letter on ring background</a:t>
+            </a:r>
+          </a:p>
+        </p:txBody>
+      </p:sp>
+      <p:sp>
+        <p:nvSpPr>
+          <p:cNvPr id="4" name="Slide Number Placeholder 3"/>
+          <p:cNvSpPr>
+            <a:spLocks noGrp="1"/>
+          </p:cNvSpPr>
+          <p:nvPr>
+            <p:ph type="sldNum" sz="quarter" idx="5"/>
+          </p:nvPr>
+        </p:nvSpPr>
+        <p:spPr/>
+        <p:txBody>
+          <a:bodyPr/>
+          <a:lstStyle/>
+          <a:p>
+            <a:fld id="{37EBE46D-06CB-364A-8678-F123B7961E55}" type="slidenum">
+              <a:rPr lang="en-US" smtClean="0"/>
+              <a:t>18</a:t>
+            </a:fld>
+            <a:endParaRPr lang="en-US"/>
+          </a:p>
+        </p:txBody>
+      </p:sp>
+    </p:spTree>
+    <p:extLst>
+      <p:ext uri="{BB962C8B-B14F-4D97-AF65-F5344CB8AC3E}">
+        <p14:creationId xmlns:p14="http://schemas.microsoft.com/office/powerpoint/2010/main" val="854440519"/>
+      </p:ext>
+    </p:extLst>
+  </p:cSld>
+  <p:clrMapOvr>
+    <a:masterClrMapping/>
+  </p:clrMapOvr>
+</p:notes>
+</file>
+
+<file path=ppt/notesSlides/notesSlide19.xml><?xml version="1.0" encoding="utf-8"?>
+<p:notes xmlns:a="http://schemas.openxmlformats.org/drawingml/2006/main" xmlns:r="http://schemas.openxmlformats.org/officeDocument/2006/relationships" xmlns:p="http://schemas.openxmlformats.org/presentationml/2006/main">
+  <p:cSld>
+    <p:spTree>
+      <p:nvGrpSpPr>
+        <p:cNvPr id="1" name=""/>
+        <p:cNvGrpSpPr/>
+        <p:nvPr/>
+      </p:nvGrpSpPr>
+      <p:grpSpPr>
+        <a:xfrm>
+          <a:off x="0" y="0"/>
+          <a:ext cx="0" cy="0"/>
+          <a:chOff x="0" y="0"/>
+          <a:chExt cx="0" cy="0"/>
+        </a:xfrm>
+      </p:grpSpPr>
+      <p:sp>
+        <p:nvSpPr>
+          <p:cNvPr id="2" name="Slide Image Placeholder 1"/>
+          <p:cNvSpPr>
+            <a:spLocks noGrp="1" noRot="1" noChangeAspect="1"/>
+          </p:cNvSpPr>
+          <p:nvPr>
+            <p:ph type="sldImg"/>
+          </p:nvPr>
+        </p:nvSpPr>
+        <p:spPr/>
+      </p:sp>
+      <p:sp>
+        <p:nvSpPr>
+          <p:cNvPr id="3" name="Notes Placeholder 2"/>
+          <p:cNvSpPr>
+            <a:spLocks noGrp="1"/>
+          </p:cNvSpPr>
+          <p:nvPr>
+            <p:ph type="body" idx="1"/>
+          </p:nvPr>
+        </p:nvSpPr>
+        <p:spPr/>
+        <p:txBody>
+          <a:bodyPr/>
+          <a:lstStyle/>
+          <a:p>
+            <a:r>
+              <a:rPr lang="en-US" dirty="0"/>
+              <a:t>Circle favicon logo with circle background – black letter on ring background</a:t>
+            </a:r>
+          </a:p>
+        </p:txBody>
+      </p:sp>
+      <p:sp>
+        <p:nvSpPr>
+          <p:cNvPr id="4" name="Slide Number Placeholder 3"/>
+          <p:cNvSpPr>
+            <a:spLocks noGrp="1"/>
+          </p:cNvSpPr>
+          <p:nvPr>
+            <p:ph type="sldNum" sz="quarter" idx="5"/>
+          </p:nvPr>
+        </p:nvSpPr>
+        <p:spPr/>
+        <p:txBody>
+          <a:bodyPr/>
+          <a:lstStyle/>
+          <a:p>
+            <a:fld id="{37EBE46D-06CB-364A-8678-F123B7961E55}" type="slidenum">
+              <a:rPr lang="en-US" smtClean="0"/>
+              <a:t>19</a:t>
+            </a:fld>
+            <a:endParaRPr lang="en-US"/>
+          </a:p>
+        </p:txBody>
+      </p:sp>
+    </p:spTree>
+    <p:extLst>
+      <p:ext uri="{BB962C8B-B14F-4D97-AF65-F5344CB8AC3E}">
+        <p14:creationId xmlns:p14="http://schemas.microsoft.com/office/powerpoint/2010/main" val="4288607609"/>
+      </p:ext>
+    </p:extLst>
+  </p:cSld>
+  <p:clrMapOvr>
+    <a:masterClrMapping/>
+  </p:clrMapOvr>
+</p:notes>
+</file>
+
 <file path=ppt/notesSlides/notesSlide2.xml><?xml version="1.0" encoding="utf-8"?>
 <p:notes xmlns:a="http://schemas.openxmlformats.org/drawingml/2006/main" xmlns:r="http://schemas.openxmlformats.org/officeDocument/2006/relationships" xmlns:p="http://schemas.openxmlformats.org/presentationml/2006/main">
   <p:cSld>
@@ -1201,6 +1555,180 @@
     <p:extLst>
       <p:ext uri="{BB962C8B-B14F-4D97-AF65-F5344CB8AC3E}">
         <p14:creationId xmlns:p14="http://schemas.microsoft.com/office/powerpoint/2010/main" val="3051041882"/>
+      </p:ext>
+    </p:extLst>
+  </p:cSld>
+  <p:clrMapOvr>
+    <a:masterClrMapping/>
+  </p:clrMapOvr>
+</p:notes>
+</file>
+
+<file path=ppt/notesSlides/notesSlide20.xml><?xml version="1.0" encoding="utf-8"?>
+<p:notes xmlns:a="http://schemas.openxmlformats.org/drawingml/2006/main" xmlns:r="http://schemas.openxmlformats.org/officeDocument/2006/relationships" xmlns:p="http://schemas.openxmlformats.org/presentationml/2006/main">
+  <p:cSld>
+    <p:spTree>
+      <p:nvGrpSpPr>
+        <p:cNvPr id="1" name=""/>
+        <p:cNvGrpSpPr/>
+        <p:nvPr/>
+      </p:nvGrpSpPr>
+      <p:grpSpPr>
+        <a:xfrm>
+          <a:off x="0" y="0"/>
+          <a:ext cx="0" cy="0"/>
+          <a:chOff x="0" y="0"/>
+          <a:chExt cx="0" cy="0"/>
+        </a:xfrm>
+      </p:grpSpPr>
+      <p:sp>
+        <p:nvSpPr>
+          <p:cNvPr id="2" name="Slide Image Placeholder 1"/>
+          <p:cNvSpPr>
+            <a:spLocks noGrp="1" noRot="1" noChangeAspect="1"/>
+          </p:cNvSpPr>
+          <p:nvPr>
+            <p:ph type="sldImg"/>
+          </p:nvPr>
+        </p:nvSpPr>
+        <p:spPr/>
+      </p:sp>
+      <p:sp>
+        <p:nvSpPr>
+          <p:cNvPr id="3" name="Notes Placeholder 2"/>
+          <p:cNvSpPr>
+            <a:spLocks noGrp="1"/>
+          </p:cNvSpPr>
+          <p:nvPr>
+            <p:ph type="body" idx="1"/>
+          </p:nvPr>
+        </p:nvSpPr>
+        <p:spPr/>
+        <p:txBody>
+          <a:bodyPr/>
+          <a:lstStyle/>
+          <a:p>
+            <a:r>
+              <a:rPr lang="en-US" dirty="0"/>
+              <a:t>Final logo design awaiting confirmation from Tony</a:t>
+            </a:r>
+          </a:p>
+        </p:txBody>
+      </p:sp>
+      <p:sp>
+        <p:nvSpPr>
+          <p:cNvPr id="4" name="Slide Number Placeholder 3"/>
+          <p:cNvSpPr>
+            <a:spLocks noGrp="1"/>
+          </p:cNvSpPr>
+          <p:nvPr>
+            <p:ph type="sldNum" sz="quarter" idx="5"/>
+          </p:nvPr>
+        </p:nvSpPr>
+        <p:spPr/>
+        <p:txBody>
+          <a:bodyPr/>
+          <a:lstStyle/>
+          <a:p>
+            <a:fld id="{37EBE46D-06CB-364A-8678-F123B7961E55}" type="slidenum">
+              <a:rPr lang="en-US" smtClean="0"/>
+              <a:t>20</a:t>
+            </a:fld>
+            <a:endParaRPr lang="en-US"/>
+          </a:p>
+        </p:txBody>
+      </p:sp>
+    </p:spTree>
+    <p:extLst>
+      <p:ext uri="{BB962C8B-B14F-4D97-AF65-F5344CB8AC3E}">
+        <p14:creationId xmlns:p14="http://schemas.microsoft.com/office/powerpoint/2010/main" val="2446772615"/>
+      </p:ext>
+    </p:extLst>
+  </p:cSld>
+  <p:clrMapOvr>
+    <a:masterClrMapping/>
+  </p:clrMapOvr>
+</p:notes>
+</file>
+
+<file path=ppt/notesSlides/notesSlide21.xml><?xml version="1.0" encoding="utf-8"?>
+<p:notes xmlns:a="http://schemas.openxmlformats.org/drawingml/2006/main" xmlns:r="http://schemas.openxmlformats.org/officeDocument/2006/relationships" xmlns:p="http://schemas.openxmlformats.org/presentationml/2006/main">
+  <p:cSld>
+    <p:spTree>
+      <p:nvGrpSpPr>
+        <p:cNvPr id="1" name=""/>
+        <p:cNvGrpSpPr/>
+        <p:nvPr/>
+      </p:nvGrpSpPr>
+      <p:grpSpPr>
+        <a:xfrm>
+          <a:off x="0" y="0"/>
+          <a:ext cx="0" cy="0"/>
+          <a:chOff x="0" y="0"/>
+          <a:chExt cx="0" cy="0"/>
+        </a:xfrm>
+      </p:grpSpPr>
+      <p:sp>
+        <p:nvSpPr>
+          <p:cNvPr id="2" name="Slide Image Placeholder 1"/>
+          <p:cNvSpPr>
+            <a:spLocks noGrp="1" noRot="1" noChangeAspect="1"/>
+          </p:cNvSpPr>
+          <p:nvPr>
+            <p:ph type="sldImg"/>
+          </p:nvPr>
+        </p:nvSpPr>
+        <p:spPr/>
+      </p:sp>
+      <p:sp>
+        <p:nvSpPr>
+          <p:cNvPr id="3" name="Notes Placeholder 2"/>
+          <p:cNvSpPr>
+            <a:spLocks noGrp="1"/>
+          </p:cNvSpPr>
+          <p:nvPr>
+            <p:ph type="body" idx="1"/>
+          </p:nvPr>
+        </p:nvSpPr>
+        <p:spPr/>
+        <p:txBody>
+          <a:bodyPr/>
+          <a:lstStyle/>
+          <a:p>
+            <a:r>
+              <a:rPr lang="en-US" dirty="0"/>
+              <a:t>Final favicon logo design awaiting confirmation from Tony</a:t>
+            </a:r>
+          </a:p>
+        </p:txBody>
+      </p:sp>
+      <p:sp>
+        <p:nvSpPr>
+          <p:cNvPr id="4" name="Slide Number Placeholder 3"/>
+          <p:cNvSpPr>
+            <a:spLocks noGrp="1"/>
+          </p:cNvSpPr>
+          <p:nvPr>
+            <p:ph type="sldNum" sz="quarter" idx="5"/>
+          </p:nvPr>
+        </p:nvSpPr>
+        <p:spPr/>
+        <p:txBody>
+          <a:bodyPr/>
+          <a:lstStyle/>
+          <a:p>
+            <a:fld id="{37EBE46D-06CB-364A-8678-F123B7961E55}" type="slidenum">
+              <a:rPr lang="en-US" smtClean="0"/>
+              <a:t>21</a:t>
+            </a:fld>
+            <a:endParaRPr lang="en-US"/>
+          </a:p>
+        </p:txBody>
+      </p:sp>
+    </p:spTree>
+    <p:extLst>
+      <p:ext uri="{BB962C8B-B14F-4D97-AF65-F5344CB8AC3E}">
+        <p14:creationId xmlns:p14="http://schemas.microsoft.com/office/powerpoint/2010/main" val="1870320372"/>
       </p:ext>
     </p:extLst>
   </p:cSld>
@@ -1948,7 +2476,7 @@
           <a:p>
             <a:fld id="{18A9FC8D-95A3-944C-8EC7-78D73130DFAB}" type="datetimeFigureOut">
               <a:rPr lang="en-US" smtClean="0"/>
-              <a:t>4/12/21</a:t>
+              <a:t>4/18/21</a:t>
             </a:fld>
             <a:endParaRPr lang="en-US"/>
           </a:p>
@@ -2146,7 +2674,7 @@
           <a:p>
             <a:fld id="{18A9FC8D-95A3-944C-8EC7-78D73130DFAB}" type="datetimeFigureOut">
               <a:rPr lang="en-US" smtClean="0"/>
-              <a:t>4/12/21</a:t>
+              <a:t>4/18/21</a:t>
             </a:fld>
             <a:endParaRPr lang="en-US"/>
           </a:p>
@@ -2354,7 +2882,7 @@
           <a:p>
             <a:fld id="{18A9FC8D-95A3-944C-8EC7-78D73130DFAB}" type="datetimeFigureOut">
               <a:rPr lang="en-US" smtClean="0"/>
-              <a:t>4/12/21</a:t>
+              <a:t>4/18/21</a:t>
             </a:fld>
             <a:endParaRPr lang="en-US"/>
           </a:p>
@@ -2552,7 +3080,7 @@
           <a:p>
             <a:fld id="{18A9FC8D-95A3-944C-8EC7-78D73130DFAB}" type="datetimeFigureOut">
               <a:rPr lang="en-US" smtClean="0"/>
-              <a:t>4/12/21</a:t>
+              <a:t>4/18/21</a:t>
             </a:fld>
             <a:endParaRPr lang="en-US"/>
           </a:p>
@@ -2827,7 +3355,7 @@
           <a:p>
             <a:fld id="{18A9FC8D-95A3-944C-8EC7-78D73130DFAB}" type="datetimeFigureOut">
               <a:rPr lang="en-US" smtClean="0"/>
-              <a:t>4/12/21</a:t>
+              <a:t>4/18/21</a:t>
             </a:fld>
             <a:endParaRPr lang="en-US"/>
           </a:p>
@@ -3092,7 +3620,7 @@
           <a:p>
             <a:fld id="{18A9FC8D-95A3-944C-8EC7-78D73130DFAB}" type="datetimeFigureOut">
               <a:rPr lang="en-US" smtClean="0"/>
-              <a:t>4/12/21</a:t>
+              <a:t>4/18/21</a:t>
             </a:fld>
             <a:endParaRPr lang="en-US"/>
           </a:p>
@@ -3504,7 +4032,7 @@
           <a:p>
             <a:fld id="{18A9FC8D-95A3-944C-8EC7-78D73130DFAB}" type="datetimeFigureOut">
               <a:rPr lang="en-US" smtClean="0"/>
-              <a:t>4/12/21</a:t>
+              <a:t>4/18/21</a:t>
             </a:fld>
             <a:endParaRPr lang="en-US"/>
           </a:p>
@@ -3645,7 +4173,7 @@
           <a:p>
             <a:fld id="{18A9FC8D-95A3-944C-8EC7-78D73130DFAB}" type="datetimeFigureOut">
               <a:rPr lang="en-US" smtClean="0"/>
-              <a:t>4/12/21</a:t>
+              <a:t>4/18/21</a:t>
             </a:fld>
             <a:endParaRPr lang="en-US"/>
           </a:p>
@@ -3758,7 +4286,7 @@
           <a:p>
             <a:fld id="{18A9FC8D-95A3-944C-8EC7-78D73130DFAB}" type="datetimeFigureOut">
               <a:rPr lang="en-US" smtClean="0"/>
-              <a:t>4/12/21</a:t>
+              <a:t>4/18/21</a:t>
             </a:fld>
             <a:endParaRPr lang="en-US"/>
           </a:p>
@@ -4069,7 +4597,7 @@
           <a:p>
             <a:fld id="{18A9FC8D-95A3-944C-8EC7-78D73130DFAB}" type="datetimeFigureOut">
               <a:rPr lang="en-US" smtClean="0"/>
-              <a:t>4/12/21</a:t>
+              <a:t>4/18/21</a:t>
             </a:fld>
             <a:endParaRPr lang="en-US"/>
           </a:p>
@@ -4357,7 +4885,7 @@
           <a:p>
             <a:fld id="{18A9FC8D-95A3-944C-8EC7-78D73130DFAB}" type="datetimeFigureOut">
               <a:rPr lang="en-US" smtClean="0"/>
-              <a:t>4/12/21</a:t>
+              <a:t>4/18/21</a:t>
             </a:fld>
             <a:endParaRPr lang="en-US"/>
           </a:p>
@@ -4598,7 +5126,7 @@
           <a:p>
             <a:fld id="{18A9FC8D-95A3-944C-8EC7-78D73130DFAB}" type="datetimeFigureOut">
               <a:rPr lang="en-US" smtClean="0"/>
-              <a:t>4/12/21</a:t>
+              <a:t>4/18/21</a:t>
             </a:fld>
             <a:endParaRPr lang="en-US"/>
           </a:p>
@@ -6455,12 +6983,189 @@
           <a:chExt cx="0" cy="0"/>
         </a:xfrm>
       </p:grpSpPr>
+      <p:sp>
+        <p:nvSpPr>
+          <p:cNvPr id="6" name="Oval 5">
+            <a:extLst>
+              <a:ext uri="{FF2B5EF4-FFF2-40B4-BE49-F238E27FC236}">
+                <a16:creationId xmlns:a16="http://schemas.microsoft.com/office/drawing/2014/main" id="{1945A6E5-9E86-5B47-987D-996F1E0EA71A}"/>
+              </a:ext>
+            </a:extLst>
+          </p:cNvPr>
+          <p:cNvSpPr/>
+          <p:nvPr/>
+        </p:nvSpPr>
+        <p:spPr>
+          <a:xfrm>
+            <a:off x="3914503" y="1247503"/>
+            <a:ext cx="4362994" cy="4362994"/>
+          </a:xfrm>
+          <a:prstGeom prst="ellipse">
+            <a:avLst/>
+          </a:prstGeom>
+          <a:solidFill>
+            <a:schemeClr val="bg1"/>
+          </a:solidFill>
+          <a:ln>
+            <a:noFill/>
+          </a:ln>
+        </p:spPr>
+        <p:style>
+          <a:lnRef idx="2">
+            <a:schemeClr val="accent1">
+              <a:shade val="50000"/>
+            </a:schemeClr>
+          </a:lnRef>
+          <a:fillRef idx="1">
+            <a:schemeClr val="accent1"/>
+          </a:fillRef>
+          <a:effectRef idx="0">
+            <a:schemeClr val="accent1"/>
+          </a:effectRef>
+          <a:fontRef idx="minor">
+            <a:schemeClr val="lt1"/>
+          </a:fontRef>
+        </p:style>
+        <p:txBody>
+          <a:bodyPr rtlCol="0" anchor="ctr"/>
+          <a:lstStyle/>
+          <a:p>
+            <a:pPr algn="ctr"/>
+            <a:endParaRPr lang="en-US" b="1"/>
+          </a:p>
+        </p:txBody>
+      </p:sp>
+      <p:sp>
+        <p:nvSpPr>
+          <p:cNvPr id="4" name="Oval 3">
+            <a:extLst>
+              <a:ext uri="{FF2B5EF4-FFF2-40B4-BE49-F238E27FC236}">
+                <a16:creationId xmlns:a16="http://schemas.microsoft.com/office/drawing/2014/main" id="{9A6DA34C-F484-5E43-BB32-A3AEB809FFC8}"/>
+              </a:ext>
+            </a:extLst>
+          </p:cNvPr>
+          <p:cNvSpPr/>
+          <p:nvPr/>
+        </p:nvSpPr>
+        <p:spPr>
+          <a:xfrm rot="164111">
+            <a:off x="4185160" y="1516465"/>
+            <a:ext cx="3821682" cy="3825072"/>
+          </a:xfrm>
+          <a:prstGeom prst="ellipse">
+            <a:avLst/>
+          </a:prstGeom>
+          <a:gradFill flip="none" rotWithShape="1">
+            <a:gsLst>
+              <a:gs pos="29000">
+                <a:schemeClr val="bg2">
+                  <a:lumMod val="50000"/>
+                </a:schemeClr>
+              </a:gs>
+              <a:gs pos="69000">
+                <a:srgbClr val="006688"/>
+              </a:gs>
+              <a:gs pos="100000">
+                <a:srgbClr val="0066CC">
+                  <a:shade val="100000"/>
+                  <a:satMod val="115000"/>
+                </a:srgbClr>
+              </a:gs>
+            </a:gsLst>
+            <a:lin ang="18900000" scaled="1"/>
+            <a:tileRect/>
+          </a:gradFill>
+          <a:ln>
+            <a:noFill/>
+          </a:ln>
+        </p:spPr>
+        <p:style>
+          <a:lnRef idx="2">
+            <a:schemeClr val="accent1">
+              <a:shade val="50000"/>
+            </a:schemeClr>
+          </a:lnRef>
+          <a:fillRef idx="1">
+            <a:schemeClr val="accent1"/>
+          </a:fillRef>
+          <a:effectRef idx="0">
+            <a:schemeClr val="accent1"/>
+          </a:effectRef>
+          <a:fontRef idx="minor">
+            <a:schemeClr val="lt1"/>
+          </a:fontRef>
+        </p:style>
+        <p:txBody>
+          <a:bodyPr rtlCol="0" anchor="ctr"/>
+          <a:lstStyle/>
+          <a:p>
+            <a:pPr algn="ctr"/>
+            <a:endParaRPr lang="en-US" b="1"/>
+          </a:p>
+        </p:txBody>
+      </p:sp>
+      <p:sp>
+        <p:nvSpPr>
+          <p:cNvPr id="5" name="Oval 4">
+            <a:extLst>
+              <a:ext uri="{FF2B5EF4-FFF2-40B4-BE49-F238E27FC236}">
+                <a16:creationId xmlns:a16="http://schemas.microsoft.com/office/drawing/2014/main" id="{4223DED6-A217-3A44-AEBB-7F223EF01681}"/>
+              </a:ext>
+            </a:extLst>
+          </p:cNvPr>
+          <p:cNvSpPr/>
+          <p:nvPr/>
+        </p:nvSpPr>
+        <p:spPr>
+          <a:xfrm>
+            <a:off x="4605132" y="1934074"/>
+            <a:ext cx="2981738" cy="2989854"/>
+          </a:xfrm>
+          <a:prstGeom prst="ellipse">
+            <a:avLst/>
+          </a:prstGeom>
+          <a:solidFill>
+            <a:schemeClr val="bg1"/>
+          </a:solidFill>
+          <a:ln>
+            <a:noFill/>
+          </a:ln>
+        </p:spPr>
+        <p:style>
+          <a:lnRef idx="2">
+            <a:schemeClr val="accent1">
+              <a:shade val="50000"/>
+            </a:schemeClr>
+          </a:lnRef>
+          <a:fillRef idx="1">
+            <a:schemeClr val="accent1"/>
+          </a:fillRef>
+          <a:effectRef idx="0">
+            <a:schemeClr val="accent1"/>
+          </a:effectRef>
+          <a:fontRef idx="minor">
+            <a:schemeClr val="lt1"/>
+          </a:fontRef>
+        </p:style>
+        <p:txBody>
+          <a:bodyPr rtlCol="0" anchor="ctr"/>
+          <a:lstStyle/>
+          <a:p>
+            <a:pPr algn="ctr"/>
+            <a:endParaRPr lang="en-US" b="1" dirty="0">
+              <a:solidFill>
+                <a:schemeClr val="bg1"/>
+              </a:solidFill>
+            </a:endParaRPr>
+          </a:p>
+        </p:txBody>
+      </p:sp>
       <p:grpSp>
         <p:nvGrpSpPr>
-          <p:cNvPr id="2" name="Group 1">
+          <p:cNvPr id="12" name="Group 11">
             <a:extLst>
               <a:ext uri="{FF2B5EF4-FFF2-40B4-BE49-F238E27FC236}">
-                <a16:creationId xmlns:a16="http://schemas.microsoft.com/office/drawing/2014/main" id="{898A3823-8B53-0C44-8C80-FD6D898CD5C7}"/>
+                <a16:creationId xmlns:a16="http://schemas.microsoft.com/office/drawing/2014/main" id="{0BE44F2D-C00D-A646-9A8A-8E51B867CAEF}"/>
               </a:ext>
             </a:extLst>
           </p:cNvPr>
@@ -6471,16 +7176,1021 @@
           <a:xfrm>
             <a:off x="2327349" y="177615"/>
             <a:ext cx="7550554" cy="6512710"/>
-            <a:chOff x="2327349" y="177615"/>
-            <a:chExt cx="7550554" cy="6512710"/>
+            <a:chOff x="6675420" y="2264742"/>
+            <a:chExt cx="4524053" cy="3902213"/>
           </a:xfrm>
         </p:grpSpPr>
+        <p:pic>
+          <p:nvPicPr>
+            <p:cNvPr id="14" name="Picture 13" descr="Shape&#10;&#10;Description automatically generated with low confidence">
+              <a:extLst>
+                <a:ext uri="{FF2B5EF4-FFF2-40B4-BE49-F238E27FC236}">
+                  <a16:creationId xmlns:a16="http://schemas.microsoft.com/office/drawing/2014/main" id="{614ED623-D1B8-9547-A659-24D125E86E30}"/>
+                </a:ext>
+              </a:extLst>
+            </p:cNvPr>
+            <p:cNvPicPr>
+              <a:picLocks noChangeAspect="1"/>
+            </p:cNvPicPr>
+            <p:nvPr/>
+          </p:nvPicPr>
+          <p:blipFill>
+            <a:blip r:embed="rId3"/>
+            <a:stretch>
+              <a:fillRect/>
+            </a:stretch>
+          </p:blipFill>
+          <p:spPr>
+            <a:xfrm>
+              <a:off x="7300573" y="2268055"/>
+              <a:ext cx="3898900" cy="3898900"/>
+            </a:xfrm>
+            <a:prstGeom prst="rect">
+              <a:avLst/>
+            </a:prstGeom>
+          </p:spPr>
+        </p:pic>
+        <p:pic>
+          <p:nvPicPr>
+            <p:cNvPr id="13" name="Picture 12" descr="Shape&#10;&#10;Description automatically generated with low confidence">
+              <a:extLst>
+                <a:ext uri="{FF2B5EF4-FFF2-40B4-BE49-F238E27FC236}">
+                  <a16:creationId xmlns:a16="http://schemas.microsoft.com/office/drawing/2014/main" id="{EF71631E-CDE8-404F-B288-221351E8D3A8}"/>
+                </a:ext>
+              </a:extLst>
+            </p:cNvPr>
+            <p:cNvPicPr>
+              <a:picLocks noChangeAspect="1"/>
+            </p:cNvPicPr>
+            <p:nvPr/>
+          </p:nvPicPr>
+          <p:blipFill>
+            <a:blip r:embed="rId4"/>
+            <a:stretch>
+              <a:fillRect/>
+            </a:stretch>
+          </p:blipFill>
+          <p:spPr>
+            <a:xfrm>
+              <a:off x="6675420" y="2264742"/>
+              <a:ext cx="3898900" cy="3898900"/>
+            </a:xfrm>
+            <a:prstGeom prst="rect">
+              <a:avLst/>
+            </a:prstGeom>
+          </p:spPr>
+        </p:pic>
+      </p:grpSp>
+    </p:spTree>
+    <p:extLst>
+      <p:ext uri="{BB962C8B-B14F-4D97-AF65-F5344CB8AC3E}">
+        <p14:creationId xmlns:p14="http://schemas.microsoft.com/office/powerpoint/2010/main" val="1886396496"/>
+      </p:ext>
+    </p:extLst>
+  </p:cSld>
+  <p:clrMapOvr>
+    <a:masterClrMapping/>
+  </p:clrMapOvr>
+</p:sld>
+</file>
+
+<file path=ppt/slides/slide16.xml><?xml version="1.0" encoding="utf-8"?>
+<p:sld xmlns:a="http://schemas.openxmlformats.org/drawingml/2006/main" xmlns:r="http://schemas.openxmlformats.org/officeDocument/2006/relationships" xmlns:p="http://schemas.openxmlformats.org/presentationml/2006/main">
+  <p:cSld>
+    <p:spTree>
+      <p:nvGrpSpPr>
+        <p:cNvPr id="1" name=""/>
+        <p:cNvGrpSpPr/>
+        <p:nvPr/>
+      </p:nvGrpSpPr>
+      <p:grpSpPr>
+        <a:xfrm>
+          <a:off x="0" y="0"/>
+          <a:ext cx="0" cy="0"/>
+          <a:chOff x="0" y="0"/>
+          <a:chExt cx="0" cy="0"/>
+        </a:xfrm>
+      </p:grpSpPr>
+      <p:grpSp>
+        <p:nvGrpSpPr>
+          <p:cNvPr id="8" name="Group 7">
+            <a:extLst>
+              <a:ext uri="{FF2B5EF4-FFF2-40B4-BE49-F238E27FC236}">
+                <a16:creationId xmlns:a16="http://schemas.microsoft.com/office/drawing/2014/main" id="{386DA764-6E7A-B141-8BB0-CA5ED17F80B9}"/>
+              </a:ext>
+            </a:extLst>
+          </p:cNvPr>
+          <p:cNvGrpSpPr/>
+          <p:nvPr/>
+        </p:nvGrpSpPr>
+        <p:grpSpPr>
+          <a:xfrm rot="20096518">
+            <a:off x="1925970" y="2493132"/>
+            <a:ext cx="5021462" cy="2337009"/>
+            <a:chOff x="39026" y="2778337"/>
+            <a:chExt cx="6497572" cy="3099815"/>
+          </a:xfrm>
+        </p:grpSpPr>
+        <p:sp>
+          <p:nvSpPr>
+            <p:cNvPr id="17" name="Oval 16">
+              <a:extLst>
+                <a:ext uri="{FF2B5EF4-FFF2-40B4-BE49-F238E27FC236}">
+                  <a16:creationId xmlns:a16="http://schemas.microsoft.com/office/drawing/2014/main" id="{B113746C-E66E-C349-8618-0DB10FA1E894}"/>
+                </a:ext>
+              </a:extLst>
+            </p:cNvPr>
+            <p:cNvSpPr/>
+            <p:nvPr/>
+          </p:nvSpPr>
+          <p:spPr>
+            <a:xfrm rot="18562906" flipH="1">
+              <a:off x="1765856" y="1107411"/>
+              <a:ext cx="3043911" cy="6497572"/>
+            </a:xfrm>
+            <a:prstGeom prst="ellipse">
+              <a:avLst/>
+            </a:prstGeom>
+            <a:gradFill flip="none" rotWithShape="1">
+              <a:gsLst>
+                <a:gs pos="42000">
+                  <a:schemeClr val="bg2">
+                    <a:lumMod val="50000"/>
+                  </a:schemeClr>
+                </a:gs>
+                <a:gs pos="83000">
+                  <a:srgbClr val="006688"/>
+                </a:gs>
+                <a:gs pos="100000">
+                  <a:srgbClr val="0066CC">
+                    <a:shade val="100000"/>
+                    <a:satMod val="115000"/>
+                  </a:srgbClr>
+                </a:gs>
+              </a:gsLst>
+              <a:lin ang="18900000" scaled="1"/>
+              <a:tileRect/>
+            </a:gradFill>
+            <a:ln>
+              <a:noFill/>
+            </a:ln>
+          </p:spPr>
+          <p:style>
+            <a:lnRef idx="2">
+              <a:schemeClr val="accent1">
+                <a:shade val="50000"/>
+              </a:schemeClr>
+            </a:lnRef>
+            <a:fillRef idx="1">
+              <a:schemeClr val="accent1"/>
+            </a:fillRef>
+            <a:effectRef idx="0">
+              <a:schemeClr val="accent1"/>
+            </a:effectRef>
+            <a:fontRef idx="minor">
+              <a:schemeClr val="lt1"/>
+            </a:fontRef>
+          </p:style>
+          <p:txBody>
+            <a:bodyPr rtlCol="0" anchor="ctr"/>
+            <a:lstStyle/>
+            <a:p>
+              <a:pPr algn="ctr"/>
+              <a:endParaRPr lang="en-US"/>
+            </a:p>
+          </p:txBody>
+        </p:sp>
+        <p:sp>
+          <p:nvSpPr>
+            <p:cNvPr id="18" name="Oval 17">
+              <a:extLst>
+                <a:ext uri="{FF2B5EF4-FFF2-40B4-BE49-F238E27FC236}">
+                  <a16:creationId xmlns:a16="http://schemas.microsoft.com/office/drawing/2014/main" id="{3F0E843C-3242-934A-B9C5-3564716936E5}"/>
+                </a:ext>
+              </a:extLst>
+            </p:cNvPr>
+            <p:cNvSpPr/>
+            <p:nvPr/>
+          </p:nvSpPr>
+          <p:spPr>
+            <a:xfrm rot="18528811" flipH="1">
+              <a:off x="2090362" y="1218580"/>
+              <a:ext cx="2838382" cy="5957895"/>
+            </a:xfrm>
+            <a:prstGeom prst="ellipse">
+              <a:avLst/>
+            </a:prstGeom>
+            <a:solidFill>
+              <a:schemeClr val="bg1"/>
+            </a:solidFill>
+            <a:ln>
+              <a:noFill/>
+            </a:ln>
+          </p:spPr>
+          <p:style>
+            <a:lnRef idx="2">
+              <a:schemeClr val="accent1">
+                <a:shade val="50000"/>
+              </a:schemeClr>
+            </a:lnRef>
+            <a:fillRef idx="1">
+              <a:schemeClr val="accent1"/>
+            </a:fillRef>
+            <a:effectRef idx="0">
+              <a:schemeClr val="accent1"/>
+            </a:effectRef>
+            <a:fontRef idx="minor">
+              <a:schemeClr val="lt1"/>
+            </a:fontRef>
+          </p:style>
+          <p:txBody>
+            <a:bodyPr rtlCol="0" anchor="ctr"/>
+            <a:lstStyle/>
+            <a:p>
+              <a:pPr algn="ctr"/>
+              <a:endParaRPr lang="en-US">
+                <a:solidFill>
+                  <a:schemeClr val="bg1"/>
+                </a:solidFill>
+              </a:endParaRPr>
+            </a:p>
+          </p:txBody>
+        </p:sp>
+      </p:grpSp>
+      <p:pic>
+        <p:nvPicPr>
+          <p:cNvPr id="7" name="Picture 6" descr="Shape&#10;&#10;Description automatically generated with low confidence">
+            <a:extLst>
+              <a:ext uri="{FF2B5EF4-FFF2-40B4-BE49-F238E27FC236}">
+                <a16:creationId xmlns:a16="http://schemas.microsoft.com/office/drawing/2014/main" id="{AA7B1437-145C-EF43-9665-32A1FAA99251}"/>
+              </a:ext>
+            </a:extLst>
+          </p:cNvPr>
+          <p:cNvPicPr>
+            <a:picLocks noChangeAspect="1"/>
+          </p:cNvPicPr>
+          <p:nvPr/>
+        </p:nvPicPr>
+        <p:blipFill>
+          <a:blip r:embed="rId3"/>
+          <a:stretch>
+            <a:fillRect/>
+          </a:stretch>
+        </p:blipFill>
+        <p:spPr>
+          <a:xfrm>
+            <a:off x="2109646" y="-997810"/>
+            <a:ext cx="8939348" cy="8939348"/>
+          </a:xfrm>
+          <a:prstGeom prst="rect">
+            <a:avLst/>
+          </a:prstGeom>
+        </p:spPr>
+      </p:pic>
+    </p:spTree>
+    <p:extLst>
+      <p:ext uri="{BB962C8B-B14F-4D97-AF65-F5344CB8AC3E}">
+        <p14:creationId xmlns:p14="http://schemas.microsoft.com/office/powerpoint/2010/main" val="3998963751"/>
+      </p:ext>
+    </p:extLst>
+  </p:cSld>
+  <p:clrMapOvr>
+    <a:masterClrMapping/>
+  </p:clrMapOvr>
+</p:sld>
+</file>
+
+<file path=ppt/slides/slide17.xml><?xml version="1.0" encoding="utf-8"?>
+<p:sld xmlns:a="http://schemas.openxmlformats.org/drawingml/2006/main" xmlns:r="http://schemas.openxmlformats.org/officeDocument/2006/relationships" xmlns:p="http://schemas.openxmlformats.org/presentationml/2006/main">
+  <p:cSld>
+    <p:spTree>
+      <p:nvGrpSpPr>
+        <p:cNvPr id="1" name=""/>
+        <p:cNvGrpSpPr/>
+        <p:nvPr/>
+      </p:nvGrpSpPr>
+      <p:grpSpPr>
+        <a:xfrm>
+          <a:off x="0" y="0"/>
+          <a:ext cx="0" cy="0"/>
+          <a:chOff x="0" y="0"/>
+          <a:chExt cx="0" cy="0"/>
+        </a:xfrm>
+      </p:grpSpPr>
+      <p:grpSp>
+        <p:nvGrpSpPr>
+          <p:cNvPr id="20" name="Group 19">
+            <a:extLst>
+              <a:ext uri="{FF2B5EF4-FFF2-40B4-BE49-F238E27FC236}">
+                <a16:creationId xmlns:a16="http://schemas.microsoft.com/office/drawing/2014/main" id="{C7FC500A-C58A-3343-B5DF-B7FFC2D29650}"/>
+              </a:ext>
+            </a:extLst>
+          </p:cNvPr>
+          <p:cNvGrpSpPr/>
+          <p:nvPr/>
+        </p:nvGrpSpPr>
+        <p:grpSpPr>
+          <a:xfrm>
+            <a:off x="1998134" y="1379621"/>
+            <a:ext cx="8229600" cy="4132180"/>
+            <a:chOff x="1998134" y="1379621"/>
+            <a:chExt cx="8229600" cy="4132180"/>
+          </a:xfrm>
+        </p:grpSpPr>
+        <p:sp>
+          <p:nvSpPr>
+            <p:cNvPr id="16" name="Rectangle 15">
+              <a:extLst>
+                <a:ext uri="{FF2B5EF4-FFF2-40B4-BE49-F238E27FC236}">
+                  <a16:creationId xmlns:a16="http://schemas.microsoft.com/office/drawing/2014/main" id="{B5F5D76E-0352-1D44-9449-C8E26ABC0A0E}"/>
+                </a:ext>
+              </a:extLst>
+            </p:cNvPr>
+            <p:cNvSpPr/>
+            <p:nvPr/>
+          </p:nvSpPr>
+          <p:spPr>
+            <a:xfrm>
+              <a:off x="2009307" y="1379621"/>
+              <a:ext cx="8173386" cy="4081378"/>
+            </a:xfrm>
+            <a:prstGeom prst="rect">
+              <a:avLst/>
+            </a:prstGeom>
+            <a:solidFill>
+              <a:schemeClr val="bg1"/>
+            </a:solidFill>
+            <a:ln>
+              <a:noFill/>
+            </a:ln>
+          </p:spPr>
+          <p:style>
+            <a:lnRef idx="2">
+              <a:schemeClr val="accent1">
+                <a:shade val="50000"/>
+              </a:schemeClr>
+            </a:lnRef>
+            <a:fillRef idx="1">
+              <a:schemeClr val="accent1"/>
+            </a:fillRef>
+            <a:effectRef idx="0">
+              <a:schemeClr val="accent1"/>
+            </a:effectRef>
+            <a:fontRef idx="minor">
+              <a:schemeClr val="lt1"/>
+            </a:fontRef>
+          </p:style>
+          <p:txBody>
+            <a:bodyPr rtlCol="0" anchor="ctr"/>
+            <a:lstStyle/>
+            <a:p>
+              <a:pPr algn="ctr"/>
+              <a:endParaRPr lang="en-US"/>
+            </a:p>
+          </p:txBody>
+        </p:sp>
+        <p:sp>
+          <p:nvSpPr>
+            <p:cNvPr id="2" name="Rectangle 1">
+              <a:extLst>
+                <a:ext uri="{FF2B5EF4-FFF2-40B4-BE49-F238E27FC236}">
+                  <a16:creationId xmlns:a16="http://schemas.microsoft.com/office/drawing/2014/main" id="{BBD66765-D9B7-9A48-B458-52F8D02948D6}"/>
+                </a:ext>
+              </a:extLst>
+            </p:cNvPr>
+            <p:cNvSpPr/>
+            <p:nvPr/>
+          </p:nvSpPr>
+          <p:spPr>
+            <a:xfrm>
+              <a:off x="4410135" y="3792577"/>
+              <a:ext cx="5709197" cy="742951"/>
+            </a:xfrm>
+            <a:prstGeom prst="rect">
+              <a:avLst/>
+            </a:prstGeom>
+            <a:solidFill>
+              <a:srgbClr val="1F3864"/>
+            </a:solidFill>
+            <a:ln>
+              <a:noFill/>
+            </a:ln>
+          </p:spPr>
+          <p:style>
+            <a:lnRef idx="2">
+              <a:schemeClr val="accent1">
+                <a:shade val="50000"/>
+              </a:schemeClr>
+            </a:lnRef>
+            <a:fillRef idx="1">
+              <a:schemeClr val="accent1"/>
+            </a:fillRef>
+            <a:effectRef idx="0">
+              <a:schemeClr val="accent1"/>
+            </a:effectRef>
+            <a:fontRef idx="minor">
+              <a:schemeClr val="lt1"/>
+            </a:fontRef>
+          </p:style>
+          <p:txBody>
+            <a:bodyPr rtlCol="0" anchor="ctr"/>
+            <a:lstStyle/>
+            <a:p>
+              <a:pPr algn="r"/>
+              <a:endParaRPr lang="en-US" sz="3000" dirty="0">
+                <a:solidFill>
+                  <a:schemeClr val="bg1"/>
+                </a:solidFill>
+                <a:latin typeface="Futura Condensed Medium" panose="020B0602020204020303" pitchFamily="34" charset="-79"/>
+                <a:cs typeface="Futura Condensed Medium" panose="020B0602020204020303" pitchFamily="34" charset="-79"/>
+              </a:endParaRPr>
+            </a:p>
+          </p:txBody>
+        </p:sp>
         <p:sp>
           <p:nvSpPr>
             <p:cNvPr id="6" name="Oval 5">
               <a:extLst>
                 <a:ext uri="{FF2B5EF4-FFF2-40B4-BE49-F238E27FC236}">
-                  <a16:creationId xmlns:a16="http://schemas.microsoft.com/office/drawing/2014/main" id="{1945A6E5-9E86-5B47-987D-996F1E0EA71A}"/>
+                  <a16:creationId xmlns:a16="http://schemas.microsoft.com/office/drawing/2014/main" id="{5C73E116-EA52-8B4E-8A0C-4DC9CE760060}"/>
+                </a:ext>
+              </a:extLst>
+            </p:cNvPr>
+            <p:cNvSpPr/>
+            <p:nvPr/>
+          </p:nvSpPr>
+          <p:spPr>
+            <a:xfrm>
+              <a:off x="2009307" y="1947277"/>
+              <a:ext cx="4767240" cy="2764723"/>
+            </a:xfrm>
+            <a:prstGeom prst="ellipse">
+              <a:avLst/>
+            </a:prstGeom>
+            <a:solidFill>
+              <a:schemeClr val="accent1">
+                <a:lumMod val="50000"/>
+              </a:schemeClr>
+            </a:solidFill>
+            <a:ln w="88900">
+              <a:solidFill>
+                <a:schemeClr val="bg1"/>
+              </a:solidFill>
+            </a:ln>
+          </p:spPr>
+          <p:style>
+            <a:lnRef idx="2">
+              <a:schemeClr val="accent1">
+                <a:shade val="50000"/>
+              </a:schemeClr>
+            </a:lnRef>
+            <a:fillRef idx="1">
+              <a:schemeClr val="accent1"/>
+            </a:fillRef>
+            <a:effectRef idx="0">
+              <a:schemeClr val="accent1"/>
+            </a:effectRef>
+            <a:fontRef idx="minor">
+              <a:schemeClr val="lt1"/>
+            </a:fontRef>
+          </p:style>
+          <p:txBody>
+            <a:bodyPr rtlCol="0" anchor="ctr"/>
+            <a:lstStyle/>
+            <a:p>
+              <a:pPr algn="ctr"/>
+              <a:endParaRPr lang="en-US"/>
+            </a:p>
+          </p:txBody>
+        </p:sp>
+        <p:sp>
+          <p:nvSpPr>
+            <p:cNvPr id="9" name="Oval 8">
+              <a:extLst>
+                <a:ext uri="{FF2B5EF4-FFF2-40B4-BE49-F238E27FC236}">
+                  <a16:creationId xmlns:a16="http://schemas.microsoft.com/office/drawing/2014/main" id="{4EF883A6-FA31-F14A-AEF2-01F59B131354}"/>
+                </a:ext>
+              </a:extLst>
+            </p:cNvPr>
+            <p:cNvSpPr/>
+            <p:nvPr/>
+          </p:nvSpPr>
+          <p:spPr>
+            <a:xfrm>
+              <a:off x="2223705" y="1817846"/>
+              <a:ext cx="4659695" cy="2717682"/>
+            </a:xfrm>
+            <a:prstGeom prst="ellipse">
+              <a:avLst/>
+            </a:prstGeom>
+            <a:solidFill>
+              <a:schemeClr val="bg1"/>
+            </a:solidFill>
+            <a:ln>
+              <a:noFill/>
+            </a:ln>
+          </p:spPr>
+          <p:style>
+            <a:lnRef idx="2">
+              <a:schemeClr val="accent1">
+                <a:shade val="50000"/>
+              </a:schemeClr>
+            </a:lnRef>
+            <a:fillRef idx="1">
+              <a:schemeClr val="accent1"/>
+            </a:fillRef>
+            <a:effectRef idx="0">
+              <a:schemeClr val="accent1"/>
+            </a:effectRef>
+            <a:fontRef idx="minor">
+              <a:schemeClr val="lt1"/>
+            </a:fontRef>
+          </p:style>
+          <p:txBody>
+            <a:bodyPr rtlCol="0" anchor="ctr"/>
+            <a:lstStyle/>
+            <a:p>
+              <a:pPr algn="ctr"/>
+              <a:endParaRPr lang="en-US" dirty="0">
+                <a:solidFill>
+                  <a:schemeClr val="bg1"/>
+                </a:solidFill>
+              </a:endParaRPr>
+            </a:p>
+          </p:txBody>
+        </p:sp>
+        <p:pic>
+          <p:nvPicPr>
+            <p:cNvPr id="14" name="Picture 13" descr="Shape&#10;&#10;Description automatically generated with medium confidence">
+              <a:extLst>
+                <a:ext uri="{FF2B5EF4-FFF2-40B4-BE49-F238E27FC236}">
+                  <a16:creationId xmlns:a16="http://schemas.microsoft.com/office/drawing/2014/main" id="{07A7C26D-9509-F649-B655-6503219E4ADC}"/>
+                </a:ext>
+              </a:extLst>
+            </p:cNvPr>
+            <p:cNvPicPr>
+              <a:picLocks noChangeAspect="1"/>
+            </p:cNvPicPr>
+            <p:nvPr/>
+          </p:nvPicPr>
+          <p:blipFill>
+            <a:blip r:embed="rId3"/>
+            <a:stretch>
+              <a:fillRect/>
+            </a:stretch>
+          </p:blipFill>
+          <p:spPr>
+            <a:xfrm>
+              <a:off x="1998134" y="1397001"/>
+              <a:ext cx="8229600" cy="4114800"/>
+            </a:xfrm>
+            <a:prstGeom prst="rect">
+              <a:avLst/>
+            </a:prstGeom>
+          </p:spPr>
+        </p:pic>
+        <p:sp>
+          <p:nvSpPr>
+            <p:cNvPr id="3" name="TextBox 2">
+              <a:extLst>
+                <a:ext uri="{FF2B5EF4-FFF2-40B4-BE49-F238E27FC236}">
+                  <a16:creationId xmlns:a16="http://schemas.microsoft.com/office/drawing/2014/main" id="{4CD92D11-C3D5-D84F-9090-2C5A05F009C9}"/>
+                </a:ext>
+              </a:extLst>
+            </p:cNvPr>
+            <p:cNvSpPr txBox="1"/>
+            <p:nvPr/>
+          </p:nvSpPr>
+          <p:spPr>
+            <a:xfrm>
+              <a:off x="6614941" y="3887053"/>
+              <a:ext cx="3467103" cy="538609"/>
+            </a:xfrm>
+            <a:prstGeom prst="rect">
+              <a:avLst/>
+            </a:prstGeom>
+            <a:noFill/>
+          </p:spPr>
+          <p:txBody>
+            <a:bodyPr wrap="none" rtlCol="0">
+              <a:spAutoFit/>
+            </a:bodyPr>
+            <a:lstStyle/>
+            <a:p>
+              <a:r>
+                <a:rPr lang="en-US" sz="2900" dirty="0">
+                  <a:solidFill>
+                    <a:schemeClr val="bg1"/>
+                  </a:solidFill>
+                  <a:latin typeface="Futura Condensed Medium" panose="020B0602020204020303" pitchFamily="34" charset="-79"/>
+                  <a:cs typeface="Futura Condensed Medium" panose="020B0602020204020303" pitchFamily="34" charset="-79"/>
+                </a:rPr>
+                <a:t>YOU DESIGN IT, WE BUILD IT</a:t>
+              </a:r>
+            </a:p>
+          </p:txBody>
+        </p:sp>
+      </p:grpSp>
+    </p:spTree>
+    <p:extLst>
+      <p:ext uri="{BB962C8B-B14F-4D97-AF65-F5344CB8AC3E}">
+        <p14:creationId xmlns:p14="http://schemas.microsoft.com/office/powerpoint/2010/main" val="3424983641"/>
+      </p:ext>
+    </p:extLst>
+  </p:cSld>
+  <p:clrMapOvr>
+    <a:masterClrMapping/>
+  </p:clrMapOvr>
+</p:sld>
+</file>
+
+<file path=ppt/slides/slide18.xml><?xml version="1.0" encoding="utf-8"?>
+<p:sld xmlns:a="http://schemas.openxmlformats.org/drawingml/2006/main" xmlns:r="http://schemas.openxmlformats.org/officeDocument/2006/relationships" xmlns:p="http://schemas.openxmlformats.org/presentationml/2006/main">
+  <p:cSld>
+    <p:spTree>
+      <p:nvGrpSpPr>
+        <p:cNvPr id="1" name=""/>
+        <p:cNvGrpSpPr/>
+        <p:nvPr/>
+      </p:nvGrpSpPr>
+      <p:grpSpPr>
+        <a:xfrm>
+          <a:off x="0" y="0"/>
+          <a:ext cx="0" cy="0"/>
+          <a:chOff x="0" y="0"/>
+          <a:chExt cx="0" cy="0"/>
+        </a:xfrm>
+      </p:grpSpPr>
+      <p:grpSp>
+        <p:nvGrpSpPr>
+          <p:cNvPr id="4" name="Group 3">
+            <a:extLst>
+              <a:ext uri="{FF2B5EF4-FFF2-40B4-BE49-F238E27FC236}">
+                <a16:creationId xmlns:a16="http://schemas.microsoft.com/office/drawing/2014/main" id="{A0C850A6-FAB2-974B-9999-C57C916DFCF4}"/>
+              </a:ext>
+            </a:extLst>
+          </p:cNvPr>
+          <p:cNvGrpSpPr/>
+          <p:nvPr/>
+        </p:nvGrpSpPr>
+        <p:grpSpPr>
+          <a:xfrm>
+            <a:off x="1998130" y="1396246"/>
+            <a:ext cx="8229600" cy="4234089"/>
+            <a:chOff x="1998130" y="1396246"/>
+            <a:chExt cx="8229600" cy="4234089"/>
+          </a:xfrm>
+        </p:grpSpPr>
+        <p:sp>
+          <p:nvSpPr>
+            <p:cNvPr id="16" name="Rectangle 15">
+              <a:extLst>
+                <a:ext uri="{FF2B5EF4-FFF2-40B4-BE49-F238E27FC236}">
+                  <a16:creationId xmlns:a16="http://schemas.microsoft.com/office/drawing/2014/main" id="{B5F5D76E-0352-1D44-9449-C8E26ABC0A0E}"/>
+                </a:ext>
+              </a:extLst>
+            </p:cNvPr>
+            <p:cNvSpPr/>
+            <p:nvPr/>
+          </p:nvSpPr>
+          <p:spPr>
+            <a:xfrm>
+              <a:off x="2025932" y="1396246"/>
+              <a:ext cx="8173386" cy="4081378"/>
+            </a:xfrm>
+            <a:prstGeom prst="rect">
+              <a:avLst/>
+            </a:prstGeom>
+            <a:solidFill>
+              <a:schemeClr val="bg1"/>
+            </a:solidFill>
+            <a:ln>
+              <a:noFill/>
+            </a:ln>
+          </p:spPr>
+          <p:style>
+            <a:lnRef idx="2">
+              <a:schemeClr val="accent1">
+                <a:shade val="50000"/>
+              </a:schemeClr>
+            </a:lnRef>
+            <a:fillRef idx="1">
+              <a:schemeClr val="accent1"/>
+            </a:fillRef>
+            <a:effectRef idx="0">
+              <a:schemeClr val="accent1"/>
+            </a:effectRef>
+            <a:fontRef idx="minor">
+              <a:schemeClr val="lt1"/>
+            </a:fontRef>
+          </p:style>
+          <p:txBody>
+            <a:bodyPr rtlCol="0" anchor="ctr"/>
+            <a:lstStyle/>
+            <a:p>
+              <a:pPr algn="ctr"/>
+              <a:endParaRPr lang="en-US"/>
+            </a:p>
+          </p:txBody>
+        </p:sp>
+        <p:sp>
+          <p:nvSpPr>
+            <p:cNvPr id="2" name="Rectangle 1">
+              <a:extLst>
+                <a:ext uri="{FF2B5EF4-FFF2-40B4-BE49-F238E27FC236}">
+                  <a16:creationId xmlns:a16="http://schemas.microsoft.com/office/drawing/2014/main" id="{BBD66765-D9B7-9A48-B458-52F8D02948D6}"/>
+                </a:ext>
+              </a:extLst>
+            </p:cNvPr>
+            <p:cNvSpPr/>
+            <p:nvPr/>
+          </p:nvSpPr>
+          <p:spPr>
+            <a:xfrm>
+              <a:off x="4410136" y="3887053"/>
+              <a:ext cx="5080998" cy="618643"/>
+            </a:xfrm>
+            <a:prstGeom prst="rect">
+              <a:avLst/>
+            </a:prstGeom>
+            <a:solidFill>
+              <a:srgbClr val="1F3864"/>
+            </a:solidFill>
+            <a:ln>
+              <a:noFill/>
+            </a:ln>
+          </p:spPr>
+          <p:style>
+            <a:lnRef idx="2">
+              <a:schemeClr val="accent1">
+                <a:shade val="50000"/>
+              </a:schemeClr>
+            </a:lnRef>
+            <a:fillRef idx="1">
+              <a:schemeClr val="accent1"/>
+            </a:fillRef>
+            <a:effectRef idx="0">
+              <a:schemeClr val="accent1"/>
+            </a:effectRef>
+            <a:fontRef idx="minor">
+              <a:schemeClr val="lt1"/>
+            </a:fontRef>
+          </p:style>
+          <p:txBody>
+            <a:bodyPr rtlCol="0" anchor="ctr"/>
+            <a:lstStyle/>
+            <a:p>
+              <a:pPr algn="r"/>
+              <a:endParaRPr lang="en-US" sz="3000" dirty="0">
+                <a:solidFill>
+                  <a:schemeClr val="bg1"/>
+                </a:solidFill>
+                <a:latin typeface="Futura Condensed Medium" panose="020B0602020204020303" pitchFamily="34" charset="-79"/>
+                <a:cs typeface="Futura Condensed Medium" panose="020B0602020204020303" pitchFamily="34" charset="-79"/>
+              </a:endParaRPr>
+            </a:p>
+          </p:txBody>
+        </p:sp>
+        <p:sp>
+          <p:nvSpPr>
+            <p:cNvPr id="6" name="Oval 5">
+              <a:extLst>
+                <a:ext uri="{FF2B5EF4-FFF2-40B4-BE49-F238E27FC236}">
+                  <a16:creationId xmlns:a16="http://schemas.microsoft.com/office/drawing/2014/main" id="{5C73E116-EA52-8B4E-8A0C-4DC9CE760060}"/>
+                </a:ext>
+              </a:extLst>
+            </p:cNvPr>
+            <p:cNvSpPr/>
+            <p:nvPr/>
+          </p:nvSpPr>
+          <p:spPr>
+            <a:xfrm>
+              <a:off x="2034708" y="2539946"/>
+              <a:ext cx="3467103" cy="2010719"/>
+            </a:xfrm>
+            <a:prstGeom prst="ellipse">
+              <a:avLst/>
+            </a:prstGeom>
+            <a:solidFill>
+              <a:schemeClr val="accent1">
+                <a:lumMod val="50000"/>
+              </a:schemeClr>
+            </a:solidFill>
+            <a:ln w="88900">
+              <a:solidFill>
+                <a:schemeClr val="bg1"/>
+              </a:solidFill>
+            </a:ln>
+          </p:spPr>
+          <p:style>
+            <a:lnRef idx="2">
+              <a:schemeClr val="accent1">
+                <a:shade val="50000"/>
+              </a:schemeClr>
+            </a:lnRef>
+            <a:fillRef idx="1">
+              <a:schemeClr val="accent1"/>
+            </a:fillRef>
+            <a:effectRef idx="0">
+              <a:schemeClr val="accent1"/>
+            </a:effectRef>
+            <a:fontRef idx="minor">
+              <a:schemeClr val="lt1"/>
+            </a:fontRef>
+          </p:style>
+          <p:txBody>
+            <a:bodyPr rtlCol="0" anchor="ctr"/>
+            <a:lstStyle/>
+            <a:p>
+              <a:pPr algn="ctr"/>
+              <a:endParaRPr lang="en-US"/>
+            </a:p>
+          </p:txBody>
+        </p:sp>
+        <p:sp>
+          <p:nvSpPr>
+            <p:cNvPr id="9" name="Oval 8">
+              <a:extLst>
+                <a:ext uri="{FF2B5EF4-FFF2-40B4-BE49-F238E27FC236}">
+                  <a16:creationId xmlns:a16="http://schemas.microsoft.com/office/drawing/2014/main" id="{4EF883A6-FA31-F14A-AEF2-01F59B131354}"/>
+                </a:ext>
+              </a:extLst>
+            </p:cNvPr>
+            <p:cNvSpPr/>
+            <p:nvPr/>
+          </p:nvSpPr>
+          <p:spPr>
+            <a:xfrm>
+              <a:off x="2249107" y="2410515"/>
+              <a:ext cx="3388888" cy="1976507"/>
+            </a:xfrm>
+            <a:prstGeom prst="ellipse">
+              <a:avLst/>
+            </a:prstGeom>
+            <a:solidFill>
+              <a:schemeClr val="bg1"/>
+            </a:solidFill>
+            <a:ln>
+              <a:noFill/>
+            </a:ln>
+          </p:spPr>
+          <p:style>
+            <a:lnRef idx="2">
+              <a:schemeClr val="accent1">
+                <a:shade val="50000"/>
+              </a:schemeClr>
+            </a:lnRef>
+            <a:fillRef idx="1">
+              <a:schemeClr val="accent1"/>
+            </a:fillRef>
+            <a:effectRef idx="0">
+              <a:schemeClr val="accent1"/>
+            </a:effectRef>
+            <a:fontRef idx="minor">
+              <a:schemeClr val="lt1"/>
+            </a:fontRef>
+          </p:style>
+          <p:txBody>
+            <a:bodyPr rtlCol="0" anchor="ctr"/>
+            <a:lstStyle/>
+            <a:p>
+              <a:pPr algn="ctr"/>
+              <a:endParaRPr lang="en-US" dirty="0">
+                <a:solidFill>
+                  <a:schemeClr val="bg1"/>
+                </a:solidFill>
+              </a:endParaRPr>
+            </a:p>
+          </p:txBody>
+        </p:sp>
+        <p:sp>
+          <p:nvSpPr>
+            <p:cNvPr id="3" name="TextBox 2">
+              <a:extLst>
+                <a:ext uri="{FF2B5EF4-FFF2-40B4-BE49-F238E27FC236}">
+                  <a16:creationId xmlns:a16="http://schemas.microsoft.com/office/drawing/2014/main" id="{4CD92D11-C3D5-D84F-9090-2C5A05F009C9}"/>
+                </a:ext>
+              </a:extLst>
+            </p:cNvPr>
+            <p:cNvSpPr txBox="1"/>
+            <p:nvPr/>
+          </p:nvSpPr>
+          <p:spPr>
+            <a:xfrm>
+              <a:off x="5556611" y="3903987"/>
+              <a:ext cx="3807004" cy="584775"/>
+            </a:xfrm>
+            <a:prstGeom prst="rect">
+              <a:avLst/>
+            </a:prstGeom>
+            <a:noFill/>
+          </p:spPr>
+          <p:txBody>
+            <a:bodyPr wrap="none" rtlCol="0">
+              <a:spAutoFit/>
+            </a:bodyPr>
+            <a:lstStyle/>
+            <a:p>
+              <a:r>
+                <a:rPr lang="en-US" sz="3200" dirty="0">
+                  <a:solidFill>
+                    <a:schemeClr val="bg1"/>
+                  </a:solidFill>
+                  <a:latin typeface="Futura Condensed Medium" panose="020B0602020204020303" pitchFamily="34" charset="-79"/>
+                  <a:cs typeface="Futura Condensed Medium" panose="020B0602020204020303" pitchFamily="34" charset="-79"/>
+                </a:rPr>
+                <a:t>YOU DESIGN IT, WE BUILD IT</a:t>
+              </a:r>
+            </a:p>
+          </p:txBody>
+        </p:sp>
+        <p:pic>
+          <p:nvPicPr>
+            <p:cNvPr id="14" name="Picture 13" descr="Shape&#10;&#10;Description automatically generated with medium confidence">
+              <a:extLst>
+                <a:ext uri="{FF2B5EF4-FFF2-40B4-BE49-F238E27FC236}">
+                  <a16:creationId xmlns:a16="http://schemas.microsoft.com/office/drawing/2014/main" id="{07A7C26D-9509-F649-B655-6503219E4ADC}"/>
+                </a:ext>
+              </a:extLst>
+            </p:cNvPr>
+            <p:cNvPicPr>
+              <a:picLocks noChangeAspect="1"/>
+            </p:cNvPicPr>
+            <p:nvPr/>
+          </p:nvPicPr>
+          <p:blipFill>
+            <a:blip r:embed="rId3"/>
+            <a:stretch>
+              <a:fillRect/>
+            </a:stretch>
+          </p:blipFill>
+          <p:spPr>
+            <a:xfrm>
+              <a:off x="1998130" y="1515535"/>
+              <a:ext cx="8229600" cy="4114800"/>
+            </a:xfrm>
+            <a:prstGeom prst="rect">
+              <a:avLst/>
+            </a:prstGeom>
+          </p:spPr>
+        </p:pic>
+      </p:grpSp>
+    </p:spTree>
+    <p:extLst>
+      <p:ext uri="{BB962C8B-B14F-4D97-AF65-F5344CB8AC3E}">
+        <p14:creationId xmlns:p14="http://schemas.microsoft.com/office/powerpoint/2010/main" val="621497201"/>
+      </p:ext>
+    </p:extLst>
+  </p:cSld>
+  <p:clrMapOvr>
+    <a:masterClrMapping/>
+  </p:clrMapOvr>
+</p:sld>
+</file>
+
+<file path=ppt/slides/slide19.xml><?xml version="1.0" encoding="utf-8"?>
+<p:sld xmlns:a="http://schemas.openxmlformats.org/drawingml/2006/main" xmlns:r="http://schemas.openxmlformats.org/officeDocument/2006/relationships" xmlns:p="http://schemas.openxmlformats.org/presentationml/2006/main">
+  <p:cSld>
+    <p:spTree>
+      <p:nvGrpSpPr>
+        <p:cNvPr id="1" name=""/>
+        <p:cNvGrpSpPr/>
+        <p:nvPr/>
+      </p:nvGrpSpPr>
+      <p:grpSpPr>
+        <a:xfrm>
+          <a:off x="0" y="0"/>
+          <a:ext cx="0" cy="0"/>
+          <a:chOff x="0" y="0"/>
+          <a:chExt cx="0" cy="0"/>
+        </a:xfrm>
+      </p:grpSpPr>
+      <p:grpSp>
+        <p:nvGrpSpPr>
+          <p:cNvPr id="25" name="Group 24">
+            <a:extLst>
+              <a:ext uri="{FF2B5EF4-FFF2-40B4-BE49-F238E27FC236}">
+                <a16:creationId xmlns:a16="http://schemas.microsoft.com/office/drawing/2014/main" id="{F2664FC5-35AA-D145-9D91-679171C7E732}"/>
+              </a:ext>
+            </a:extLst>
+          </p:cNvPr>
+          <p:cNvGrpSpPr/>
+          <p:nvPr/>
+        </p:nvGrpSpPr>
+        <p:grpSpPr>
+          <a:xfrm>
+            <a:off x="1745375" y="-383459"/>
+            <a:ext cx="8848732" cy="7900220"/>
+            <a:chOff x="1745375" y="-383459"/>
+            <a:chExt cx="8848732" cy="7900220"/>
+          </a:xfrm>
+        </p:grpSpPr>
+        <p:sp>
+          <p:nvSpPr>
+            <p:cNvPr id="23" name="Oval 22">
+              <a:extLst>
+                <a:ext uri="{FF2B5EF4-FFF2-40B4-BE49-F238E27FC236}">
+                  <a16:creationId xmlns:a16="http://schemas.microsoft.com/office/drawing/2014/main" id="{083DE818-4766-7A47-8803-496F64D60ABA}"/>
                 </a:ext>
               </a:extLst>
             </p:cNvPr>
@@ -6523,141 +8233,16 @@
             <a:lstStyle/>
             <a:p>
               <a:pPr algn="ctr"/>
-              <a:endParaRPr lang="en-US"/>
-            </a:p>
-          </p:txBody>
-        </p:sp>
-        <p:sp>
-          <p:nvSpPr>
-            <p:cNvPr id="4" name="Oval 3">
-              <a:extLst>
-                <a:ext uri="{FF2B5EF4-FFF2-40B4-BE49-F238E27FC236}">
-                  <a16:creationId xmlns:a16="http://schemas.microsoft.com/office/drawing/2014/main" id="{9A6DA34C-F484-5E43-BB32-A3AEB809FFC8}"/>
-                </a:ext>
-              </a:extLst>
-            </p:cNvPr>
-            <p:cNvSpPr/>
-            <p:nvPr/>
-          </p:nvSpPr>
-          <p:spPr>
-            <a:xfrm rot="164111">
-              <a:off x="4185160" y="1516465"/>
-              <a:ext cx="3821682" cy="3825072"/>
-            </a:xfrm>
-            <a:prstGeom prst="ellipse">
-              <a:avLst/>
-            </a:prstGeom>
-            <a:gradFill flip="none" rotWithShape="1">
-              <a:gsLst>
-                <a:gs pos="29000">
-                  <a:schemeClr val="bg2">
-                    <a:lumMod val="50000"/>
-                  </a:schemeClr>
-                </a:gs>
-                <a:gs pos="69000">
-                  <a:srgbClr val="006688"/>
-                </a:gs>
-                <a:gs pos="100000">
-                  <a:srgbClr val="0066CC">
-                    <a:shade val="100000"/>
-                    <a:satMod val="115000"/>
-                  </a:srgbClr>
-                </a:gs>
-              </a:gsLst>
-              <a:lin ang="18900000" scaled="1"/>
-              <a:tileRect/>
-            </a:gradFill>
-            <a:ln>
-              <a:noFill/>
-            </a:ln>
-          </p:spPr>
-          <p:style>
-            <a:lnRef idx="2">
-              <a:schemeClr val="accent1">
-                <a:shade val="50000"/>
-              </a:schemeClr>
-            </a:lnRef>
-            <a:fillRef idx="1">
-              <a:schemeClr val="accent1"/>
-            </a:fillRef>
-            <a:effectRef idx="0">
-              <a:schemeClr val="accent1"/>
-            </a:effectRef>
-            <a:fontRef idx="minor">
-              <a:schemeClr val="lt1"/>
-            </a:fontRef>
-          </p:style>
-          <p:txBody>
-            <a:bodyPr rtlCol="0" anchor="ctr"/>
-            <a:lstStyle/>
-            <a:p>
-              <a:pPr algn="ctr"/>
               <a:endParaRPr lang="en-US" b="1"/>
-            </a:p>
-          </p:txBody>
-        </p:sp>
-        <p:sp>
-          <p:nvSpPr>
-            <p:cNvPr id="5" name="Oval 4">
-              <a:extLst>
-                <a:ext uri="{FF2B5EF4-FFF2-40B4-BE49-F238E27FC236}">
-                  <a16:creationId xmlns:a16="http://schemas.microsoft.com/office/drawing/2014/main" id="{4223DED6-A217-3A44-AEBB-7F223EF01681}"/>
-                </a:ext>
-              </a:extLst>
-            </p:cNvPr>
-            <p:cNvSpPr/>
-            <p:nvPr/>
-          </p:nvSpPr>
-          <p:spPr>
-            <a:xfrm>
-              <a:off x="4605132" y="1934074"/>
-              <a:ext cx="2981738" cy="2989854"/>
-            </a:xfrm>
-            <a:prstGeom prst="ellipse">
-              <a:avLst/>
-            </a:prstGeom>
-            <a:solidFill>
-              <a:schemeClr val="bg1"/>
-            </a:solidFill>
-            <a:ln>
-              <a:noFill/>
-            </a:ln>
-          </p:spPr>
-          <p:style>
-            <a:lnRef idx="2">
-              <a:schemeClr val="accent1">
-                <a:shade val="50000"/>
-              </a:schemeClr>
-            </a:lnRef>
-            <a:fillRef idx="1">
-              <a:schemeClr val="accent1"/>
-            </a:fillRef>
-            <a:effectRef idx="0">
-              <a:schemeClr val="accent1"/>
-            </a:effectRef>
-            <a:fontRef idx="minor">
-              <a:schemeClr val="lt1"/>
-            </a:fontRef>
-          </p:style>
-          <p:txBody>
-            <a:bodyPr rtlCol="0" anchor="ctr"/>
-            <a:lstStyle/>
-            <a:p>
-              <a:pPr algn="ctr"/>
-              <a:endParaRPr lang="en-US" b="1" dirty="0">
-                <a:solidFill>
-                  <a:schemeClr val="bg1"/>
-                </a:solidFill>
-              </a:endParaRPr>
             </a:p>
           </p:txBody>
         </p:sp>
         <p:grpSp>
           <p:nvGrpSpPr>
-            <p:cNvPr id="12" name="Group 11">
+            <p:cNvPr id="24" name="Group 23">
               <a:extLst>
                 <a:ext uri="{FF2B5EF4-FFF2-40B4-BE49-F238E27FC236}">
-                  <a16:creationId xmlns:a16="http://schemas.microsoft.com/office/drawing/2014/main" id="{0BE44F2D-C00D-A646-9A8A-8E51B867CAEF}"/>
+                  <a16:creationId xmlns:a16="http://schemas.microsoft.com/office/drawing/2014/main" id="{CBFF1779-8255-C049-8AD8-2F2777EB7971}"/>
                 </a:ext>
               </a:extLst>
             </p:cNvPr>
@@ -6666,18 +8251,143 @@
           </p:nvGrpSpPr>
           <p:grpSpPr>
             <a:xfrm>
-              <a:off x="2327349" y="177615"/>
-              <a:ext cx="7550554" cy="6512710"/>
-              <a:chOff x="6675420" y="2264742"/>
-              <a:chExt cx="4524053" cy="3902213"/>
+              <a:off x="4185160" y="1516465"/>
+              <a:ext cx="3821682" cy="3825072"/>
+              <a:chOff x="4185160" y="1516465"/>
+              <a:chExt cx="3821682" cy="3825072"/>
+            </a:xfrm>
+          </p:grpSpPr>
+          <p:sp>
+            <p:nvSpPr>
+              <p:cNvPr id="4" name="Oval 3">
+                <a:extLst>
+                  <a:ext uri="{FF2B5EF4-FFF2-40B4-BE49-F238E27FC236}">
+                    <a16:creationId xmlns:a16="http://schemas.microsoft.com/office/drawing/2014/main" id="{9A6DA34C-F484-5E43-BB32-A3AEB809FFC8}"/>
+                  </a:ext>
+                </a:extLst>
+              </p:cNvPr>
+              <p:cNvSpPr/>
+              <p:nvPr/>
+            </p:nvSpPr>
+            <p:spPr>
+              <a:xfrm>
+                <a:off x="4185160" y="1516465"/>
+                <a:ext cx="3821682" cy="3825072"/>
+              </a:xfrm>
+              <a:prstGeom prst="ellipse">
+                <a:avLst/>
+              </a:prstGeom>
+              <a:solidFill>
+                <a:srgbClr val="1F3864"/>
+              </a:solidFill>
+              <a:ln>
+                <a:noFill/>
+              </a:ln>
+            </p:spPr>
+            <p:style>
+              <a:lnRef idx="2">
+                <a:schemeClr val="accent1">
+                  <a:shade val="50000"/>
+                </a:schemeClr>
+              </a:lnRef>
+              <a:fillRef idx="1">
+                <a:schemeClr val="accent1"/>
+              </a:fillRef>
+              <a:effectRef idx="0">
+                <a:schemeClr val="accent1"/>
+              </a:effectRef>
+              <a:fontRef idx="minor">
+                <a:schemeClr val="lt1"/>
+              </a:fontRef>
+            </p:style>
+            <p:txBody>
+              <a:bodyPr rtlCol="0" anchor="ctr"/>
+              <a:lstStyle/>
+              <a:p>
+                <a:pPr algn="ctr"/>
+                <a:endParaRPr lang="en-US" b="1"/>
+              </a:p>
+            </p:txBody>
+          </p:sp>
+          <p:sp>
+            <p:nvSpPr>
+              <p:cNvPr id="20" name="Oval 19">
+                <a:extLst>
+                  <a:ext uri="{FF2B5EF4-FFF2-40B4-BE49-F238E27FC236}">
+                    <a16:creationId xmlns:a16="http://schemas.microsoft.com/office/drawing/2014/main" id="{86017DD8-2F11-654B-B328-A69DC94CBCE7}"/>
+                  </a:ext>
+                </a:extLst>
+              </p:cNvPr>
+              <p:cNvSpPr/>
+              <p:nvPr/>
+            </p:nvSpPr>
+            <p:spPr>
+              <a:xfrm>
+                <a:off x="4621619" y="1953311"/>
+                <a:ext cx="2948762" cy="2951378"/>
+              </a:xfrm>
+              <a:prstGeom prst="ellipse">
+                <a:avLst/>
+              </a:prstGeom>
+              <a:solidFill>
+                <a:schemeClr val="bg1"/>
+              </a:solidFill>
+              <a:ln>
+                <a:noFill/>
+              </a:ln>
+            </p:spPr>
+            <p:style>
+              <a:lnRef idx="2">
+                <a:schemeClr val="accent1">
+                  <a:shade val="50000"/>
+                </a:schemeClr>
+              </a:lnRef>
+              <a:fillRef idx="1">
+                <a:schemeClr val="accent1"/>
+              </a:fillRef>
+              <a:effectRef idx="0">
+                <a:schemeClr val="accent1"/>
+              </a:effectRef>
+              <a:fontRef idx="minor">
+                <a:schemeClr val="lt1"/>
+              </a:fontRef>
+            </p:style>
+            <p:txBody>
+              <a:bodyPr rtlCol="0" anchor="ctr"/>
+              <a:lstStyle/>
+              <a:p>
+                <a:pPr algn="ctr"/>
+                <a:endParaRPr lang="en-US" b="1"/>
+              </a:p>
+            </p:txBody>
+          </p:sp>
+        </p:grpSp>
+        <p:grpSp>
+          <p:nvGrpSpPr>
+            <p:cNvPr id="19" name="Group 18">
+              <a:extLst>
+                <a:ext uri="{FF2B5EF4-FFF2-40B4-BE49-F238E27FC236}">
+                  <a16:creationId xmlns:a16="http://schemas.microsoft.com/office/drawing/2014/main" id="{ABA86438-95C8-B944-8E82-1808B6CDCA39}"/>
+                </a:ext>
+              </a:extLst>
+            </p:cNvPr>
+            <p:cNvGrpSpPr/>
+            <p:nvPr/>
+          </p:nvGrpSpPr>
+          <p:grpSpPr>
+            <a:xfrm>
+              <a:off x="1745375" y="-383459"/>
+              <a:ext cx="8848732" cy="7900220"/>
+              <a:chOff x="2497392" y="302342"/>
+              <a:chExt cx="7246377" cy="6469626"/>
             </a:xfrm>
           </p:grpSpPr>
           <p:pic>
             <p:nvPicPr>
-              <p:cNvPr id="13" name="Picture 12" descr="Shape&#10;&#10;Description automatically generated with low confidence">
+              <p:cNvPr id="16" name="Picture 15" descr="Shape&#10;&#10;Description automatically generated with low confidence">
                 <a:extLst>
                   <a:ext uri="{FF2B5EF4-FFF2-40B4-BE49-F238E27FC236}">
-                    <a16:creationId xmlns:a16="http://schemas.microsoft.com/office/drawing/2014/main" id="{EF71631E-CDE8-404F-B288-221351E8D3A8}"/>
+                    <a16:creationId xmlns:a16="http://schemas.microsoft.com/office/drawing/2014/main" id="{13925736-8431-4C4B-B689-6A088B43C769}"/>
                   </a:ext>
                 </a:extLst>
               </p:cNvPr>
@@ -6694,8 +8404,8 @@
             </p:blipFill>
             <p:spPr>
               <a:xfrm>
-                <a:off x="6675420" y="2264742"/>
-                <a:ext cx="3898900" cy="3898900"/>
+                <a:off x="3274143" y="302342"/>
+                <a:ext cx="6469626" cy="6469626"/>
               </a:xfrm>
               <a:prstGeom prst="rect">
                 <a:avLst/>
@@ -6704,10 +8414,10 @@
           </p:pic>
           <p:pic>
             <p:nvPicPr>
-              <p:cNvPr id="14" name="Picture 13" descr="Shape&#10;&#10;Description automatically generated with low confidence">
+              <p:cNvPr id="18" name="Picture 17" descr="Shape&#10;&#10;Description automatically generated with low confidence">
                 <a:extLst>
                   <a:ext uri="{FF2B5EF4-FFF2-40B4-BE49-F238E27FC236}">
-                    <a16:creationId xmlns:a16="http://schemas.microsoft.com/office/drawing/2014/main" id="{614ED623-D1B8-9547-A659-24D125E86E30}"/>
+                    <a16:creationId xmlns:a16="http://schemas.microsoft.com/office/drawing/2014/main" id="{38097695-5BA0-4D4B-9133-B47EB59AABEF}"/>
                   </a:ext>
                 </a:extLst>
               </p:cNvPr>
@@ -6724,8 +8434,8 @@
             </p:blipFill>
             <p:spPr>
               <a:xfrm>
-                <a:off x="7300573" y="2268055"/>
-                <a:ext cx="3898900" cy="3898900"/>
+                <a:off x="2497392" y="302342"/>
+                <a:ext cx="6469626" cy="6469626"/>
               </a:xfrm>
               <a:prstGeom prst="rect">
                 <a:avLst/>
@@ -6737,7 +8447,7 @@
     </p:spTree>
     <p:extLst>
       <p:ext uri="{BB962C8B-B14F-4D97-AF65-F5344CB8AC3E}">
-        <p14:creationId xmlns:p14="http://schemas.microsoft.com/office/powerpoint/2010/main" val="1886396496"/>
+        <p14:creationId xmlns:p14="http://schemas.microsoft.com/office/powerpoint/2010/main" val="1761327210"/>
       </p:ext>
     </p:extLst>
   </p:cSld>
@@ -7581,6 +9291,638 @@
     <p:extLst>
       <p:ext uri="{BB962C8B-B14F-4D97-AF65-F5344CB8AC3E}">
         <p14:creationId xmlns:p14="http://schemas.microsoft.com/office/powerpoint/2010/main" val="2033396769"/>
+      </p:ext>
+    </p:extLst>
+  </p:cSld>
+  <p:clrMapOvr>
+    <a:masterClrMapping/>
+  </p:clrMapOvr>
+</p:sld>
+</file>
+
+<file path=ppt/slides/slide20.xml><?xml version="1.0" encoding="utf-8"?>
+<p:sld xmlns:a="http://schemas.openxmlformats.org/drawingml/2006/main" xmlns:r="http://schemas.openxmlformats.org/officeDocument/2006/relationships" xmlns:p="http://schemas.openxmlformats.org/presentationml/2006/main">
+  <p:cSld>
+    <p:spTree>
+      <p:nvGrpSpPr>
+        <p:cNvPr id="1" name=""/>
+        <p:cNvGrpSpPr/>
+        <p:nvPr/>
+      </p:nvGrpSpPr>
+      <p:grpSpPr>
+        <a:xfrm>
+          <a:off x="0" y="0"/>
+          <a:ext cx="0" cy="0"/>
+          <a:chOff x="0" y="0"/>
+          <a:chExt cx="0" cy="0"/>
+        </a:xfrm>
+      </p:grpSpPr>
+      <p:grpSp>
+        <p:nvGrpSpPr>
+          <p:cNvPr id="8" name="Group 7">
+            <a:extLst>
+              <a:ext uri="{FF2B5EF4-FFF2-40B4-BE49-F238E27FC236}">
+                <a16:creationId xmlns:a16="http://schemas.microsoft.com/office/drawing/2014/main" id="{37630C2B-00C6-CA4C-AD7C-C07E7CBAE198}"/>
+              </a:ext>
+            </a:extLst>
+          </p:cNvPr>
+          <p:cNvGrpSpPr/>
+          <p:nvPr/>
+        </p:nvGrpSpPr>
+        <p:grpSpPr>
+          <a:xfrm>
+            <a:off x="1994452" y="1396246"/>
+            <a:ext cx="8229600" cy="4235926"/>
+            <a:chOff x="1994452" y="1396246"/>
+            <a:chExt cx="8229600" cy="4235926"/>
+          </a:xfrm>
+        </p:grpSpPr>
+        <p:sp>
+          <p:nvSpPr>
+            <p:cNvPr id="16" name="Rectangle 15">
+              <a:extLst>
+                <a:ext uri="{FF2B5EF4-FFF2-40B4-BE49-F238E27FC236}">
+                  <a16:creationId xmlns:a16="http://schemas.microsoft.com/office/drawing/2014/main" id="{B5F5D76E-0352-1D44-9449-C8E26ABC0A0E}"/>
+                </a:ext>
+              </a:extLst>
+            </p:cNvPr>
+            <p:cNvSpPr/>
+            <p:nvPr/>
+          </p:nvSpPr>
+          <p:spPr>
+            <a:xfrm>
+              <a:off x="2025932" y="1396246"/>
+              <a:ext cx="8173386" cy="4081378"/>
+            </a:xfrm>
+            <a:prstGeom prst="rect">
+              <a:avLst/>
+            </a:prstGeom>
+            <a:solidFill>
+              <a:schemeClr val="bg1"/>
+            </a:solidFill>
+            <a:ln>
+              <a:noFill/>
+            </a:ln>
+          </p:spPr>
+          <p:style>
+            <a:lnRef idx="2">
+              <a:schemeClr val="accent1">
+                <a:shade val="50000"/>
+              </a:schemeClr>
+            </a:lnRef>
+            <a:fillRef idx="1">
+              <a:schemeClr val="accent1"/>
+            </a:fillRef>
+            <a:effectRef idx="0">
+              <a:schemeClr val="accent1"/>
+            </a:effectRef>
+            <a:fontRef idx="minor">
+              <a:schemeClr val="lt1"/>
+            </a:fontRef>
+          </p:style>
+          <p:txBody>
+            <a:bodyPr rtlCol="0" anchor="ctr"/>
+            <a:lstStyle/>
+            <a:p>
+              <a:pPr algn="ctr"/>
+              <a:endParaRPr lang="en-US"/>
+            </a:p>
+          </p:txBody>
+        </p:sp>
+        <p:sp>
+          <p:nvSpPr>
+            <p:cNvPr id="2" name="Rectangle 1">
+              <a:extLst>
+                <a:ext uri="{FF2B5EF4-FFF2-40B4-BE49-F238E27FC236}">
+                  <a16:creationId xmlns:a16="http://schemas.microsoft.com/office/drawing/2014/main" id="{BBD66765-D9B7-9A48-B458-52F8D02948D6}"/>
+                </a:ext>
+              </a:extLst>
+            </p:cNvPr>
+            <p:cNvSpPr/>
+            <p:nvPr/>
+          </p:nvSpPr>
+          <p:spPr>
+            <a:xfrm>
+              <a:off x="4410136" y="3887053"/>
+              <a:ext cx="5080998" cy="618643"/>
+            </a:xfrm>
+            <a:prstGeom prst="rect">
+              <a:avLst/>
+            </a:prstGeom>
+            <a:solidFill>
+              <a:srgbClr val="1F3864"/>
+            </a:solidFill>
+            <a:ln>
+              <a:noFill/>
+            </a:ln>
+          </p:spPr>
+          <p:style>
+            <a:lnRef idx="2">
+              <a:schemeClr val="accent1">
+                <a:shade val="50000"/>
+              </a:schemeClr>
+            </a:lnRef>
+            <a:fillRef idx="1">
+              <a:schemeClr val="accent1"/>
+            </a:fillRef>
+            <a:effectRef idx="0">
+              <a:schemeClr val="accent1"/>
+            </a:effectRef>
+            <a:fontRef idx="minor">
+              <a:schemeClr val="lt1"/>
+            </a:fontRef>
+          </p:style>
+          <p:txBody>
+            <a:bodyPr rtlCol="0" anchor="ctr"/>
+            <a:lstStyle/>
+            <a:p>
+              <a:pPr algn="r"/>
+              <a:endParaRPr lang="en-US" sz="3000" dirty="0">
+                <a:solidFill>
+                  <a:schemeClr val="bg1"/>
+                </a:solidFill>
+                <a:latin typeface="Futura Condensed Medium" panose="020B0602020204020303" pitchFamily="34" charset="-79"/>
+                <a:cs typeface="Futura Condensed Medium" panose="020B0602020204020303" pitchFamily="34" charset="-79"/>
+              </a:endParaRPr>
+            </a:p>
+          </p:txBody>
+        </p:sp>
+        <p:sp>
+          <p:nvSpPr>
+            <p:cNvPr id="6" name="Oval 5">
+              <a:extLst>
+                <a:ext uri="{FF2B5EF4-FFF2-40B4-BE49-F238E27FC236}">
+                  <a16:creationId xmlns:a16="http://schemas.microsoft.com/office/drawing/2014/main" id="{5C73E116-EA52-8B4E-8A0C-4DC9CE760060}"/>
+                </a:ext>
+              </a:extLst>
+            </p:cNvPr>
+            <p:cNvSpPr/>
+            <p:nvPr/>
+          </p:nvSpPr>
+          <p:spPr>
+            <a:xfrm>
+              <a:off x="2034708" y="2539946"/>
+              <a:ext cx="3467103" cy="2010719"/>
+            </a:xfrm>
+            <a:prstGeom prst="ellipse">
+              <a:avLst/>
+            </a:prstGeom>
+            <a:solidFill>
+              <a:schemeClr val="accent1">
+                <a:lumMod val="50000"/>
+              </a:schemeClr>
+            </a:solidFill>
+            <a:ln w="88900">
+              <a:solidFill>
+                <a:schemeClr val="bg1"/>
+              </a:solidFill>
+            </a:ln>
+          </p:spPr>
+          <p:style>
+            <a:lnRef idx="2">
+              <a:schemeClr val="accent1">
+                <a:shade val="50000"/>
+              </a:schemeClr>
+            </a:lnRef>
+            <a:fillRef idx="1">
+              <a:schemeClr val="accent1"/>
+            </a:fillRef>
+            <a:effectRef idx="0">
+              <a:schemeClr val="accent1"/>
+            </a:effectRef>
+            <a:fontRef idx="minor">
+              <a:schemeClr val="lt1"/>
+            </a:fontRef>
+          </p:style>
+          <p:txBody>
+            <a:bodyPr rtlCol="0" anchor="ctr"/>
+            <a:lstStyle/>
+            <a:p>
+              <a:pPr algn="ctr"/>
+              <a:endParaRPr lang="en-US"/>
+            </a:p>
+          </p:txBody>
+        </p:sp>
+        <p:sp>
+          <p:nvSpPr>
+            <p:cNvPr id="9" name="Oval 8">
+              <a:extLst>
+                <a:ext uri="{FF2B5EF4-FFF2-40B4-BE49-F238E27FC236}">
+                  <a16:creationId xmlns:a16="http://schemas.microsoft.com/office/drawing/2014/main" id="{4EF883A6-FA31-F14A-AEF2-01F59B131354}"/>
+                </a:ext>
+              </a:extLst>
+            </p:cNvPr>
+            <p:cNvSpPr/>
+            <p:nvPr/>
+          </p:nvSpPr>
+          <p:spPr>
+            <a:xfrm>
+              <a:off x="2249107" y="2410515"/>
+              <a:ext cx="3388888" cy="1976507"/>
+            </a:xfrm>
+            <a:prstGeom prst="ellipse">
+              <a:avLst/>
+            </a:prstGeom>
+            <a:solidFill>
+              <a:schemeClr val="bg1"/>
+            </a:solidFill>
+            <a:ln>
+              <a:noFill/>
+            </a:ln>
+          </p:spPr>
+          <p:style>
+            <a:lnRef idx="2">
+              <a:schemeClr val="accent1">
+                <a:shade val="50000"/>
+              </a:schemeClr>
+            </a:lnRef>
+            <a:fillRef idx="1">
+              <a:schemeClr val="accent1"/>
+            </a:fillRef>
+            <a:effectRef idx="0">
+              <a:schemeClr val="accent1"/>
+            </a:effectRef>
+            <a:fontRef idx="minor">
+              <a:schemeClr val="lt1"/>
+            </a:fontRef>
+          </p:style>
+          <p:txBody>
+            <a:bodyPr rtlCol="0" anchor="ctr"/>
+            <a:lstStyle/>
+            <a:p>
+              <a:pPr algn="ctr"/>
+              <a:endParaRPr lang="en-US" dirty="0">
+                <a:solidFill>
+                  <a:schemeClr val="bg1"/>
+                </a:solidFill>
+              </a:endParaRPr>
+            </a:p>
+          </p:txBody>
+        </p:sp>
+        <p:sp>
+          <p:nvSpPr>
+            <p:cNvPr id="3" name="TextBox 2">
+              <a:extLst>
+                <a:ext uri="{FF2B5EF4-FFF2-40B4-BE49-F238E27FC236}">
+                  <a16:creationId xmlns:a16="http://schemas.microsoft.com/office/drawing/2014/main" id="{4CD92D11-C3D5-D84F-9090-2C5A05F009C9}"/>
+                </a:ext>
+              </a:extLst>
+            </p:cNvPr>
+            <p:cNvSpPr txBox="1"/>
+            <p:nvPr/>
+          </p:nvSpPr>
+          <p:spPr>
+            <a:xfrm>
+              <a:off x="5556611" y="3903987"/>
+              <a:ext cx="3807004" cy="584775"/>
+            </a:xfrm>
+            <a:prstGeom prst="rect">
+              <a:avLst/>
+            </a:prstGeom>
+            <a:noFill/>
+          </p:spPr>
+          <p:txBody>
+            <a:bodyPr wrap="none" rtlCol="0">
+              <a:spAutoFit/>
+            </a:bodyPr>
+            <a:lstStyle/>
+            <a:p>
+              <a:r>
+                <a:rPr lang="en-US" sz="3200" dirty="0">
+                  <a:solidFill>
+                    <a:schemeClr val="bg1"/>
+                  </a:solidFill>
+                  <a:latin typeface="Futura Condensed Medium" panose="020B0602020204020303" pitchFamily="34" charset="-79"/>
+                  <a:cs typeface="Futura Condensed Medium" panose="020B0602020204020303" pitchFamily="34" charset="-79"/>
+                </a:rPr>
+                <a:t>YOU DESIGN IT, WE BUILD IT</a:t>
+              </a:r>
+            </a:p>
+          </p:txBody>
+        </p:sp>
+        <p:pic>
+          <p:nvPicPr>
+            <p:cNvPr id="7" name="Picture 6" descr="Logo&#10;&#10;Description automatically generated with medium confidence">
+              <a:extLst>
+                <a:ext uri="{FF2B5EF4-FFF2-40B4-BE49-F238E27FC236}">
+                  <a16:creationId xmlns:a16="http://schemas.microsoft.com/office/drawing/2014/main" id="{801ADF1E-19F8-C746-910E-8DFD86780E60}"/>
+                </a:ext>
+              </a:extLst>
+            </p:cNvPr>
+            <p:cNvPicPr>
+              <a:picLocks noChangeAspect="1"/>
+            </p:cNvPicPr>
+            <p:nvPr/>
+          </p:nvPicPr>
+          <p:blipFill>
+            <a:blip r:embed="rId3"/>
+            <a:stretch>
+              <a:fillRect/>
+            </a:stretch>
+          </p:blipFill>
+          <p:spPr>
+            <a:xfrm>
+              <a:off x="1994452" y="1517372"/>
+              <a:ext cx="8229600" cy="4114800"/>
+            </a:xfrm>
+            <a:prstGeom prst="rect">
+              <a:avLst/>
+            </a:prstGeom>
+          </p:spPr>
+        </p:pic>
+      </p:grpSp>
+    </p:spTree>
+    <p:extLst>
+      <p:ext uri="{BB962C8B-B14F-4D97-AF65-F5344CB8AC3E}">
+        <p14:creationId xmlns:p14="http://schemas.microsoft.com/office/powerpoint/2010/main" val="552292283"/>
+      </p:ext>
+    </p:extLst>
+  </p:cSld>
+  <p:clrMapOvr>
+    <a:masterClrMapping/>
+  </p:clrMapOvr>
+</p:sld>
+</file>
+
+<file path=ppt/slides/slide21.xml><?xml version="1.0" encoding="utf-8"?>
+<p:sld xmlns:a="http://schemas.openxmlformats.org/drawingml/2006/main" xmlns:r="http://schemas.openxmlformats.org/officeDocument/2006/relationships" xmlns:p="http://schemas.openxmlformats.org/presentationml/2006/main">
+  <p:cSld>
+    <p:spTree>
+      <p:nvGrpSpPr>
+        <p:cNvPr id="1" name=""/>
+        <p:cNvGrpSpPr/>
+        <p:nvPr/>
+      </p:nvGrpSpPr>
+      <p:grpSpPr>
+        <a:xfrm>
+          <a:off x="0" y="0"/>
+          <a:ext cx="0" cy="0"/>
+          <a:chOff x="0" y="0"/>
+          <a:chExt cx="0" cy="0"/>
+        </a:xfrm>
+      </p:grpSpPr>
+      <p:grpSp>
+        <p:nvGrpSpPr>
+          <p:cNvPr id="9" name="Group 8">
+            <a:extLst>
+              <a:ext uri="{FF2B5EF4-FFF2-40B4-BE49-F238E27FC236}">
+                <a16:creationId xmlns:a16="http://schemas.microsoft.com/office/drawing/2014/main" id="{30EF42FE-BC3B-D04F-AFA9-551010536004}"/>
+              </a:ext>
+            </a:extLst>
+          </p:cNvPr>
+          <p:cNvGrpSpPr/>
+          <p:nvPr/>
+        </p:nvGrpSpPr>
+        <p:grpSpPr>
+          <a:xfrm>
+            <a:off x="1745375" y="-385810"/>
+            <a:ext cx="8847020" cy="7902573"/>
+            <a:chOff x="1745375" y="-385810"/>
+            <a:chExt cx="8847020" cy="7902573"/>
+          </a:xfrm>
+        </p:grpSpPr>
+        <p:sp>
+          <p:nvSpPr>
+            <p:cNvPr id="23" name="Oval 22">
+              <a:extLst>
+                <a:ext uri="{FF2B5EF4-FFF2-40B4-BE49-F238E27FC236}">
+                  <a16:creationId xmlns:a16="http://schemas.microsoft.com/office/drawing/2014/main" id="{083DE818-4766-7A47-8803-496F64D60ABA}"/>
+                </a:ext>
+              </a:extLst>
+            </p:cNvPr>
+            <p:cNvSpPr/>
+            <p:nvPr/>
+          </p:nvSpPr>
+          <p:spPr>
+            <a:xfrm>
+              <a:off x="3914503" y="1247503"/>
+              <a:ext cx="4362994" cy="4362994"/>
+            </a:xfrm>
+            <a:prstGeom prst="ellipse">
+              <a:avLst/>
+            </a:prstGeom>
+            <a:solidFill>
+              <a:schemeClr val="bg1"/>
+            </a:solidFill>
+            <a:ln>
+              <a:noFill/>
+            </a:ln>
+          </p:spPr>
+          <p:style>
+            <a:lnRef idx="2">
+              <a:schemeClr val="accent1">
+                <a:shade val="50000"/>
+              </a:schemeClr>
+            </a:lnRef>
+            <a:fillRef idx="1">
+              <a:schemeClr val="accent1"/>
+            </a:fillRef>
+            <a:effectRef idx="0">
+              <a:schemeClr val="accent1"/>
+            </a:effectRef>
+            <a:fontRef idx="minor">
+              <a:schemeClr val="lt1"/>
+            </a:fontRef>
+          </p:style>
+          <p:txBody>
+            <a:bodyPr rtlCol="0" anchor="ctr"/>
+            <a:lstStyle/>
+            <a:p>
+              <a:pPr algn="ctr"/>
+              <a:endParaRPr lang="en-US" b="1"/>
+            </a:p>
+          </p:txBody>
+        </p:sp>
+        <p:grpSp>
+          <p:nvGrpSpPr>
+            <p:cNvPr id="24" name="Group 23">
+              <a:extLst>
+                <a:ext uri="{FF2B5EF4-FFF2-40B4-BE49-F238E27FC236}">
+                  <a16:creationId xmlns:a16="http://schemas.microsoft.com/office/drawing/2014/main" id="{CBFF1779-8255-C049-8AD8-2F2777EB7971}"/>
+                </a:ext>
+              </a:extLst>
+            </p:cNvPr>
+            <p:cNvGrpSpPr/>
+            <p:nvPr/>
+          </p:nvGrpSpPr>
+          <p:grpSpPr>
+            <a:xfrm>
+              <a:off x="4185160" y="1516465"/>
+              <a:ext cx="3821682" cy="3825072"/>
+              <a:chOff x="4185160" y="1516465"/>
+              <a:chExt cx="3821682" cy="3825072"/>
+            </a:xfrm>
+          </p:grpSpPr>
+          <p:sp>
+            <p:nvSpPr>
+              <p:cNvPr id="4" name="Oval 3">
+                <a:extLst>
+                  <a:ext uri="{FF2B5EF4-FFF2-40B4-BE49-F238E27FC236}">
+                    <a16:creationId xmlns:a16="http://schemas.microsoft.com/office/drawing/2014/main" id="{9A6DA34C-F484-5E43-BB32-A3AEB809FFC8}"/>
+                  </a:ext>
+                </a:extLst>
+              </p:cNvPr>
+              <p:cNvSpPr/>
+              <p:nvPr/>
+            </p:nvSpPr>
+            <p:spPr>
+              <a:xfrm>
+                <a:off x="4185160" y="1516465"/>
+                <a:ext cx="3821682" cy="3825072"/>
+              </a:xfrm>
+              <a:prstGeom prst="ellipse">
+                <a:avLst/>
+              </a:prstGeom>
+              <a:solidFill>
+                <a:srgbClr val="1F3864"/>
+              </a:solidFill>
+              <a:ln>
+                <a:noFill/>
+              </a:ln>
+            </p:spPr>
+            <p:style>
+              <a:lnRef idx="2">
+                <a:schemeClr val="accent1">
+                  <a:shade val="50000"/>
+                </a:schemeClr>
+              </a:lnRef>
+              <a:fillRef idx="1">
+                <a:schemeClr val="accent1"/>
+              </a:fillRef>
+              <a:effectRef idx="0">
+                <a:schemeClr val="accent1"/>
+              </a:effectRef>
+              <a:fontRef idx="minor">
+                <a:schemeClr val="lt1"/>
+              </a:fontRef>
+            </p:style>
+            <p:txBody>
+              <a:bodyPr rtlCol="0" anchor="ctr"/>
+              <a:lstStyle/>
+              <a:p>
+                <a:pPr algn="ctr"/>
+                <a:endParaRPr lang="en-US" b="1"/>
+              </a:p>
+            </p:txBody>
+          </p:sp>
+          <p:sp>
+            <p:nvSpPr>
+              <p:cNvPr id="20" name="Oval 19">
+                <a:extLst>
+                  <a:ext uri="{FF2B5EF4-FFF2-40B4-BE49-F238E27FC236}">
+                    <a16:creationId xmlns:a16="http://schemas.microsoft.com/office/drawing/2014/main" id="{86017DD8-2F11-654B-B328-A69DC94CBCE7}"/>
+                  </a:ext>
+                </a:extLst>
+              </p:cNvPr>
+              <p:cNvSpPr/>
+              <p:nvPr/>
+            </p:nvSpPr>
+            <p:spPr>
+              <a:xfrm>
+                <a:off x="4621619" y="1953311"/>
+                <a:ext cx="2948762" cy="2951378"/>
+              </a:xfrm>
+              <a:prstGeom prst="ellipse">
+                <a:avLst/>
+              </a:prstGeom>
+              <a:solidFill>
+                <a:schemeClr val="bg1"/>
+              </a:solidFill>
+              <a:ln>
+                <a:noFill/>
+              </a:ln>
+            </p:spPr>
+            <p:style>
+              <a:lnRef idx="2">
+                <a:schemeClr val="accent1">
+                  <a:shade val="50000"/>
+                </a:schemeClr>
+              </a:lnRef>
+              <a:fillRef idx="1">
+                <a:schemeClr val="accent1"/>
+              </a:fillRef>
+              <a:effectRef idx="0">
+                <a:schemeClr val="accent1"/>
+              </a:effectRef>
+              <a:fontRef idx="minor">
+                <a:schemeClr val="lt1"/>
+              </a:fontRef>
+            </p:style>
+            <p:txBody>
+              <a:bodyPr rtlCol="0" anchor="ctr"/>
+              <a:lstStyle/>
+              <a:p>
+                <a:pPr algn="ctr"/>
+                <a:endParaRPr lang="en-US" b="1"/>
+              </a:p>
+            </p:txBody>
+          </p:sp>
+        </p:grpSp>
+        <p:pic>
+          <p:nvPicPr>
+            <p:cNvPr id="3" name="Picture 2" descr="Logo&#10;&#10;Description automatically generated">
+              <a:extLst>
+                <a:ext uri="{FF2B5EF4-FFF2-40B4-BE49-F238E27FC236}">
+                  <a16:creationId xmlns:a16="http://schemas.microsoft.com/office/drawing/2014/main" id="{7FDDA90B-10CD-5F4A-98A8-31FE373A2090}"/>
+                </a:ext>
+              </a:extLst>
+            </p:cNvPr>
+            <p:cNvPicPr>
+              <a:picLocks noChangeAspect="1"/>
+            </p:cNvPicPr>
+            <p:nvPr/>
+          </p:nvPicPr>
+          <p:blipFill>
+            <a:blip r:embed="rId3"/>
+            <a:stretch>
+              <a:fillRect/>
+            </a:stretch>
+          </p:blipFill>
+          <p:spPr>
+            <a:xfrm>
+              <a:off x="1745375" y="-383459"/>
+              <a:ext cx="7900222" cy="7900222"/>
+            </a:xfrm>
+            <a:prstGeom prst="rect">
+              <a:avLst/>
+            </a:prstGeom>
+          </p:spPr>
+        </p:pic>
+        <p:pic>
+          <p:nvPicPr>
+            <p:cNvPr id="6" name="Picture 5" descr="Icon&#10;&#10;Description automatically generated with medium confidence">
+              <a:extLst>
+                <a:ext uri="{FF2B5EF4-FFF2-40B4-BE49-F238E27FC236}">
+                  <a16:creationId xmlns:a16="http://schemas.microsoft.com/office/drawing/2014/main" id="{70BC9820-9BBD-AD42-AEED-6A09D59CCCF3}"/>
+                </a:ext>
+              </a:extLst>
+            </p:cNvPr>
+            <p:cNvPicPr>
+              <a:picLocks noChangeAspect="1"/>
+            </p:cNvPicPr>
+            <p:nvPr/>
+          </p:nvPicPr>
+          <p:blipFill>
+            <a:blip r:embed="rId4"/>
+            <a:stretch>
+              <a:fillRect/>
+            </a:stretch>
+          </p:blipFill>
+          <p:spPr>
+            <a:xfrm>
+              <a:off x="2692175" y="-385810"/>
+              <a:ext cx="7900220" cy="7900220"/>
+            </a:xfrm>
+            <a:prstGeom prst="rect">
+              <a:avLst/>
+            </a:prstGeom>
+          </p:spPr>
+        </p:pic>
+      </p:grpSp>
+    </p:spTree>
+    <p:extLst>
+      <p:ext uri="{BB962C8B-B14F-4D97-AF65-F5344CB8AC3E}">
+        <p14:creationId xmlns:p14="http://schemas.microsoft.com/office/powerpoint/2010/main" val="69624108"/>
       </p:ext>
     </p:extLst>
   </p:cSld>

</xml_diff>

<commit_message>
translate new logo design to web page
</commit_message>
<xml_diff>
--- a/resources/logos.pptx
+++ b/resources/logos.pptx
@@ -5,7 +5,7 @@
     <p:sldMasterId id="2147483648" r:id="rId1"/>
   </p:sldMasterIdLst>
   <p:notesMasterIdLst>
-    <p:notesMasterId r:id="rId23"/>
+    <p:notesMasterId r:id="rId24"/>
   </p:notesMasterIdLst>
   <p:sldIdLst>
     <p:sldId id="256" r:id="rId2"/>
@@ -29,6 +29,7 @@
     <p:sldId id="273" r:id="rId20"/>
     <p:sldId id="276" r:id="rId21"/>
     <p:sldId id="277" r:id="rId22"/>
+    <p:sldId id="278" r:id="rId23"/>
   </p:sldIdLst>
   <p:sldSz cx="12192000" cy="6858000"/>
   <p:notesSz cx="6858000" cy="9144000"/>
@@ -1729,6 +1730,93 @@
     <p:extLst>
       <p:ext uri="{BB962C8B-B14F-4D97-AF65-F5344CB8AC3E}">
         <p14:creationId xmlns:p14="http://schemas.microsoft.com/office/powerpoint/2010/main" val="1870320372"/>
+      </p:ext>
+    </p:extLst>
+  </p:cSld>
+  <p:clrMapOvr>
+    <a:masterClrMapping/>
+  </p:clrMapOvr>
+</p:notes>
+</file>
+
+<file path=ppt/notesSlides/notesSlide22.xml><?xml version="1.0" encoding="utf-8"?>
+<p:notes xmlns:a="http://schemas.openxmlformats.org/drawingml/2006/main" xmlns:r="http://schemas.openxmlformats.org/officeDocument/2006/relationships" xmlns:p="http://schemas.openxmlformats.org/presentationml/2006/main">
+  <p:cSld>
+    <p:spTree>
+      <p:nvGrpSpPr>
+        <p:cNvPr id="1" name=""/>
+        <p:cNvGrpSpPr/>
+        <p:nvPr/>
+      </p:nvGrpSpPr>
+      <p:grpSpPr>
+        <a:xfrm>
+          <a:off x="0" y="0"/>
+          <a:ext cx="0" cy="0"/>
+          <a:chOff x="0" y="0"/>
+          <a:chExt cx="0" cy="0"/>
+        </a:xfrm>
+      </p:grpSpPr>
+      <p:sp>
+        <p:nvSpPr>
+          <p:cNvPr id="2" name="Slide Image Placeholder 1"/>
+          <p:cNvSpPr>
+            <a:spLocks noGrp="1" noRot="1" noChangeAspect="1"/>
+          </p:cNvSpPr>
+          <p:nvPr>
+            <p:ph type="sldImg"/>
+          </p:nvPr>
+        </p:nvSpPr>
+        <p:spPr/>
+      </p:sp>
+      <p:sp>
+        <p:nvSpPr>
+          <p:cNvPr id="3" name="Notes Placeholder 2"/>
+          <p:cNvSpPr>
+            <a:spLocks noGrp="1"/>
+          </p:cNvSpPr>
+          <p:nvPr>
+            <p:ph type="body" idx="1"/>
+          </p:nvPr>
+        </p:nvSpPr>
+        <p:spPr/>
+        <p:txBody>
+          <a:bodyPr/>
+          <a:lstStyle/>
+          <a:p>
+            <a:r>
+              <a:rPr lang="en-US" dirty="0"/>
+              <a:t>Final favicon logo design awaiting confirmation from Tony – WITHOUT BACKGROUND CIRCLE</a:t>
+            </a:r>
+          </a:p>
+        </p:txBody>
+      </p:sp>
+      <p:sp>
+        <p:nvSpPr>
+          <p:cNvPr id="4" name="Slide Number Placeholder 3"/>
+          <p:cNvSpPr>
+            <a:spLocks noGrp="1"/>
+          </p:cNvSpPr>
+          <p:nvPr>
+            <p:ph type="sldNum" sz="quarter" idx="5"/>
+          </p:nvPr>
+        </p:nvSpPr>
+        <p:spPr/>
+        <p:txBody>
+          <a:bodyPr/>
+          <a:lstStyle/>
+          <a:p>
+            <a:fld id="{37EBE46D-06CB-364A-8678-F123B7961E55}" type="slidenum">
+              <a:rPr lang="en-US" smtClean="0"/>
+              <a:t>22</a:t>
+            </a:fld>
+            <a:endParaRPr lang="en-US"/>
+          </a:p>
+        </p:txBody>
+      </p:sp>
+    </p:spTree>
+    <p:extLst>
+      <p:ext uri="{BB962C8B-B14F-4D97-AF65-F5344CB8AC3E}">
+        <p14:creationId xmlns:p14="http://schemas.microsoft.com/office/powerpoint/2010/main" val="3157090607"/>
       </p:ext>
     </p:extLst>
   </p:cSld>
@@ -9932,6 +10020,242 @@
 </p:sld>
 </file>
 
+<file path=ppt/slides/slide22.xml><?xml version="1.0" encoding="utf-8"?>
+<p:sld xmlns:a="http://schemas.openxmlformats.org/drawingml/2006/main" xmlns:r="http://schemas.openxmlformats.org/officeDocument/2006/relationships" xmlns:p="http://schemas.openxmlformats.org/presentationml/2006/main">
+  <p:cSld>
+    <p:spTree>
+      <p:nvGrpSpPr>
+        <p:cNvPr id="1" name=""/>
+        <p:cNvGrpSpPr/>
+        <p:nvPr/>
+      </p:nvGrpSpPr>
+      <p:grpSpPr>
+        <a:xfrm>
+          <a:off x="0" y="0"/>
+          <a:ext cx="0" cy="0"/>
+          <a:chOff x="0" y="0"/>
+          <a:chExt cx="0" cy="0"/>
+        </a:xfrm>
+      </p:grpSpPr>
+      <p:grpSp>
+        <p:nvGrpSpPr>
+          <p:cNvPr id="2" name="Group 1">
+            <a:extLst>
+              <a:ext uri="{FF2B5EF4-FFF2-40B4-BE49-F238E27FC236}">
+                <a16:creationId xmlns:a16="http://schemas.microsoft.com/office/drawing/2014/main" id="{41AEBF4D-F752-5A47-A774-ADF357A76193}"/>
+              </a:ext>
+            </a:extLst>
+          </p:cNvPr>
+          <p:cNvGrpSpPr/>
+          <p:nvPr/>
+        </p:nvGrpSpPr>
+        <p:grpSpPr>
+          <a:xfrm>
+            <a:off x="1745375" y="-385810"/>
+            <a:ext cx="8847020" cy="7902573"/>
+            <a:chOff x="1745375" y="-385810"/>
+            <a:chExt cx="8847020" cy="7902573"/>
+          </a:xfrm>
+        </p:grpSpPr>
+        <p:grpSp>
+          <p:nvGrpSpPr>
+            <p:cNvPr id="24" name="Group 23">
+              <a:extLst>
+                <a:ext uri="{FF2B5EF4-FFF2-40B4-BE49-F238E27FC236}">
+                  <a16:creationId xmlns:a16="http://schemas.microsoft.com/office/drawing/2014/main" id="{CBFF1779-8255-C049-8AD8-2F2777EB7971}"/>
+                </a:ext>
+              </a:extLst>
+            </p:cNvPr>
+            <p:cNvGrpSpPr/>
+            <p:nvPr/>
+          </p:nvGrpSpPr>
+          <p:grpSpPr>
+            <a:xfrm>
+              <a:off x="4185160" y="1516465"/>
+              <a:ext cx="3821682" cy="3825072"/>
+              <a:chOff x="4185160" y="1516465"/>
+              <a:chExt cx="3821682" cy="3825072"/>
+            </a:xfrm>
+          </p:grpSpPr>
+          <p:sp>
+            <p:nvSpPr>
+              <p:cNvPr id="4" name="Oval 3">
+                <a:extLst>
+                  <a:ext uri="{FF2B5EF4-FFF2-40B4-BE49-F238E27FC236}">
+                    <a16:creationId xmlns:a16="http://schemas.microsoft.com/office/drawing/2014/main" id="{9A6DA34C-F484-5E43-BB32-A3AEB809FFC8}"/>
+                  </a:ext>
+                </a:extLst>
+              </p:cNvPr>
+              <p:cNvSpPr/>
+              <p:nvPr/>
+            </p:nvSpPr>
+            <p:spPr>
+              <a:xfrm>
+                <a:off x="4185160" y="1516465"/>
+                <a:ext cx="3821682" cy="3825072"/>
+              </a:xfrm>
+              <a:prstGeom prst="ellipse">
+                <a:avLst/>
+              </a:prstGeom>
+              <a:solidFill>
+                <a:srgbClr val="1F3864"/>
+              </a:solidFill>
+              <a:ln>
+                <a:noFill/>
+              </a:ln>
+            </p:spPr>
+            <p:style>
+              <a:lnRef idx="2">
+                <a:schemeClr val="accent1">
+                  <a:shade val="50000"/>
+                </a:schemeClr>
+              </a:lnRef>
+              <a:fillRef idx="1">
+                <a:schemeClr val="accent1"/>
+              </a:fillRef>
+              <a:effectRef idx="0">
+                <a:schemeClr val="accent1"/>
+              </a:effectRef>
+              <a:fontRef idx="minor">
+                <a:schemeClr val="lt1"/>
+              </a:fontRef>
+            </p:style>
+            <p:txBody>
+              <a:bodyPr rtlCol="0" anchor="ctr"/>
+              <a:lstStyle/>
+              <a:p>
+                <a:pPr algn="ctr"/>
+                <a:endParaRPr lang="en-US" b="1"/>
+              </a:p>
+            </p:txBody>
+          </p:sp>
+          <p:sp>
+            <p:nvSpPr>
+              <p:cNvPr id="20" name="Oval 19">
+                <a:extLst>
+                  <a:ext uri="{FF2B5EF4-FFF2-40B4-BE49-F238E27FC236}">
+                    <a16:creationId xmlns:a16="http://schemas.microsoft.com/office/drawing/2014/main" id="{86017DD8-2F11-654B-B328-A69DC94CBCE7}"/>
+                  </a:ext>
+                </a:extLst>
+              </p:cNvPr>
+              <p:cNvSpPr/>
+              <p:nvPr/>
+            </p:nvSpPr>
+            <p:spPr>
+              <a:xfrm>
+                <a:off x="4621619" y="1953311"/>
+                <a:ext cx="2948762" cy="2951378"/>
+              </a:xfrm>
+              <a:prstGeom prst="ellipse">
+                <a:avLst/>
+              </a:prstGeom>
+              <a:solidFill>
+                <a:schemeClr val="bg1"/>
+              </a:solidFill>
+              <a:ln>
+                <a:noFill/>
+              </a:ln>
+            </p:spPr>
+            <p:style>
+              <a:lnRef idx="2">
+                <a:schemeClr val="accent1">
+                  <a:shade val="50000"/>
+                </a:schemeClr>
+              </a:lnRef>
+              <a:fillRef idx="1">
+                <a:schemeClr val="accent1"/>
+              </a:fillRef>
+              <a:effectRef idx="0">
+                <a:schemeClr val="accent1"/>
+              </a:effectRef>
+              <a:fontRef idx="minor">
+                <a:schemeClr val="lt1"/>
+              </a:fontRef>
+            </p:style>
+            <p:txBody>
+              <a:bodyPr rtlCol="0" anchor="ctr"/>
+              <a:lstStyle/>
+              <a:p>
+                <a:pPr algn="ctr"/>
+                <a:endParaRPr lang="en-US" b="1"/>
+              </a:p>
+            </p:txBody>
+          </p:sp>
+        </p:grpSp>
+        <p:pic>
+          <p:nvPicPr>
+            <p:cNvPr id="3" name="Picture 2" descr="Logo&#10;&#10;Description automatically generated">
+              <a:extLst>
+                <a:ext uri="{FF2B5EF4-FFF2-40B4-BE49-F238E27FC236}">
+                  <a16:creationId xmlns:a16="http://schemas.microsoft.com/office/drawing/2014/main" id="{7FDDA90B-10CD-5F4A-98A8-31FE373A2090}"/>
+                </a:ext>
+              </a:extLst>
+            </p:cNvPr>
+            <p:cNvPicPr>
+              <a:picLocks noChangeAspect="1"/>
+            </p:cNvPicPr>
+            <p:nvPr/>
+          </p:nvPicPr>
+          <p:blipFill>
+            <a:blip r:embed="rId3"/>
+            <a:stretch>
+              <a:fillRect/>
+            </a:stretch>
+          </p:blipFill>
+          <p:spPr>
+            <a:xfrm>
+              <a:off x="1745375" y="-383459"/>
+              <a:ext cx="7900222" cy="7900222"/>
+            </a:xfrm>
+            <a:prstGeom prst="rect">
+              <a:avLst/>
+            </a:prstGeom>
+          </p:spPr>
+        </p:pic>
+        <p:pic>
+          <p:nvPicPr>
+            <p:cNvPr id="6" name="Picture 5" descr="Icon&#10;&#10;Description automatically generated with medium confidence">
+              <a:extLst>
+                <a:ext uri="{FF2B5EF4-FFF2-40B4-BE49-F238E27FC236}">
+                  <a16:creationId xmlns:a16="http://schemas.microsoft.com/office/drawing/2014/main" id="{70BC9820-9BBD-AD42-AEED-6A09D59CCCF3}"/>
+                </a:ext>
+              </a:extLst>
+            </p:cNvPr>
+            <p:cNvPicPr>
+              <a:picLocks noChangeAspect="1"/>
+            </p:cNvPicPr>
+            <p:nvPr/>
+          </p:nvPicPr>
+          <p:blipFill>
+            <a:blip r:embed="rId4"/>
+            <a:stretch>
+              <a:fillRect/>
+            </a:stretch>
+          </p:blipFill>
+          <p:spPr>
+            <a:xfrm>
+              <a:off x="2692175" y="-385810"/>
+              <a:ext cx="7900220" cy="7900220"/>
+            </a:xfrm>
+            <a:prstGeom prst="rect">
+              <a:avLst/>
+            </a:prstGeom>
+          </p:spPr>
+        </p:pic>
+      </p:grpSp>
+    </p:spTree>
+    <p:extLst>
+      <p:ext uri="{BB962C8B-B14F-4D97-AF65-F5344CB8AC3E}">
+        <p14:creationId xmlns:p14="http://schemas.microsoft.com/office/powerpoint/2010/main" val="2704802098"/>
+      </p:ext>
+    </p:extLst>
+  </p:cSld>
+  <p:clrMapOvr>
+    <a:masterClrMapping/>
+  </p:clrMapOvr>
+</p:sld>
+</file>
+
 <file path=ppt/slides/slide3.xml><?xml version="1.0" encoding="utf-8"?>
 <p:sld xmlns:a="http://schemas.openxmlformats.org/drawingml/2006/main" xmlns:r="http://schemas.openxmlformats.org/officeDocument/2006/relationships" xmlns:p="http://schemas.openxmlformats.org/presentationml/2006/main">
   <p:cSld>

</xml_diff>

<commit_message>
update services/x/ photos and make new draft logo
</commit_message>
<xml_diff>
--- a/resources/logos.pptx
+++ b/resources/logos.pptx
@@ -5,7 +5,7 @@
     <p:sldMasterId id="2147483648" r:id="rId1"/>
   </p:sldMasterIdLst>
   <p:notesMasterIdLst>
-    <p:notesMasterId r:id="rId24"/>
+    <p:notesMasterId r:id="rId25"/>
   </p:notesMasterIdLst>
   <p:sldIdLst>
     <p:sldId id="256" r:id="rId2"/>
@@ -28,8 +28,9 @@
     <p:sldId id="275" r:id="rId19"/>
     <p:sldId id="273" r:id="rId20"/>
     <p:sldId id="276" r:id="rId21"/>
-    <p:sldId id="277" r:id="rId22"/>
-    <p:sldId id="278" r:id="rId23"/>
+    <p:sldId id="279" r:id="rId22"/>
+    <p:sldId id="277" r:id="rId23"/>
+    <p:sldId id="278" r:id="rId24"/>
   </p:sldIdLst>
   <p:sldSz cx="12192000" cy="6858000"/>
   <p:notesSz cx="6858000" cy="9144000"/>
@@ -243,7 +244,7 @@
           <a:p>
             <a:fld id="{FEB29CEE-7550-5F4D-AAD4-BA10048E6F66}" type="datetimeFigureOut">
               <a:rPr lang="en-US" smtClean="0"/>
-              <a:t>4/20/21</a:t>
+              <a:t>5/16/21</a:t>
             </a:fld>
             <a:endParaRPr lang="en-US"/>
           </a:p>
@@ -1611,7 +1612,7 @@
           <a:p>
             <a:r>
               <a:rPr lang="en-US" dirty="0"/>
-              <a:t>Final logo design awaiting confirmation from Tony</a:t>
+              <a:t>[FINAL] Final logo design awaiting confirmation from Tony</a:t>
             </a:r>
           </a:p>
         </p:txBody>
@@ -1698,7 +1699,7 @@
           <a:p>
             <a:r>
               <a:rPr lang="en-US" dirty="0"/>
-              <a:t>Final favicon logo design awaiting confirmation from Tony</a:t>
+              <a:t>[DRAFT] Final logo design awaiting confirmation from Tony – 2021-05-16</a:t>
             </a:r>
           </a:p>
         </p:txBody>
@@ -1729,7 +1730,7 @@
     </p:spTree>
     <p:extLst>
       <p:ext uri="{BB962C8B-B14F-4D97-AF65-F5344CB8AC3E}">
-        <p14:creationId xmlns:p14="http://schemas.microsoft.com/office/powerpoint/2010/main" val="1870320372"/>
+        <p14:creationId xmlns:p14="http://schemas.microsoft.com/office/powerpoint/2010/main" val="4223634278"/>
       </p:ext>
     </p:extLst>
   </p:cSld>
@@ -1785,7 +1786,7 @@
           <a:p>
             <a:r>
               <a:rPr lang="en-US" dirty="0"/>
-              <a:t>Final favicon logo design awaiting confirmation from Tony – WITHOUT BACKGROUND CIRCLE</a:t>
+              <a:t>Final favicon logo design awaiting confirmation from Tony</a:t>
             </a:r>
           </a:p>
         </p:txBody>
@@ -1808,6 +1809,93 @@
             <a:fld id="{37EBE46D-06CB-364A-8678-F123B7961E55}" type="slidenum">
               <a:rPr lang="en-US" smtClean="0"/>
               <a:t>22</a:t>
+            </a:fld>
+            <a:endParaRPr lang="en-US"/>
+          </a:p>
+        </p:txBody>
+      </p:sp>
+    </p:spTree>
+    <p:extLst>
+      <p:ext uri="{BB962C8B-B14F-4D97-AF65-F5344CB8AC3E}">
+        <p14:creationId xmlns:p14="http://schemas.microsoft.com/office/powerpoint/2010/main" val="1870320372"/>
+      </p:ext>
+    </p:extLst>
+  </p:cSld>
+  <p:clrMapOvr>
+    <a:masterClrMapping/>
+  </p:clrMapOvr>
+</p:notes>
+</file>
+
+<file path=ppt/notesSlides/notesSlide23.xml><?xml version="1.0" encoding="utf-8"?>
+<p:notes xmlns:a="http://schemas.openxmlformats.org/drawingml/2006/main" xmlns:r="http://schemas.openxmlformats.org/officeDocument/2006/relationships" xmlns:p="http://schemas.openxmlformats.org/presentationml/2006/main">
+  <p:cSld>
+    <p:spTree>
+      <p:nvGrpSpPr>
+        <p:cNvPr id="1" name=""/>
+        <p:cNvGrpSpPr/>
+        <p:nvPr/>
+      </p:nvGrpSpPr>
+      <p:grpSpPr>
+        <a:xfrm>
+          <a:off x="0" y="0"/>
+          <a:ext cx="0" cy="0"/>
+          <a:chOff x="0" y="0"/>
+          <a:chExt cx="0" cy="0"/>
+        </a:xfrm>
+      </p:grpSpPr>
+      <p:sp>
+        <p:nvSpPr>
+          <p:cNvPr id="2" name="Slide Image Placeholder 1"/>
+          <p:cNvSpPr>
+            <a:spLocks noGrp="1" noRot="1" noChangeAspect="1"/>
+          </p:cNvSpPr>
+          <p:nvPr>
+            <p:ph type="sldImg"/>
+          </p:nvPr>
+        </p:nvSpPr>
+        <p:spPr/>
+      </p:sp>
+      <p:sp>
+        <p:nvSpPr>
+          <p:cNvPr id="3" name="Notes Placeholder 2"/>
+          <p:cNvSpPr>
+            <a:spLocks noGrp="1"/>
+          </p:cNvSpPr>
+          <p:nvPr>
+            <p:ph type="body" idx="1"/>
+          </p:nvPr>
+        </p:nvSpPr>
+        <p:spPr/>
+        <p:txBody>
+          <a:bodyPr/>
+          <a:lstStyle/>
+          <a:p>
+            <a:r>
+              <a:rPr lang="en-US" dirty="0"/>
+              <a:t>Final favicon logo design awaiting confirmation from Tony – WITHOUT BACKGROUND CIRCLE</a:t>
+            </a:r>
+          </a:p>
+        </p:txBody>
+      </p:sp>
+      <p:sp>
+        <p:nvSpPr>
+          <p:cNvPr id="4" name="Slide Number Placeholder 3"/>
+          <p:cNvSpPr>
+            <a:spLocks noGrp="1"/>
+          </p:cNvSpPr>
+          <p:nvPr>
+            <p:ph type="sldNum" sz="quarter" idx="5"/>
+          </p:nvPr>
+        </p:nvSpPr>
+        <p:spPr/>
+        <p:txBody>
+          <a:bodyPr/>
+          <a:lstStyle/>
+          <a:p>
+            <a:fld id="{37EBE46D-06CB-364A-8678-F123B7961E55}" type="slidenum">
+              <a:rPr lang="en-US" smtClean="0"/>
+              <a:t>23</a:t>
             </a:fld>
             <a:endParaRPr lang="en-US"/>
           </a:p>
@@ -2564,7 +2652,7 @@
           <a:p>
             <a:fld id="{18A9FC8D-95A3-944C-8EC7-78D73130DFAB}" type="datetimeFigureOut">
               <a:rPr lang="en-US" smtClean="0"/>
-              <a:t>4/20/21</a:t>
+              <a:t>5/16/21</a:t>
             </a:fld>
             <a:endParaRPr lang="en-US"/>
           </a:p>
@@ -2762,7 +2850,7 @@
           <a:p>
             <a:fld id="{18A9FC8D-95A3-944C-8EC7-78D73130DFAB}" type="datetimeFigureOut">
               <a:rPr lang="en-US" smtClean="0"/>
-              <a:t>4/20/21</a:t>
+              <a:t>5/16/21</a:t>
             </a:fld>
             <a:endParaRPr lang="en-US"/>
           </a:p>
@@ -2970,7 +3058,7 @@
           <a:p>
             <a:fld id="{18A9FC8D-95A3-944C-8EC7-78D73130DFAB}" type="datetimeFigureOut">
               <a:rPr lang="en-US" smtClean="0"/>
-              <a:t>4/20/21</a:t>
+              <a:t>5/16/21</a:t>
             </a:fld>
             <a:endParaRPr lang="en-US"/>
           </a:p>
@@ -3168,7 +3256,7 @@
           <a:p>
             <a:fld id="{18A9FC8D-95A3-944C-8EC7-78D73130DFAB}" type="datetimeFigureOut">
               <a:rPr lang="en-US" smtClean="0"/>
-              <a:t>4/20/21</a:t>
+              <a:t>5/16/21</a:t>
             </a:fld>
             <a:endParaRPr lang="en-US"/>
           </a:p>
@@ -3443,7 +3531,7 @@
           <a:p>
             <a:fld id="{18A9FC8D-95A3-944C-8EC7-78D73130DFAB}" type="datetimeFigureOut">
               <a:rPr lang="en-US" smtClean="0"/>
-              <a:t>4/20/21</a:t>
+              <a:t>5/16/21</a:t>
             </a:fld>
             <a:endParaRPr lang="en-US"/>
           </a:p>
@@ -3708,7 +3796,7 @@
           <a:p>
             <a:fld id="{18A9FC8D-95A3-944C-8EC7-78D73130DFAB}" type="datetimeFigureOut">
               <a:rPr lang="en-US" smtClean="0"/>
-              <a:t>4/20/21</a:t>
+              <a:t>5/16/21</a:t>
             </a:fld>
             <a:endParaRPr lang="en-US"/>
           </a:p>
@@ -4120,7 +4208,7 @@
           <a:p>
             <a:fld id="{18A9FC8D-95A3-944C-8EC7-78D73130DFAB}" type="datetimeFigureOut">
               <a:rPr lang="en-US" smtClean="0"/>
-              <a:t>4/20/21</a:t>
+              <a:t>5/16/21</a:t>
             </a:fld>
             <a:endParaRPr lang="en-US"/>
           </a:p>
@@ -4261,7 +4349,7 @@
           <a:p>
             <a:fld id="{18A9FC8D-95A3-944C-8EC7-78D73130DFAB}" type="datetimeFigureOut">
               <a:rPr lang="en-US" smtClean="0"/>
-              <a:t>4/20/21</a:t>
+              <a:t>5/16/21</a:t>
             </a:fld>
             <a:endParaRPr lang="en-US"/>
           </a:p>
@@ -4374,7 +4462,7 @@
           <a:p>
             <a:fld id="{18A9FC8D-95A3-944C-8EC7-78D73130DFAB}" type="datetimeFigureOut">
               <a:rPr lang="en-US" smtClean="0"/>
-              <a:t>4/20/21</a:t>
+              <a:t>5/16/21</a:t>
             </a:fld>
             <a:endParaRPr lang="en-US"/>
           </a:p>
@@ -4685,7 +4773,7 @@
           <a:p>
             <a:fld id="{18A9FC8D-95A3-944C-8EC7-78D73130DFAB}" type="datetimeFigureOut">
               <a:rPr lang="en-US" smtClean="0"/>
-              <a:t>4/20/21</a:t>
+              <a:t>5/16/21</a:t>
             </a:fld>
             <a:endParaRPr lang="en-US"/>
           </a:p>
@@ -4973,7 +5061,7 @@
           <a:p>
             <a:fld id="{18A9FC8D-95A3-944C-8EC7-78D73130DFAB}" type="datetimeFigureOut">
               <a:rPr lang="en-US" smtClean="0"/>
-              <a:t>4/20/21</a:t>
+              <a:t>5/16/21</a:t>
             </a:fld>
             <a:endParaRPr lang="en-US"/>
           </a:p>
@@ -5214,7 +5302,7 @@
           <a:p>
             <a:fld id="{18A9FC8D-95A3-944C-8EC7-78D73130DFAB}" type="datetimeFigureOut">
               <a:rPr lang="en-US" smtClean="0"/>
-              <a:t>4/20/21</a:t>
+              <a:t>5/16/21</a:t>
             </a:fld>
             <a:endParaRPr lang="en-US"/>
           </a:p>
@@ -9751,6 +9839,339 @@
       </p:grpSpPr>
       <p:grpSp>
         <p:nvGrpSpPr>
+          <p:cNvPr id="19" name="Group 18">
+            <a:extLst>
+              <a:ext uri="{FF2B5EF4-FFF2-40B4-BE49-F238E27FC236}">
+                <a16:creationId xmlns:a16="http://schemas.microsoft.com/office/drawing/2014/main" id="{1B9983F1-B823-0E41-B8D2-88B4ED0DA669}"/>
+              </a:ext>
+            </a:extLst>
+          </p:cNvPr>
+          <p:cNvGrpSpPr/>
+          <p:nvPr/>
+        </p:nvGrpSpPr>
+        <p:grpSpPr>
+          <a:xfrm>
+            <a:off x="1789325" y="1388311"/>
+            <a:ext cx="7622463" cy="4221783"/>
+            <a:chOff x="1789325" y="1388311"/>
+            <a:chExt cx="7622463" cy="4221783"/>
+          </a:xfrm>
+        </p:grpSpPr>
+        <p:sp>
+          <p:nvSpPr>
+            <p:cNvPr id="16" name="Rectangle 15">
+              <a:extLst>
+                <a:ext uri="{FF2B5EF4-FFF2-40B4-BE49-F238E27FC236}">
+                  <a16:creationId xmlns:a16="http://schemas.microsoft.com/office/drawing/2014/main" id="{B5F5D76E-0352-1D44-9449-C8E26ABC0A0E}"/>
+                </a:ext>
+              </a:extLst>
+            </p:cNvPr>
+            <p:cNvSpPr/>
+            <p:nvPr/>
+          </p:nvSpPr>
+          <p:spPr>
+            <a:xfrm>
+              <a:off x="1789325" y="1388311"/>
+              <a:ext cx="7346018" cy="4081378"/>
+            </a:xfrm>
+            <a:prstGeom prst="rect">
+              <a:avLst/>
+            </a:prstGeom>
+            <a:solidFill>
+              <a:schemeClr val="bg1"/>
+            </a:solidFill>
+            <a:ln>
+              <a:noFill/>
+            </a:ln>
+          </p:spPr>
+          <p:style>
+            <a:lnRef idx="2">
+              <a:schemeClr val="accent1">
+                <a:shade val="50000"/>
+              </a:schemeClr>
+            </a:lnRef>
+            <a:fillRef idx="1">
+              <a:schemeClr val="accent1"/>
+            </a:fillRef>
+            <a:effectRef idx="0">
+              <a:schemeClr val="accent1"/>
+            </a:effectRef>
+            <a:fontRef idx="minor">
+              <a:schemeClr val="lt1"/>
+            </a:fontRef>
+          </p:style>
+          <p:txBody>
+            <a:bodyPr rtlCol="0" anchor="ctr"/>
+            <a:lstStyle/>
+            <a:p>
+              <a:pPr algn="ctr"/>
+              <a:endParaRPr lang="en-US"/>
+            </a:p>
+          </p:txBody>
+        </p:sp>
+        <p:sp>
+          <p:nvSpPr>
+            <p:cNvPr id="2" name="Rectangle 1">
+              <a:extLst>
+                <a:ext uri="{FF2B5EF4-FFF2-40B4-BE49-F238E27FC236}">
+                  <a16:creationId xmlns:a16="http://schemas.microsoft.com/office/drawing/2014/main" id="{BBD66765-D9B7-9A48-B458-52F8D02948D6}"/>
+                </a:ext>
+              </a:extLst>
+            </p:cNvPr>
+            <p:cNvSpPr/>
+            <p:nvPr/>
+          </p:nvSpPr>
+          <p:spPr>
+            <a:xfrm>
+              <a:off x="3877339" y="3877737"/>
+              <a:ext cx="4874291" cy="496334"/>
+            </a:xfrm>
+            <a:prstGeom prst="rect">
+              <a:avLst/>
+            </a:prstGeom>
+            <a:solidFill>
+              <a:srgbClr val="1F3864"/>
+            </a:solidFill>
+            <a:ln>
+              <a:noFill/>
+            </a:ln>
+          </p:spPr>
+          <p:style>
+            <a:lnRef idx="2">
+              <a:schemeClr val="accent1">
+                <a:shade val="50000"/>
+              </a:schemeClr>
+            </a:lnRef>
+            <a:fillRef idx="1">
+              <a:schemeClr val="accent1"/>
+            </a:fillRef>
+            <a:effectRef idx="0">
+              <a:schemeClr val="accent1"/>
+            </a:effectRef>
+            <a:fontRef idx="minor">
+              <a:schemeClr val="lt1"/>
+            </a:fontRef>
+          </p:style>
+          <p:txBody>
+            <a:bodyPr rtlCol="0" anchor="ctr"/>
+            <a:lstStyle/>
+            <a:p>
+              <a:pPr algn="r"/>
+              <a:endParaRPr lang="en-US" sz="3000" dirty="0">
+                <a:solidFill>
+                  <a:schemeClr val="bg1"/>
+                </a:solidFill>
+                <a:latin typeface="Futura Condensed Medium" panose="020B0602020204020303" pitchFamily="34" charset="-79"/>
+                <a:cs typeface="Futura Condensed Medium" panose="020B0602020204020303" pitchFamily="34" charset="-79"/>
+              </a:endParaRPr>
+            </a:p>
+          </p:txBody>
+        </p:sp>
+        <p:sp>
+          <p:nvSpPr>
+            <p:cNvPr id="6" name="Oval 5">
+              <a:extLst>
+                <a:ext uri="{FF2B5EF4-FFF2-40B4-BE49-F238E27FC236}">
+                  <a16:creationId xmlns:a16="http://schemas.microsoft.com/office/drawing/2014/main" id="{5C73E116-EA52-8B4E-8A0C-4DC9CE760060}"/>
+                </a:ext>
+              </a:extLst>
+            </p:cNvPr>
+            <p:cNvSpPr/>
+            <p:nvPr/>
+          </p:nvSpPr>
+          <p:spPr>
+            <a:xfrm>
+              <a:off x="2065770" y="2539946"/>
+              <a:ext cx="2789863" cy="2010719"/>
+            </a:xfrm>
+            <a:prstGeom prst="ellipse">
+              <a:avLst/>
+            </a:prstGeom>
+            <a:solidFill>
+              <a:schemeClr val="accent1">
+                <a:lumMod val="50000"/>
+              </a:schemeClr>
+            </a:solidFill>
+            <a:ln w="88900">
+              <a:solidFill>
+                <a:schemeClr val="bg1"/>
+              </a:solidFill>
+            </a:ln>
+          </p:spPr>
+          <p:style>
+            <a:lnRef idx="2">
+              <a:schemeClr val="accent1">
+                <a:shade val="50000"/>
+              </a:schemeClr>
+            </a:lnRef>
+            <a:fillRef idx="1">
+              <a:schemeClr val="accent1"/>
+            </a:fillRef>
+            <a:effectRef idx="0">
+              <a:schemeClr val="accent1"/>
+            </a:effectRef>
+            <a:fontRef idx="minor">
+              <a:schemeClr val="lt1"/>
+            </a:fontRef>
+          </p:style>
+          <p:txBody>
+            <a:bodyPr rtlCol="0" anchor="ctr"/>
+            <a:lstStyle/>
+            <a:p>
+              <a:pPr algn="ctr"/>
+              <a:endParaRPr lang="en-US"/>
+            </a:p>
+          </p:txBody>
+        </p:sp>
+        <p:sp>
+          <p:nvSpPr>
+            <p:cNvPr id="9" name="Oval 8">
+              <a:extLst>
+                <a:ext uri="{FF2B5EF4-FFF2-40B4-BE49-F238E27FC236}">
+                  <a16:creationId xmlns:a16="http://schemas.microsoft.com/office/drawing/2014/main" id="{4EF883A6-FA31-F14A-AEF2-01F59B131354}"/>
+                </a:ext>
+              </a:extLst>
+            </p:cNvPr>
+            <p:cNvSpPr/>
+            <p:nvPr/>
+          </p:nvSpPr>
+          <p:spPr>
+            <a:xfrm>
+              <a:off x="2237283" y="2410515"/>
+              <a:ext cx="2668091" cy="1976507"/>
+            </a:xfrm>
+            <a:prstGeom prst="ellipse">
+              <a:avLst/>
+            </a:prstGeom>
+            <a:solidFill>
+              <a:schemeClr val="bg1"/>
+            </a:solidFill>
+            <a:ln>
+              <a:noFill/>
+            </a:ln>
+          </p:spPr>
+          <p:style>
+            <a:lnRef idx="2">
+              <a:schemeClr val="accent1">
+                <a:shade val="50000"/>
+              </a:schemeClr>
+            </a:lnRef>
+            <a:fillRef idx="1">
+              <a:schemeClr val="accent1"/>
+            </a:fillRef>
+            <a:effectRef idx="0">
+              <a:schemeClr val="accent1"/>
+            </a:effectRef>
+            <a:fontRef idx="minor">
+              <a:schemeClr val="lt1"/>
+            </a:fontRef>
+          </p:style>
+          <p:txBody>
+            <a:bodyPr rtlCol="0" anchor="ctr"/>
+            <a:lstStyle/>
+            <a:p>
+              <a:pPr algn="ctr"/>
+              <a:endParaRPr lang="en-US" dirty="0">
+                <a:solidFill>
+                  <a:schemeClr val="bg1"/>
+                </a:solidFill>
+              </a:endParaRPr>
+            </a:p>
+          </p:txBody>
+        </p:sp>
+        <p:pic>
+          <p:nvPicPr>
+            <p:cNvPr id="7" name="Picture 6" descr="Logo&#10;&#10;Description automatically generated with medium confidence">
+              <a:extLst>
+                <a:ext uri="{FF2B5EF4-FFF2-40B4-BE49-F238E27FC236}">
+                  <a16:creationId xmlns:a16="http://schemas.microsoft.com/office/drawing/2014/main" id="{801ADF1E-19F8-C746-910E-8DFD86780E60}"/>
+                </a:ext>
+              </a:extLst>
+            </p:cNvPr>
+            <p:cNvPicPr>
+              <a:picLocks noChangeAspect="1"/>
+            </p:cNvPicPr>
+            <p:nvPr/>
+          </p:nvPicPr>
+          <p:blipFill>
+            <a:blip r:embed="rId3"/>
+            <a:stretch>
+              <a:fillRect/>
+            </a:stretch>
+          </p:blipFill>
+          <p:spPr>
+            <a:xfrm>
+              <a:off x="2044122" y="1495294"/>
+              <a:ext cx="7367666" cy="4114800"/>
+            </a:xfrm>
+            <a:prstGeom prst="rect">
+              <a:avLst/>
+            </a:prstGeom>
+          </p:spPr>
+        </p:pic>
+        <p:pic>
+          <p:nvPicPr>
+            <p:cNvPr id="12" name="Picture 11">
+              <a:extLst>
+                <a:ext uri="{FF2B5EF4-FFF2-40B4-BE49-F238E27FC236}">
+                  <a16:creationId xmlns:a16="http://schemas.microsoft.com/office/drawing/2014/main" id="{75EA1B96-60E0-174C-A4DF-10369987B20E}"/>
+                </a:ext>
+              </a:extLst>
+            </p:cNvPr>
+            <p:cNvPicPr>
+              <a:picLocks noChangeAspect="1"/>
+            </p:cNvPicPr>
+            <p:nvPr/>
+          </p:nvPicPr>
+          <p:blipFill>
+            <a:blip r:embed="rId4"/>
+            <a:stretch>
+              <a:fillRect/>
+            </a:stretch>
+          </p:blipFill>
+          <p:spPr>
+            <a:xfrm>
+              <a:off x="4706679" y="3764252"/>
+              <a:ext cx="4146695" cy="835352"/>
+            </a:xfrm>
+            <a:prstGeom prst="rect">
+              <a:avLst/>
+            </a:prstGeom>
+          </p:spPr>
+        </p:pic>
+      </p:grpSp>
+    </p:spTree>
+    <p:extLst>
+      <p:ext uri="{BB962C8B-B14F-4D97-AF65-F5344CB8AC3E}">
+        <p14:creationId xmlns:p14="http://schemas.microsoft.com/office/powerpoint/2010/main" val="1816492714"/>
+      </p:ext>
+    </p:extLst>
+  </p:cSld>
+  <p:clrMapOvr>
+    <a:masterClrMapping/>
+  </p:clrMapOvr>
+</p:sld>
+</file>
+
+<file path=ppt/slides/slide22.xml><?xml version="1.0" encoding="utf-8"?>
+<p:sld xmlns:a="http://schemas.openxmlformats.org/drawingml/2006/main" xmlns:r="http://schemas.openxmlformats.org/officeDocument/2006/relationships" xmlns:p="http://schemas.openxmlformats.org/presentationml/2006/main">
+  <p:cSld>
+    <p:spTree>
+      <p:nvGrpSpPr>
+        <p:cNvPr id="1" name=""/>
+        <p:cNvGrpSpPr/>
+        <p:nvPr/>
+      </p:nvGrpSpPr>
+      <p:grpSpPr>
+        <a:xfrm>
+          <a:off x="0" y="0"/>
+          <a:ext cx="0" cy="0"/>
+          <a:chOff x="0" y="0"/>
+          <a:chExt cx="0" cy="0"/>
+        </a:xfrm>
+      </p:grpSpPr>
+      <p:grpSp>
+        <p:nvGrpSpPr>
           <p:cNvPr id="9" name="Group 8">
             <a:extLst>
               <a:ext uri="{FF2B5EF4-FFF2-40B4-BE49-F238E27FC236}">
@@ -10020,7 +10441,7 @@
 </p:sld>
 </file>
 
-<file path=ppt/slides/slide22.xml><?xml version="1.0" encoding="utf-8"?>
+<file path=ppt/slides/slide23.xml><?xml version="1.0" encoding="utf-8"?>
 <p:sld xmlns:a="http://schemas.openxmlformats.org/drawingml/2006/main" xmlns:r="http://schemas.openxmlformats.org/officeDocument/2006/relationships" xmlns:p="http://schemas.openxmlformats.org/presentationml/2006/main">
   <p:cSld>
     <p:spTree>

</xml_diff>